<commit_message>
Added: 1. KJurek_Case_Study_1.html 2. KJurek_Case_Study_1.Rmd 3. Ages.xlsx Updated: 1. Beer_Expansion_Project.pptx
Signed-off-by: kjurekSMU <45209579+kjurekSMU@users.noreply.github.com>
</commit_message>
<xml_diff>
--- a/Beer_Expansion_Project.pptx
+++ b/Beer_Expansion_Project.pptx
@@ -1,16 +1,22 @@
 
 <file path=ppt/presentation.xml><?xml version="1.0" encoding="utf-8"?>
-<p:presentation xmlns:a="http://schemas.openxmlformats.org/drawingml/2006/main" xmlns:r="http://schemas.openxmlformats.org/officeDocument/2006/relationships" xmlns:p="http://schemas.openxmlformats.org/presentationml/2006/main" saveSubsetFonts="1">
+<p:presentation xmlns:a="http://schemas.openxmlformats.org/drawingml/2006/main" xmlns:r="http://schemas.openxmlformats.org/officeDocument/2006/relationships" xmlns:p="http://schemas.openxmlformats.org/presentationml/2006/main" showSpecialPlsOnTitleSld="0" saveSubsetFonts="1">
   <p:sldMasterIdLst>
     <p:sldMasterId id="2147483648" r:id="rId1"/>
   </p:sldMasterIdLst>
+  <p:notesMasterIdLst>
+    <p:notesMasterId r:id="rId11"/>
+  </p:notesMasterIdLst>
   <p:sldIdLst>
     <p:sldId id="257" r:id="rId2"/>
     <p:sldId id="256" r:id="rId3"/>
-    <p:sldId id="261" r:id="rId4"/>
-    <p:sldId id="258" r:id="rId5"/>
-    <p:sldId id="259" r:id="rId6"/>
-    <p:sldId id="260" r:id="rId7"/>
+    <p:sldId id="265" r:id="rId4"/>
+    <p:sldId id="261" r:id="rId5"/>
+    <p:sldId id="258" r:id="rId6"/>
+    <p:sldId id="259" r:id="rId7"/>
+    <p:sldId id="260" r:id="rId8"/>
+    <p:sldId id="263" r:id="rId9"/>
+    <p:sldId id="262" r:id="rId10"/>
   </p:sldIdLst>
   <p:sldSz cx="12192000" cy="6858000"/>
   <p:notesSz cx="6858000" cy="9144000"/>
@@ -109,7 +115,361 @@
       </a:defRPr>
     </a:lvl9pPr>
   </p:defaultTextStyle>
+  <p:extLst>
+    <p:ext uri="{EFAFB233-063F-42B5-8137-9DF3F51BA10A}">
+      <p15:sldGuideLst xmlns:p15="http://schemas.microsoft.com/office/powerpoint/2012/main"/>
+    </p:ext>
+  </p:extLst>
 </p:presentation>
+</file>
+
+<file path=ppt/notesMasters/notesMaster1.xml><?xml version="1.0" encoding="utf-8"?>
+<p:notesMaster xmlns:a="http://schemas.openxmlformats.org/drawingml/2006/main" xmlns:r="http://schemas.openxmlformats.org/officeDocument/2006/relationships" xmlns:p="http://schemas.openxmlformats.org/presentationml/2006/main">
+  <p:cSld>
+    <p:bg>
+      <p:bgRef idx="1001">
+        <a:schemeClr val="bg1"/>
+      </p:bgRef>
+    </p:bg>
+    <p:spTree>
+      <p:nvGrpSpPr>
+        <p:cNvPr id="1" name=""/>
+        <p:cNvGrpSpPr/>
+        <p:nvPr/>
+      </p:nvGrpSpPr>
+      <p:grpSpPr>
+        <a:xfrm>
+          <a:off x="0" y="0"/>
+          <a:ext cx="0" cy="0"/>
+          <a:chOff x="0" y="0"/>
+          <a:chExt cx="0" cy="0"/>
+        </a:xfrm>
+      </p:grpSpPr>
+      <p:sp>
+        <p:nvSpPr>
+          <p:cNvPr id="2" name="Header Placeholder 1"/>
+          <p:cNvSpPr>
+            <a:spLocks noGrp="1"/>
+          </p:cNvSpPr>
+          <p:nvPr>
+            <p:ph type="hdr" sz="quarter"/>
+          </p:nvPr>
+        </p:nvSpPr>
+        <p:spPr>
+          <a:xfrm>
+            <a:off x="0" y="0"/>
+            <a:ext cx="2971800" cy="458788"/>
+          </a:xfrm>
+          <a:prstGeom prst="rect">
+            <a:avLst/>
+          </a:prstGeom>
+        </p:spPr>
+        <p:txBody>
+          <a:bodyPr vert="horz" lIns="91440" tIns="45720" rIns="91440" bIns="45720" rtlCol="0"/>
+          <a:lstStyle>
+            <a:lvl1pPr algn="l">
+              <a:defRPr sz="1200"/>
+            </a:lvl1pPr>
+          </a:lstStyle>
+          <a:p>
+            <a:endParaRPr lang="en-US"/>
+          </a:p>
+        </p:txBody>
+      </p:sp>
+      <p:sp>
+        <p:nvSpPr>
+          <p:cNvPr id="3" name="Date Placeholder 2"/>
+          <p:cNvSpPr>
+            <a:spLocks noGrp="1"/>
+          </p:cNvSpPr>
+          <p:nvPr>
+            <p:ph type="dt" idx="1"/>
+          </p:nvPr>
+        </p:nvSpPr>
+        <p:spPr>
+          <a:xfrm>
+            <a:off x="3884613" y="0"/>
+            <a:ext cx="2971800" cy="458788"/>
+          </a:xfrm>
+          <a:prstGeom prst="rect">
+            <a:avLst/>
+          </a:prstGeom>
+        </p:spPr>
+        <p:txBody>
+          <a:bodyPr vert="horz" lIns="91440" tIns="45720" rIns="91440" bIns="45720" rtlCol="0"/>
+          <a:lstStyle>
+            <a:lvl1pPr algn="r">
+              <a:defRPr sz="1200"/>
+            </a:lvl1pPr>
+          </a:lstStyle>
+          <a:p>
+            <a:fld id="{73F231FB-2A93-4DDD-97F2-FAA600697AA9}" type="datetimeFigureOut">
+              <a:rPr lang="en-US" smtClean="0"/>
+              <a:t>1/1/2019</a:t>
+            </a:fld>
+            <a:endParaRPr lang="en-US"/>
+          </a:p>
+        </p:txBody>
+      </p:sp>
+      <p:sp>
+        <p:nvSpPr>
+          <p:cNvPr id="4" name="Slide Image Placeholder 3"/>
+          <p:cNvSpPr>
+            <a:spLocks noGrp="1" noRot="1" noChangeAspect="1"/>
+          </p:cNvSpPr>
+          <p:nvPr>
+            <p:ph type="sldImg" idx="2"/>
+          </p:nvPr>
+        </p:nvSpPr>
+        <p:spPr>
+          <a:xfrm>
+            <a:off x="685800" y="1143000"/>
+            <a:ext cx="5486400" cy="3086100"/>
+          </a:xfrm>
+          <a:prstGeom prst="rect">
+            <a:avLst/>
+          </a:prstGeom>
+          <a:noFill/>
+          <a:ln w="12700">
+            <a:solidFill>
+              <a:prstClr val="black"/>
+            </a:solidFill>
+          </a:ln>
+        </p:spPr>
+        <p:txBody>
+          <a:bodyPr vert="horz" lIns="91440" tIns="45720" rIns="91440" bIns="45720" rtlCol="0" anchor="ctr"/>
+          <a:lstStyle/>
+          <a:p>
+            <a:endParaRPr lang="en-US"/>
+          </a:p>
+        </p:txBody>
+      </p:sp>
+      <p:sp>
+        <p:nvSpPr>
+          <p:cNvPr id="5" name="Notes Placeholder 4"/>
+          <p:cNvSpPr>
+            <a:spLocks noGrp="1"/>
+          </p:cNvSpPr>
+          <p:nvPr>
+            <p:ph type="body" sz="quarter" idx="3"/>
+          </p:nvPr>
+        </p:nvSpPr>
+        <p:spPr>
+          <a:xfrm>
+            <a:off x="685800" y="4400550"/>
+            <a:ext cx="5486400" cy="3600450"/>
+          </a:xfrm>
+          <a:prstGeom prst="rect">
+            <a:avLst/>
+          </a:prstGeom>
+        </p:spPr>
+        <p:txBody>
+          <a:bodyPr vert="horz" lIns="91440" tIns="45720" rIns="91440" bIns="45720" rtlCol="0"/>
+          <a:lstStyle/>
+          <a:p>
+            <a:pPr lvl="0"/>
+            <a:r>
+              <a:rPr lang="en-US"/>
+              <a:t>Edit Master text styles</a:t>
+            </a:r>
+          </a:p>
+          <a:p>
+            <a:pPr lvl="1"/>
+            <a:r>
+              <a:rPr lang="en-US"/>
+              <a:t>Second level</a:t>
+            </a:r>
+          </a:p>
+          <a:p>
+            <a:pPr lvl="2"/>
+            <a:r>
+              <a:rPr lang="en-US"/>
+              <a:t>Third level</a:t>
+            </a:r>
+          </a:p>
+          <a:p>
+            <a:pPr lvl="3"/>
+            <a:r>
+              <a:rPr lang="en-US"/>
+              <a:t>Fourth level</a:t>
+            </a:r>
+          </a:p>
+          <a:p>
+            <a:pPr lvl="4"/>
+            <a:r>
+              <a:rPr lang="en-US"/>
+              <a:t>Fifth level</a:t>
+            </a:r>
+          </a:p>
+        </p:txBody>
+      </p:sp>
+      <p:sp>
+        <p:nvSpPr>
+          <p:cNvPr id="6" name="Footer Placeholder 5"/>
+          <p:cNvSpPr>
+            <a:spLocks noGrp="1"/>
+          </p:cNvSpPr>
+          <p:nvPr>
+            <p:ph type="ftr" sz="quarter" idx="4"/>
+          </p:nvPr>
+        </p:nvSpPr>
+        <p:spPr>
+          <a:xfrm>
+            <a:off x="0" y="8685213"/>
+            <a:ext cx="2971800" cy="458787"/>
+          </a:xfrm>
+          <a:prstGeom prst="rect">
+            <a:avLst/>
+          </a:prstGeom>
+        </p:spPr>
+        <p:txBody>
+          <a:bodyPr vert="horz" lIns="91440" tIns="45720" rIns="91440" bIns="45720" rtlCol="0" anchor="b"/>
+          <a:lstStyle>
+            <a:lvl1pPr algn="l">
+              <a:defRPr sz="1200"/>
+            </a:lvl1pPr>
+          </a:lstStyle>
+          <a:p>
+            <a:endParaRPr lang="en-US"/>
+          </a:p>
+        </p:txBody>
+      </p:sp>
+      <p:sp>
+        <p:nvSpPr>
+          <p:cNvPr id="7" name="Slide Number Placeholder 6"/>
+          <p:cNvSpPr>
+            <a:spLocks noGrp="1"/>
+          </p:cNvSpPr>
+          <p:nvPr>
+            <p:ph type="sldNum" sz="quarter" idx="5"/>
+          </p:nvPr>
+        </p:nvSpPr>
+        <p:spPr>
+          <a:xfrm>
+            <a:off x="3884613" y="8685213"/>
+            <a:ext cx="2971800" cy="458787"/>
+          </a:xfrm>
+          <a:prstGeom prst="rect">
+            <a:avLst/>
+          </a:prstGeom>
+        </p:spPr>
+        <p:txBody>
+          <a:bodyPr vert="horz" lIns="91440" tIns="45720" rIns="91440" bIns="45720" rtlCol="0" anchor="b"/>
+          <a:lstStyle>
+            <a:lvl1pPr algn="r">
+              <a:defRPr sz="1200"/>
+            </a:lvl1pPr>
+          </a:lstStyle>
+          <a:p>
+            <a:fld id="{3BA84395-5BDD-4359-B2D9-32864B2540BF}" type="slidenum">
+              <a:rPr lang="en-US" smtClean="0"/>
+              <a:t>‹#›</a:t>
+            </a:fld>
+            <a:endParaRPr lang="en-US"/>
+          </a:p>
+        </p:txBody>
+      </p:sp>
+    </p:spTree>
+    <p:extLst>
+      <p:ext uri="{BB962C8B-B14F-4D97-AF65-F5344CB8AC3E}">
+        <p14:creationId xmlns:p14="http://schemas.microsoft.com/office/powerpoint/2010/main" val="2571570555"/>
+      </p:ext>
+    </p:extLst>
+  </p:cSld>
+  <p:clrMap bg1="lt1" tx1="dk1" bg2="lt2" tx2="dk2" accent1="accent1" accent2="accent2" accent3="accent3" accent4="accent4" accent5="accent5" accent6="accent6" hlink="hlink" folHlink="folHlink"/>
+  <p:notesStyle>
+    <a:lvl1pPr marL="0" algn="l" defTabSz="914400" rtl="0" eaLnBrk="1" latinLnBrk="0" hangingPunct="1">
+      <a:defRPr sz="1200" kern="1200">
+        <a:solidFill>
+          <a:schemeClr val="tx1"/>
+        </a:solidFill>
+        <a:latin typeface="+mn-lt"/>
+        <a:ea typeface="+mn-ea"/>
+        <a:cs typeface="+mn-cs"/>
+      </a:defRPr>
+    </a:lvl1pPr>
+    <a:lvl2pPr marL="457200" algn="l" defTabSz="914400" rtl="0" eaLnBrk="1" latinLnBrk="0" hangingPunct="1">
+      <a:defRPr sz="1200" kern="1200">
+        <a:solidFill>
+          <a:schemeClr val="tx1"/>
+        </a:solidFill>
+        <a:latin typeface="+mn-lt"/>
+        <a:ea typeface="+mn-ea"/>
+        <a:cs typeface="+mn-cs"/>
+      </a:defRPr>
+    </a:lvl2pPr>
+    <a:lvl3pPr marL="914400" algn="l" defTabSz="914400" rtl="0" eaLnBrk="1" latinLnBrk="0" hangingPunct="1">
+      <a:defRPr sz="1200" kern="1200">
+        <a:solidFill>
+          <a:schemeClr val="tx1"/>
+        </a:solidFill>
+        <a:latin typeface="+mn-lt"/>
+        <a:ea typeface="+mn-ea"/>
+        <a:cs typeface="+mn-cs"/>
+      </a:defRPr>
+    </a:lvl3pPr>
+    <a:lvl4pPr marL="1371600" algn="l" defTabSz="914400" rtl="0" eaLnBrk="1" latinLnBrk="0" hangingPunct="1">
+      <a:defRPr sz="1200" kern="1200">
+        <a:solidFill>
+          <a:schemeClr val="tx1"/>
+        </a:solidFill>
+        <a:latin typeface="+mn-lt"/>
+        <a:ea typeface="+mn-ea"/>
+        <a:cs typeface="+mn-cs"/>
+      </a:defRPr>
+    </a:lvl4pPr>
+    <a:lvl5pPr marL="1828800" algn="l" defTabSz="914400" rtl="0" eaLnBrk="1" latinLnBrk="0" hangingPunct="1">
+      <a:defRPr sz="1200" kern="1200">
+        <a:solidFill>
+          <a:schemeClr val="tx1"/>
+        </a:solidFill>
+        <a:latin typeface="+mn-lt"/>
+        <a:ea typeface="+mn-ea"/>
+        <a:cs typeface="+mn-cs"/>
+      </a:defRPr>
+    </a:lvl5pPr>
+    <a:lvl6pPr marL="2286000" algn="l" defTabSz="914400" rtl="0" eaLnBrk="1" latinLnBrk="0" hangingPunct="1">
+      <a:defRPr sz="1200" kern="1200">
+        <a:solidFill>
+          <a:schemeClr val="tx1"/>
+        </a:solidFill>
+        <a:latin typeface="+mn-lt"/>
+        <a:ea typeface="+mn-ea"/>
+        <a:cs typeface="+mn-cs"/>
+      </a:defRPr>
+    </a:lvl6pPr>
+    <a:lvl7pPr marL="2743200" algn="l" defTabSz="914400" rtl="0" eaLnBrk="1" latinLnBrk="0" hangingPunct="1">
+      <a:defRPr sz="1200" kern="1200">
+        <a:solidFill>
+          <a:schemeClr val="tx1"/>
+        </a:solidFill>
+        <a:latin typeface="+mn-lt"/>
+        <a:ea typeface="+mn-ea"/>
+        <a:cs typeface="+mn-cs"/>
+      </a:defRPr>
+    </a:lvl7pPr>
+    <a:lvl8pPr marL="3200400" algn="l" defTabSz="914400" rtl="0" eaLnBrk="1" latinLnBrk="0" hangingPunct="1">
+      <a:defRPr sz="1200" kern="1200">
+        <a:solidFill>
+          <a:schemeClr val="tx1"/>
+        </a:solidFill>
+        <a:latin typeface="+mn-lt"/>
+        <a:ea typeface="+mn-ea"/>
+        <a:cs typeface="+mn-cs"/>
+      </a:defRPr>
+    </a:lvl8pPr>
+    <a:lvl9pPr marL="3657600" algn="l" defTabSz="914400" rtl="0" eaLnBrk="1" latinLnBrk="0" hangingPunct="1">
+      <a:defRPr sz="1200" kern="1200">
+        <a:solidFill>
+          <a:schemeClr val="tx1"/>
+        </a:solidFill>
+        <a:latin typeface="+mn-lt"/>
+        <a:ea typeface="+mn-ea"/>
+        <a:cs typeface="+mn-cs"/>
+      </a:defRPr>
+    </a:lvl9pPr>
+  </p:notesStyle>
+</p:notesMaster>
 </file>
 
 <file path=ppt/slideLayouts/slideLayout1.xml><?xml version="1.0" encoding="utf-8"?>
@@ -257,7 +617,7 @@
           <a:bodyPr/>
           <a:lstStyle/>
           <a:p>
-            <a:fld id="{74517D71-BC16-4C17-8F32-BDAE8201A195}" type="datetimeFigureOut">
+            <a:fld id="{2D333891-192C-48CF-8E1C-8D21CD273C07}" type="datetime1">
               <a:rPr lang="en-US" smtClean="0"/>
               <a:t>1/1/2019</a:t>
             </a:fld>
@@ -455,7 +815,7 @@
           <a:bodyPr/>
           <a:lstStyle/>
           <a:p>
-            <a:fld id="{74517D71-BC16-4C17-8F32-BDAE8201A195}" type="datetimeFigureOut">
+            <a:fld id="{33DA4797-7741-4BF0-93E6-A27A12ABF4CE}" type="datetime1">
               <a:rPr lang="en-US" smtClean="0"/>
               <a:t>1/1/2019</a:t>
             </a:fld>
@@ -663,7 +1023,7 @@
           <a:bodyPr/>
           <a:lstStyle/>
           <a:p>
-            <a:fld id="{74517D71-BC16-4C17-8F32-BDAE8201A195}" type="datetimeFigureOut">
+            <a:fld id="{A077AE2F-45D2-48FB-9F4F-5B1E7280739B}" type="datetime1">
               <a:rPr lang="en-US" smtClean="0"/>
               <a:t>1/1/2019</a:t>
             </a:fld>
@@ -861,7 +1221,7 @@
           <a:bodyPr/>
           <a:lstStyle/>
           <a:p>
-            <a:fld id="{74517D71-BC16-4C17-8F32-BDAE8201A195}" type="datetimeFigureOut">
+            <a:fld id="{7ED8E002-B1F3-4940-BBED-F49DBA08020A}" type="datetime1">
               <a:rPr lang="en-US" smtClean="0"/>
               <a:t>1/1/2019</a:t>
             </a:fld>
@@ -1136,7 +1496,7 @@
           <a:bodyPr/>
           <a:lstStyle/>
           <a:p>
-            <a:fld id="{74517D71-BC16-4C17-8F32-BDAE8201A195}" type="datetimeFigureOut">
+            <a:fld id="{CA3FDA36-6E63-44F0-A51D-7FC598D78472}" type="datetime1">
               <a:rPr lang="en-US" smtClean="0"/>
               <a:t>1/1/2019</a:t>
             </a:fld>
@@ -1401,7 +1761,7 @@
           <a:bodyPr/>
           <a:lstStyle/>
           <a:p>
-            <a:fld id="{74517D71-BC16-4C17-8F32-BDAE8201A195}" type="datetimeFigureOut">
+            <a:fld id="{CA94171E-0128-4B06-ACA3-F559DF346C6A}" type="datetime1">
               <a:rPr lang="en-US" smtClean="0"/>
               <a:t>1/1/2019</a:t>
             </a:fld>
@@ -1813,7 +2173,7 @@
           <a:bodyPr/>
           <a:lstStyle/>
           <a:p>
-            <a:fld id="{74517D71-BC16-4C17-8F32-BDAE8201A195}" type="datetimeFigureOut">
+            <a:fld id="{D6D15CB3-C64B-4712-9E1A-804A2E49564E}" type="datetime1">
               <a:rPr lang="en-US" smtClean="0"/>
               <a:t>1/1/2019</a:t>
             </a:fld>
@@ -1954,7 +2314,7 @@
           <a:bodyPr/>
           <a:lstStyle/>
           <a:p>
-            <a:fld id="{74517D71-BC16-4C17-8F32-BDAE8201A195}" type="datetimeFigureOut">
+            <a:fld id="{8D6471B2-FE85-4121-ACDC-6B36CD9AA0E5}" type="datetime1">
               <a:rPr lang="en-US" smtClean="0"/>
               <a:t>1/1/2019</a:t>
             </a:fld>
@@ -2067,7 +2427,7 @@
           <a:bodyPr/>
           <a:lstStyle/>
           <a:p>
-            <a:fld id="{74517D71-BC16-4C17-8F32-BDAE8201A195}" type="datetimeFigureOut">
+            <a:fld id="{17B39D1E-0163-4BE9-9242-DC07273A7575}" type="datetime1">
               <a:rPr lang="en-US" smtClean="0"/>
               <a:t>1/1/2019</a:t>
             </a:fld>
@@ -2378,7 +2738,7 @@
           <a:bodyPr/>
           <a:lstStyle/>
           <a:p>
-            <a:fld id="{74517D71-BC16-4C17-8F32-BDAE8201A195}" type="datetimeFigureOut">
+            <a:fld id="{450875EA-6C1B-421B-8B66-C4C345A6C513}" type="datetime1">
               <a:rPr lang="en-US" smtClean="0"/>
               <a:t>1/1/2019</a:t>
             </a:fld>
@@ -2666,7 +3026,7 @@
           <a:bodyPr/>
           <a:lstStyle/>
           <a:p>
-            <a:fld id="{74517D71-BC16-4C17-8F32-BDAE8201A195}" type="datetimeFigureOut">
+            <a:fld id="{B5AEC0A5-694A-4050-9B9B-72FA6DE8F577}" type="datetime1">
               <a:rPr lang="en-US" smtClean="0"/>
               <a:t>1/1/2019</a:t>
             </a:fld>
@@ -2937,7 +3297,7 @@
             </a:lvl1pPr>
           </a:lstStyle>
           <a:p>
-            <a:fld id="{74517D71-BC16-4C17-8F32-BDAE8201A195}" type="datetimeFigureOut">
+            <a:fld id="{C0AA526B-76EB-4FEB-8AF5-FF4B218A5B42}" type="datetime1">
               <a:rPr lang="en-US" smtClean="0"/>
               <a:t>1/1/2019</a:t>
             </a:fld>
@@ -3056,6 +3416,7 @@
     <p:sldLayoutId id="2147483658" r:id="rId10"/>
     <p:sldLayoutId id="2147483659" r:id="rId11"/>
   </p:sldLayoutIdLst>
+  <p:hf sldNum="0" hdr="0" ftr="0"/>
   <p:txStyles>
     <p:titleStyle>
       <a:lvl1pPr algn="l" defTabSz="914400" rtl="0" eaLnBrk="1" latinLnBrk="0" hangingPunct="1">
@@ -3383,17 +3744,42 @@
           <a:lstStyle/>
           <a:p>
             <a:r>
-              <a:rPr lang="en-US" sz="7200" b="1" dirty="0"/>
+              <a:rPr lang="en-US" sz="7200" b="1" dirty="0">
+                <a:latin typeface="Rockwell" panose="02060603020205020403" pitchFamily="18" charset="0"/>
+              </a:rPr>
               <a:t>Blue Beer’s</a:t>
             </a:r>
           </a:p>
           <a:p>
-            <a:endParaRPr lang="en-US" sz="7200" b="1" dirty="0"/>
-          </a:p>
-          <a:p>
-            <a:r>
-              <a:rPr lang="en-US" sz="7200" b="1" dirty="0"/>
-              <a:t>Picasso Expansion Project</a:t>
+            <a:endParaRPr lang="en-US" sz="7200" b="1" dirty="0">
+              <a:latin typeface="Rockwell" panose="02060603020205020403" pitchFamily="18" charset="0"/>
+            </a:endParaRPr>
+          </a:p>
+          <a:p>
+            <a:r>
+              <a:rPr lang="en-US" sz="7200" b="1" dirty="0">
+                <a:latin typeface="Bradley Hand ITC" panose="03070402050302030203" pitchFamily="66" charset="0"/>
+              </a:rPr>
+              <a:t>Picasso</a:t>
+            </a:r>
+            <a:r>
+              <a:rPr lang="en-US" sz="7200" b="1" dirty="0">
+                <a:latin typeface="Rockwell" panose="02060603020205020403" pitchFamily="18" charset="0"/>
+              </a:rPr>
+              <a:t> </a:t>
+            </a:r>
+          </a:p>
+          <a:p>
+            <a:endParaRPr lang="en-US" sz="7200" b="1" dirty="0">
+              <a:latin typeface="Rockwell" panose="02060603020205020403" pitchFamily="18" charset="0"/>
+            </a:endParaRPr>
+          </a:p>
+          <a:p>
+            <a:r>
+              <a:rPr lang="en-US" sz="7200" b="1" dirty="0">
+                <a:latin typeface="Rockwell" panose="02060603020205020403" pitchFamily="18" charset="0"/>
+              </a:rPr>
+              <a:t>Expansion Project</a:t>
             </a:r>
           </a:p>
           <a:p>
@@ -3442,6 +3828,83 @@
           </a:prstGeom>
         </p:spPr>
       </p:pic>
+      <p:pic>
+        <p:nvPicPr>
+          <p:cNvPr id="4" name="Picture 3">
+            <a:extLst>
+              <a:ext uri="{FF2B5EF4-FFF2-40B4-BE49-F238E27FC236}">
+                <a16:creationId xmlns:a16="http://schemas.microsoft.com/office/drawing/2014/main" id="{A0E9478D-DE99-4EEB-A5A0-1827D5C1CAB0}"/>
+              </a:ext>
+            </a:extLst>
+          </p:cNvPr>
+          <p:cNvPicPr>
+            <a:picLocks noChangeAspect="1"/>
+          </p:cNvPicPr>
+          <p:nvPr/>
+        </p:nvPicPr>
+        <p:blipFill>
+          <a:blip r:embed="rId3">
+            <a:extLst>
+              <a:ext uri="{28A0092B-C50C-407E-A947-70E740481C1C}">
+                <a14:useLocalDpi xmlns:a14="http://schemas.microsoft.com/office/drawing/2010/main" val="0"/>
+              </a:ext>
+            </a:extLst>
+          </a:blip>
+          <a:stretch>
+            <a:fillRect/>
+          </a:stretch>
+        </p:blipFill>
+        <p:spPr>
+          <a:xfrm>
+            <a:off x="313168" y="3490913"/>
+            <a:ext cx="1079796" cy="1623017"/>
+          </a:xfrm>
+          <a:prstGeom prst="rect">
+            <a:avLst/>
+          </a:prstGeom>
+        </p:spPr>
+      </p:pic>
+      <p:sp>
+        <p:nvSpPr>
+          <p:cNvPr id="7" name="TextBox 6">
+            <a:extLst>
+              <a:ext uri="{FF2B5EF4-FFF2-40B4-BE49-F238E27FC236}">
+                <a16:creationId xmlns:a16="http://schemas.microsoft.com/office/drawing/2014/main" id="{843043E2-8D4E-4B3B-A412-79F3813D422C}"/>
+              </a:ext>
+            </a:extLst>
+          </p:cNvPr>
+          <p:cNvSpPr txBox="1"/>
+          <p:nvPr/>
+        </p:nvSpPr>
+        <p:spPr>
+          <a:xfrm>
+            <a:off x="208547" y="5113930"/>
+            <a:ext cx="1259305" cy="369332"/>
+          </a:xfrm>
+          <a:prstGeom prst="rect">
+            <a:avLst/>
+          </a:prstGeom>
+          <a:noFill/>
+        </p:spPr>
+        <p:txBody>
+          <a:bodyPr wrap="square" rtlCol="0">
+            <a:spAutoFit/>
+          </a:bodyPr>
+          <a:lstStyle/>
+          <a:p>
+            <a:pPr algn="ctr"/>
+            <a:r>
+              <a:rPr lang="en-US" b="1" dirty="0">
+                <a:solidFill>
+                  <a:schemeClr val="bg1"/>
+                </a:solidFill>
+                <a:latin typeface="Bradley Hand ITC" panose="03070402050302030203" pitchFamily="66" charset="0"/>
+              </a:rPr>
+              <a:t>PICASSO</a:t>
+            </a:r>
+          </a:p>
+        </p:txBody>
+      </p:sp>
     </p:spTree>
     <p:extLst>
       <p:ext uri="{BB962C8B-B14F-4D97-AF65-F5344CB8AC3E}">
@@ -3501,8 +3964,10 @@
           <a:lstStyle/>
           <a:p>
             <a:r>
-              <a:rPr lang="en-US" sz="4000" b="1" dirty="0"/>
-              <a:t>Concept</a:t>
+              <a:rPr lang="en-US" sz="4000" b="1" dirty="0">
+                <a:latin typeface="Rockwell" panose="02060603020205020403" pitchFamily="18" charset="0"/>
+              </a:rPr>
+              <a:t>ISSUE</a:t>
             </a:r>
           </a:p>
         </p:txBody>
@@ -3531,7 +3996,7 @@
         </p:spPr>
         <p:txBody>
           <a:bodyPr>
-            <a:normAutofit lnSpcReduction="10000"/>
+            <a:normAutofit/>
           </a:bodyPr>
           <a:lstStyle/>
           <a:p>
@@ -3539,174 +4004,70 @@
               <a:buFont typeface="Wingdings" panose="05000000000000000000" pitchFamily="2" charset="2"/>
               <a:buChar char="Ø"/>
             </a:pPr>
-            <a:endParaRPr lang="en-US" dirty="0"/>
+            <a:r>
+              <a:rPr lang="en-US" dirty="0">
+                <a:latin typeface="Rockwell" panose="02060603020205020403" pitchFamily="18" charset="0"/>
+              </a:rPr>
+              <a:t>Beers follow the general rule:  </a:t>
+            </a:r>
+          </a:p>
+          <a:p>
+            <a:pPr marL="800100" lvl="1" indent="-342900" algn="l">
+              <a:buFont typeface="Wingdings" panose="05000000000000000000" pitchFamily="2" charset="2"/>
+              <a:buChar char="Ø"/>
+            </a:pPr>
+            <a:r>
+              <a:rPr lang="en-US" dirty="0">
+                <a:latin typeface="Rockwell" panose="02060603020205020403" pitchFamily="18" charset="0"/>
+              </a:rPr>
+              <a:t>Higher alcohol requires</a:t>
+            </a:r>
+          </a:p>
+          <a:p>
+            <a:pPr marL="800100" lvl="1" indent="-342900" algn="l">
+              <a:buFont typeface="Wingdings" panose="05000000000000000000" pitchFamily="2" charset="2"/>
+              <a:buChar char="Ø"/>
+            </a:pPr>
+            <a:r>
+              <a:rPr lang="en-US" dirty="0">
+                <a:latin typeface="Rockwell" panose="02060603020205020403" pitchFamily="18" charset="0"/>
+              </a:rPr>
+              <a:t>More bitterness</a:t>
+            </a:r>
+          </a:p>
+          <a:p>
+            <a:pPr marL="800100" lvl="1" indent="-342900" algn="l">
+              <a:buFont typeface="Wingdings" panose="05000000000000000000" pitchFamily="2" charset="2"/>
+              <a:buChar char="Ø"/>
+            </a:pPr>
+            <a:endParaRPr lang="en-US" dirty="0">
+              <a:latin typeface="Rockwell" panose="02060603020205020403" pitchFamily="18" charset="0"/>
+            </a:endParaRPr>
+          </a:p>
+          <a:p>
+            <a:pPr algn="l"/>
+            <a:endParaRPr lang="en-US" dirty="0">
+              <a:latin typeface="Rockwell" panose="02060603020205020403" pitchFamily="18" charset="0"/>
+            </a:endParaRPr>
           </a:p>
           <a:p>
             <a:pPr marL="342900" indent="-342900" algn="l">
               <a:buFont typeface="Wingdings" panose="05000000000000000000" pitchFamily="2" charset="2"/>
               <a:buChar char="Ø"/>
             </a:pPr>
-            <a:r>
-              <a:rPr lang="en-US" dirty="0"/>
-              <a:t>Introduce a new beer, Picasso, that is high in alcohol content but low in bitterness</a:t>
-            </a:r>
-          </a:p>
-          <a:p>
-            <a:pPr marL="342900" indent="-342900" algn="l">
-              <a:buFont typeface="Wingdings" panose="05000000000000000000" pitchFamily="2" charset="2"/>
-              <a:buChar char="Ø"/>
-            </a:pPr>
-            <a:r>
-              <a:rPr lang="en-US" dirty="0"/>
-              <a:t>Release as a local craft beer in test markets</a:t>
-            </a:r>
-          </a:p>
-          <a:p>
-            <a:pPr marL="800100" lvl="1" indent="-342900" algn="l">
-              <a:buFont typeface="Wingdings" panose="05000000000000000000" pitchFamily="2" charset="2"/>
-              <a:buChar char="Ø"/>
-            </a:pPr>
-            <a:r>
-              <a:rPr lang="en-US" dirty="0"/>
-              <a:t>Initial: New Haven, Connecticut</a:t>
-            </a:r>
-          </a:p>
-          <a:p>
-            <a:pPr marL="800100" lvl="1" indent="-342900" algn="l">
-              <a:buFont typeface="Wingdings" panose="05000000000000000000" pitchFamily="2" charset="2"/>
-              <a:buChar char="Ø"/>
-            </a:pPr>
-            <a:r>
-              <a:rPr lang="en-US" dirty="0"/>
-              <a:t>Follow-on: </a:t>
-            </a:r>
-          </a:p>
-          <a:p>
-            <a:pPr marL="1257300" lvl="2" indent="-342900" algn="l">
-              <a:buFont typeface="Wingdings" panose="05000000000000000000" pitchFamily="2" charset="2"/>
-              <a:buChar char="Ø"/>
-            </a:pPr>
-            <a:r>
-              <a:rPr lang="en-US" dirty="0"/>
-              <a:t>South Bend, Indiana</a:t>
-            </a:r>
-          </a:p>
-          <a:p>
-            <a:pPr marL="1257300" lvl="2" indent="-342900" algn="l">
-              <a:buFont typeface="Wingdings" panose="05000000000000000000" pitchFamily="2" charset="2"/>
-              <a:buChar char="Ø"/>
-            </a:pPr>
-            <a:r>
-              <a:rPr lang="en-US" dirty="0"/>
-              <a:t>Chicago, Illinois</a:t>
-            </a:r>
-          </a:p>
-          <a:p>
-            <a:pPr marL="1257300" lvl="2" indent="-342900" algn="l">
-              <a:buFont typeface="Wingdings" panose="05000000000000000000" pitchFamily="2" charset="2"/>
-              <a:buChar char="Ø"/>
-            </a:pPr>
-            <a:r>
-              <a:rPr lang="en-US" dirty="0"/>
-              <a:t>Baltimore Maryland</a:t>
-            </a:r>
-          </a:p>
-          <a:p>
-            <a:pPr marL="342900" indent="-342900" algn="l">
-              <a:buFont typeface="Wingdings" panose="05000000000000000000" pitchFamily="2" charset="2"/>
-              <a:buChar char="Ø"/>
-            </a:pPr>
-            <a:r>
-              <a:rPr lang="en-US" dirty="0"/>
-              <a:t>Expand nationwide placing major breweries in large distribution centers</a:t>
-            </a:r>
-          </a:p>
-          <a:p>
-            <a:pPr marL="800100" lvl="1" indent="-342900" algn="l">
-              <a:buFont typeface="Wingdings" panose="05000000000000000000" pitchFamily="2" charset="2"/>
-              <a:buChar char="Ø"/>
-            </a:pPr>
-            <a:r>
-              <a:rPr lang="en-US" dirty="0"/>
-              <a:t>Chicago</a:t>
-            </a:r>
-          </a:p>
-          <a:p>
-            <a:pPr marL="800100" lvl="1" indent="-342900" algn="l">
-              <a:buFont typeface="Wingdings" panose="05000000000000000000" pitchFamily="2" charset="2"/>
-              <a:buChar char="Ø"/>
-            </a:pPr>
-            <a:r>
-              <a:rPr lang="en-US" dirty="0"/>
-              <a:t>New Jersey</a:t>
-            </a:r>
-          </a:p>
-          <a:p>
-            <a:pPr marL="800100" lvl="1" indent="-342900" algn="l">
-              <a:buFont typeface="Wingdings" panose="05000000000000000000" pitchFamily="2" charset="2"/>
-              <a:buChar char="Ø"/>
-            </a:pPr>
-            <a:r>
-              <a:rPr lang="en-US" dirty="0"/>
-              <a:t>Atlanta</a:t>
-            </a:r>
-          </a:p>
-          <a:p>
-            <a:pPr marL="800100" lvl="1" indent="-342900" algn="l">
-              <a:buFont typeface="Wingdings" panose="05000000000000000000" pitchFamily="2" charset="2"/>
-              <a:buChar char="Ø"/>
-            </a:pPr>
-            <a:r>
-              <a:rPr lang="en-US" dirty="0"/>
-              <a:t>Boise</a:t>
-            </a:r>
-          </a:p>
-          <a:p>
-            <a:pPr marL="800100" lvl="1" indent="-342900" algn="l">
-              <a:buFont typeface="Wingdings" panose="05000000000000000000" pitchFamily="2" charset="2"/>
-              <a:buChar char="Ø"/>
-            </a:pPr>
-            <a:r>
-              <a:rPr lang="en-US" dirty="0"/>
-              <a:t>Dallas</a:t>
-            </a:r>
-          </a:p>
-          <a:p>
-            <a:pPr marL="800100" lvl="1" indent="-342900" algn="l">
-              <a:buFont typeface="Wingdings" panose="05000000000000000000" pitchFamily="2" charset="2"/>
-              <a:buChar char="Ø"/>
-            </a:pPr>
-            <a:r>
-              <a:rPr lang="en-US" dirty="0"/>
-              <a:t>Denver</a:t>
-            </a:r>
-          </a:p>
-          <a:p>
-            <a:pPr marL="1714500" lvl="3" indent="-342900" algn="l">
-              <a:buFont typeface="Wingdings" panose="05000000000000000000" pitchFamily="2" charset="2"/>
-              <a:buChar char="Ø"/>
-            </a:pPr>
-            <a:endParaRPr lang="en-US" dirty="0"/>
-          </a:p>
-          <a:p>
-            <a:pPr marL="1257300" lvl="2" indent="-342900" algn="l">
-              <a:buFont typeface="Wingdings" panose="05000000000000000000" pitchFamily="2" charset="2"/>
-              <a:buChar char="Ø"/>
-            </a:pPr>
-            <a:endParaRPr lang="en-US" dirty="0"/>
-          </a:p>
-          <a:p>
-            <a:pPr marL="1257300" lvl="2" indent="-342900" algn="l">
-              <a:buFont typeface="Wingdings" panose="05000000000000000000" pitchFamily="2" charset="2"/>
-              <a:buChar char="Ø"/>
-            </a:pPr>
-            <a:endParaRPr lang="en-US" dirty="0"/>
-          </a:p>
-          <a:p>
-            <a:endParaRPr lang="en-US" dirty="0"/>
-          </a:p>
-          <a:p>
-            <a:endParaRPr lang="en-US" dirty="0"/>
+            <a:endParaRPr lang="en-US" dirty="0">
+              <a:latin typeface="Rockwell" panose="02060603020205020403" pitchFamily="18" charset="0"/>
+            </a:endParaRPr>
+          </a:p>
+          <a:p>
+            <a:endParaRPr lang="en-US" dirty="0">
+              <a:latin typeface="Rockwell" panose="02060603020205020403" pitchFamily="18" charset="0"/>
+            </a:endParaRPr>
+          </a:p>
+          <a:p>
+            <a:endParaRPr lang="en-US" dirty="0">
+              <a:latin typeface="Rockwell" panose="02060603020205020403" pitchFamily="18" charset="0"/>
+            </a:endParaRPr>
           </a:p>
         </p:txBody>
       </p:sp>
@@ -3739,6 +4100,119 @@
           <a:xfrm>
             <a:off x="0" y="1"/>
             <a:ext cx="1704975" cy="6876256"/>
+          </a:xfrm>
+          <a:prstGeom prst="rect">
+            <a:avLst/>
+          </a:prstGeom>
+        </p:spPr>
+      </p:pic>
+      <p:pic>
+        <p:nvPicPr>
+          <p:cNvPr id="6" name="Picture 5">
+            <a:extLst>
+              <a:ext uri="{FF2B5EF4-FFF2-40B4-BE49-F238E27FC236}">
+                <a16:creationId xmlns:a16="http://schemas.microsoft.com/office/drawing/2014/main" id="{C31514B2-331B-4615-A644-9B5A4109572C}"/>
+              </a:ext>
+            </a:extLst>
+          </p:cNvPr>
+          <p:cNvPicPr>
+            <a:picLocks noChangeAspect="1"/>
+          </p:cNvPicPr>
+          <p:nvPr/>
+        </p:nvPicPr>
+        <p:blipFill>
+          <a:blip r:embed="rId3">
+            <a:extLst>
+              <a:ext uri="{28A0092B-C50C-407E-A947-70E740481C1C}">
+                <a14:useLocalDpi xmlns:a14="http://schemas.microsoft.com/office/drawing/2010/main" val="0"/>
+              </a:ext>
+            </a:extLst>
+          </a:blip>
+          <a:stretch>
+            <a:fillRect/>
+          </a:stretch>
+        </p:blipFill>
+        <p:spPr>
+          <a:xfrm>
+            <a:off x="313168" y="3490913"/>
+            <a:ext cx="1079796" cy="1623017"/>
+          </a:xfrm>
+          <a:prstGeom prst="rect">
+            <a:avLst/>
+          </a:prstGeom>
+        </p:spPr>
+      </p:pic>
+      <p:sp>
+        <p:nvSpPr>
+          <p:cNvPr id="8" name="TextBox 7">
+            <a:extLst>
+              <a:ext uri="{FF2B5EF4-FFF2-40B4-BE49-F238E27FC236}">
+                <a16:creationId xmlns:a16="http://schemas.microsoft.com/office/drawing/2014/main" id="{7A89448C-2EF2-459B-8ACF-5CE9A88D5AC6}"/>
+              </a:ext>
+            </a:extLst>
+          </p:cNvPr>
+          <p:cNvSpPr txBox="1"/>
+          <p:nvPr/>
+        </p:nvSpPr>
+        <p:spPr>
+          <a:xfrm>
+            <a:off x="208547" y="5113930"/>
+            <a:ext cx="1259305" cy="369332"/>
+          </a:xfrm>
+          <a:prstGeom prst="rect">
+            <a:avLst/>
+          </a:prstGeom>
+          <a:noFill/>
+        </p:spPr>
+        <p:txBody>
+          <a:bodyPr wrap="square" rtlCol="0">
+            <a:spAutoFit/>
+          </a:bodyPr>
+          <a:lstStyle/>
+          <a:p>
+            <a:pPr algn="ctr"/>
+            <a:r>
+              <a:rPr lang="en-US" b="1" dirty="0">
+                <a:solidFill>
+                  <a:schemeClr val="bg1"/>
+                </a:solidFill>
+                <a:latin typeface="Bradley Hand ITC" panose="03070402050302030203" pitchFamily="66" charset="0"/>
+              </a:rPr>
+              <a:t>PICASSO</a:t>
+            </a:r>
+          </a:p>
+        </p:txBody>
+      </p:sp>
+      <p:pic>
+        <p:nvPicPr>
+          <p:cNvPr id="10" name="Picture 9">
+            <a:extLst>
+              <a:ext uri="{FF2B5EF4-FFF2-40B4-BE49-F238E27FC236}">
+                <a16:creationId xmlns:a16="http://schemas.microsoft.com/office/drawing/2014/main" id="{BB30C75F-D586-490B-AFF3-C1AD08840D4F}"/>
+              </a:ext>
+            </a:extLst>
+          </p:cNvPr>
+          <p:cNvPicPr>
+            <a:picLocks noChangeAspect="1"/>
+          </p:cNvPicPr>
+          <p:nvPr/>
+        </p:nvPicPr>
+        <p:blipFill>
+          <a:blip r:embed="rId4">
+            <a:extLst>
+              <a:ext uri="{28A0092B-C50C-407E-A947-70E740481C1C}">
+                <a14:useLocalDpi xmlns:a14="http://schemas.microsoft.com/office/drawing/2010/main" val="0"/>
+              </a:ext>
+            </a:extLst>
+          </a:blip>
+          <a:stretch>
+            <a:fillRect/>
+          </a:stretch>
+        </p:blipFill>
+        <p:spPr>
+          <a:xfrm>
+            <a:off x="2839901" y="2326105"/>
+            <a:ext cx="7836120" cy="4317121"/>
           </a:xfrm>
           <a:prstGeom prst="rect">
             <a:avLst/>
@@ -3804,8 +4278,10 @@
           <a:lstStyle/>
           <a:p>
             <a:r>
-              <a:rPr lang="en-US" sz="4000" b="1" dirty="0"/>
-              <a:t>Initial Test Market</a:t>
+              <a:rPr lang="en-US" sz="4000" b="1" dirty="0">
+                <a:latin typeface="Rockwell" panose="02060603020205020403" pitchFamily="18" charset="0"/>
+              </a:rPr>
+              <a:t>INITIAL TEST MARKET</a:t>
             </a:r>
           </a:p>
         </p:txBody>
@@ -3848,13 +4324,11 @@
               <a:buChar char="Ø"/>
             </a:pPr>
             <a:r>
-              <a:rPr lang="en-US" dirty="0"/>
+              <a:rPr lang="en-US" dirty="0">
+                <a:latin typeface="Rockwell" panose="02060603020205020403" pitchFamily="18" charset="0"/>
+              </a:rPr>
               <a:t>Connecticut</a:t>
             </a:r>
-          </a:p>
-          <a:p>
-            <a:pPr algn="l"/>
-            <a:endParaRPr lang="en-US" dirty="0"/>
           </a:p>
           <a:p>
             <a:pPr marL="800100" lvl="1" indent="-342900" algn="l">
@@ -3862,8 +4336,10 @@
               <a:buChar char="Ø"/>
             </a:pPr>
             <a:r>
-              <a:rPr lang="en-US" dirty="0"/>
-              <a:t>Analysis:</a:t>
+              <a:rPr lang="en-US" dirty="0">
+                <a:latin typeface="Rockwell" panose="02060603020205020403" pitchFamily="18" charset="0"/>
+              </a:rPr>
+              <a:t>Selection Criteria:</a:t>
             </a:r>
           </a:p>
           <a:p>
@@ -3872,16 +4348,10 @@
               <a:buChar char="Ø"/>
             </a:pPr>
             <a:r>
-              <a:rPr lang="en-US" dirty="0"/>
-              <a:t>7</a:t>
-            </a:r>
-            <a:r>
-              <a:rPr lang="en-US" baseline="30000" dirty="0"/>
-              <a:t>th</a:t>
-            </a:r>
-            <a:r>
-              <a:rPr lang="en-US" dirty="0"/>
-              <a:t> Highest Median Alcohol By Volume (ABV)</a:t>
+              <a:rPr lang="en-US" dirty="0">
+                <a:latin typeface="Rockwell" panose="02060603020205020403" pitchFamily="18" charset="0"/>
+              </a:rPr>
+              <a:t>In-state breweries: 8</a:t>
             </a:r>
           </a:p>
           <a:p>
@@ -3890,30 +4360,22 @@
               <a:buChar char="Ø"/>
             </a:pPr>
             <a:r>
-              <a:rPr lang="en-US" dirty="0"/>
-              <a:t>9</a:t>
-            </a:r>
-            <a:r>
-              <a:rPr lang="en-US" baseline="30000" dirty="0"/>
+              <a:rPr lang="en-US" dirty="0">
+                <a:latin typeface="Rockwell" panose="02060603020205020403" pitchFamily="18" charset="0"/>
+              </a:rPr>
+              <a:t>7</a:t>
+            </a:r>
+            <a:r>
+              <a:rPr lang="en-US" baseline="30000" dirty="0">
+                <a:latin typeface="Rockwell" panose="02060603020205020403" pitchFamily="18" charset="0"/>
+              </a:rPr>
               <a:t>th</a:t>
             </a:r>
             <a:r>
-              <a:rPr lang="en-US" dirty="0"/>
-              <a:t> Lowest Median International Bitterness Unit (IBU)</a:t>
-            </a:r>
-          </a:p>
-          <a:p>
-            <a:pPr lvl="2" algn="l"/>
-            <a:endParaRPr lang="en-US" dirty="0"/>
-          </a:p>
-          <a:p>
-            <a:pPr marL="800100" lvl="1" indent="-342900" algn="l">
-              <a:buFont typeface="Wingdings" panose="05000000000000000000" pitchFamily="2" charset="2"/>
-              <a:buChar char="Ø"/>
-            </a:pPr>
-            <a:r>
-              <a:rPr lang="en-US" dirty="0"/>
-              <a:t>Population:</a:t>
+              <a:rPr lang="en-US" dirty="0">
+                <a:latin typeface="Rockwell" panose="02060603020205020403" pitchFamily="18" charset="0"/>
+              </a:rPr>
+              <a:t> Highest Median Alcohol By Volume (ABV) – 0.06</a:t>
             </a:r>
           </a:p>
           <a:p>
@@ -3922,85 +4384,29 @@
               <a:buChar char="Ø"/>
             </a:pPr>
             <a:r>
-              <a:rPr lang="en-US" dirty="0" err="1"/>
-              <a:t>iGen</a:t>
-            </a:r>
-            <a:r>
-              <a:rPr lang="en-US" dirty="0"/>
-              <a:t>* (&gt;=21): 4.7%</a:t>
-            </a:r>
-          </a:p>
-          <a:p>
-            <a:pPr marL="1257300" lvl="2" indent="-342900" algn="l">
-              <a:buFont typeface="Wingdings" panose="05000000000000000000" pitchFamily="2" charset="2"/>
-              <a:buChar char="Ø"/>
-            </a:pPr>
-            <a:r>
-              <a:rPr lang="en-US" dirty="0" err="1"/>
-              <a:t>Millenials</a:t>
-            </a:r>
-            <a:r>
-              <a:rPr lang="en-US" dirty="0"/>
-              <a:t>: 18.2% </a:t>
-            </a:r>
-          </a:p>
-          <a:p>
-            <a:pPr marL="1257300" lvl="2" indent="-342900" algn="l">
-              <a:buFont typeface="Wingdings" panose="05000000000000000000" pitchFamily="2" charset="2"/>
-              <a:buChar char="Ø"/>
-            </a:pPr>
-            <a:r>
-              <a:rPr lang="en-US" dirty="0" err="1"/>
-              <a:t>GenX</a:t>
-            </a:r>
-            <a:r>
-              <a:rPr lang="en-US" dirty="0"/>
-              <a:t>: 23.9%</a:t>
-            </a:r>
-          </a:p>
-          <a:p>
-            <a:pPr marL="1257300" lvl="2" indent="-342900" algn="l">
-              <a:buFont typeface="Wingdings" panose="05000000000000000000" pitchFamily="2" charset="2"/>
-              <a:buChar char="Ø"/>
-            </a:pPr>
-            <a:r>
-              <a:rPr lang="en-US" dirty="0"/>
-              <a:t>Boomers: 19.9%</a:t>
-            </a:r>
-          </a:p>
-          <a:p>
-            <a:pPr marL="2171700" lvl="4" indent="-342900" algn="l">
-              <a:buFont typeface="Wingdings" panose="05000000000000000000" pitchFamily="2" charset="2"/>
-              <a:buChar char="Ø"/>
-            </a:pPr>
-            <a:endParaRPr lang="en-US" dirty="0"/>
-          </a:p>
-          <a:p>
-            <a:pPr marL="1714500" lvl="3" indent="-342900" algn="l">
-              <a:buFont typeface="Wingdings" panose="05000000000000000000" pitchFamily="2" charset="2"/>
-              <a:buChar char="Ø"/>
-            </a:pPr>
-            <a:endParaRPr lang="en-US" dirty="0"/>
-          </a:p>
-          <a:p>
-            <a:pPr marL="1257300" lvl="2" indent="-342900" algn="l">
-              <a:buFont typeface="Wingdings" panose="05000000000000000000" pitchFamily="2" charset="2"/>
-              <a:buChar char="Ø"/>
-            </a:pPr>
-            <a:endParaRPr lang="en-US" dirty="0"/>
-          </a:p>
-          <a:p>
-            <a:pPr marL="1257300" lvl="2" indent="-342900" algn="l">
-              <a:buFont typeface="Wingdings" panose="05000000000000000000" pitchFamily="2" charset="2"/>
-              <a:buChar char="Ø"/>
-            </a:pPr>
-            <a:endParaRPr lang="en-US" dirty="0"/>
-          </a:p>
-          <a:p>
-            <a:endParaRPr lang="en-US" dirty="0"/>
-          </a:p>
-          <a:p>
-            <a:endParaRPr lang="en-US" dirty="0"/>
+              <a:rPr lang="en-US" dirty="0">
+                <a:latin typeface="Rockwell" panose="02060603020205020403" pitchFamily="18" charset="0"/>
+              </a:rPr>
+              <a:t>9</a:t>
+            </a:r>
+            <a:r>
+              <a:rPr lang="en-US" baseline="30000" dirty="0">
+                <a:latin typeface="Rockwell" panose="02060603020205020403" pitchFamily="18" charset="0"/>
+              </a:rPr>
+              <a:t>th</a:t>
+            </a:r>
+            <a:r>
+              <a:rPr lang="en-US" dirty="0">
+                <a:latin typeface="Rockwell" panose="02060603020205020403" pitchFamily="18" charset="0"/>
+              </a:rPr>
+              <a:t> Lowest Median International Bitterness Unit (IBU) – 29.0</a:t>
+            </a:r>
+          </a:p>
+          <a:p>
+            <a:pPr lvl="2" algn="l"/>
+            <a:endParaRPr lang="en-US" dirty="0">
+              <a:latin typeface="Rockwell" panose="02060603020205020403" pitchFamily="18" charset="0"/>
+            </a:endParaRPr>
           </a:p>
         </p:txBody>
       </p:sp>
@@ -4039,10 +4445,123 @@
           </a:prstGeom>
         </p:spPr>
       </p:pic>
+      <p:pic>
+        <p:nvPicPr>
+          <p:cNvPr id="6" name="Picture 5">
+            <a:extLst>
+              <a:ext uri="{FF2B5EF4-FFF2-40B4-BE49-F238E27FC236}">
+                <a16:creationId xmlns:a16="http://schemas.microsoft.com/office/drawing/2014/main" id="{DED98BCD-8F4B-4C30-942B-73348C489C0F}"/>
+              </a:ext>
+            </a:extLst>
+          </p:cNvPr>
+          <p:cNvPicPr>
+            <a:picLocks noChangeAspect="1"/>
+          </p:cNvPicPr>
+          <p:nvPr/>
+        </p:nvPicPr>
+        <p:blipFill>
+          <a:blip r:embed="rId3">
+            <a:extLst>
+              <a:ext uri="{28A0092B-C50C-407E-A947-70E740481C1C}">
+                <a14:useLocalDpi xmlns:a14="http://schemas.microsoft.com/office/drawing/2010/main" val="0"/>
+              </a:ext>
+            </a:extLst>
+          </a:blip>
+          <a:stretch>
+            <a:fillRect/>
+          </a:stretch>
+        </p:blipFill>
+        <p:spPr>
+          <a:xfrm>
+            <a:off x="313168" y="3490913"/>
+            <a:ext cx="1079796" cy="1623017"/>
+          </a:xfrm>
+          <a:prstGeom prst="rect">
+            <a:avLst/>
+          </a:prstGeom>
+        </p:spPr>
+      </p:pic>
+      <p:sp>
+        <p:nvSpPr>
+          <p:cNvPr id="7" name="TextBox 6">
+            <a:extLst>
+              <a:ext uri="{FF2B5EF4-FFF2-40B4-BE49-F238E27FC236}">
+                <a16:creationId xmlns:a16="http://schemas.microsoft.com/office/drawing/2014/main" id="{1363F1D6-102D-4178-956D-44E1784F39E8}"/>
+              </a:ext>
+            </a:extLst>
+          </p:cNvPr>
+          <p:cNvSpPr txBox="1"/>
+          <p:nvPr/>
+        </p:nvSpPr>
+        <p:spPr>
+          <a:xfrm>
+            <a:off x="208547" y="5113930"/>
+            <a:ext cx="1259305" cy="369332"/>
+          </a:xfrm>
+          <a:prstGeom prst="rect">
+            <a:avLst/>
+          </a:prstGeom>
+          <a:noFill/>
+        </p:spPr>
+        <p:txBody>
+          <a:bodyPr wrap="square" rtlCol="0">
+            <a:spAutoFit/>
+          </a:bodyPr>
+          <a:lstStyle/>
+          <a:p>
+            <a:pPr algn="ctr"/>
+            <a:r>
+              <a:rPr lang="en-US" b="1" dirty="0">
+                <a:solidFill>
+                  <a:schemeClr val="bg1"/>
+                </a:solidFill>
+                <a:latin typeface="Bradley Hand ITC" panose="03070402050302030203" pitchFamily="66" charset="0"/>
+              </a:rPr>
+              <a:t>PICASSO</a:t>
+            </a:r>
+          </a:p>
+        </p:txBody>
+      </p:sp>
+      <p:pic>
+        <p:nvPicPr>
+          <p:cNvPr id="10" name="Picture 9">
+            <a:extLst>
+              <a:ext uri="{FF2B5EF4-FFF2-40B4-BE49-F238E27FC236}">
+                <a16:creationId xmlns:a16="http://schemas.microsoft.com/office/drawing/2014/main" id="{77EB250B-3CEE-432D-95C0-E4A34572A55F}"/>
+              </a:ext>
+            </a:extLst>
+          </p:cNvPr>
+          <p:cNvPicPr>
+            <a:picLocks noChangeAspect="1"/>
+          </p:cNvPicPr>
+          <p:nvPr/>
+        </p:nvPicPr>
+        <p:blipFill>
+          <a:blip r:embed="rId4">
+            <a:extLst>
+              <a:ext uri="{28A0092B-C50C-407E-A947-70E740481C1C}">
+                <a14:useLocalDpi xmlns:a14="http://schemas.microsoft.com/office/drawing/2010/main" val="0"/>
+              </a:ext>
+            </a:extLst>
+          </a:blip>
+          <a:stretch>
+            <a:fillRect/>
+          </a:stretch>
+        </p:blipFill>
+        <p:spPr>
+          <a:xfrm>
+            <a:off x="3329880" y="3429000"/>
+            <a:ext cx="6151004" cy="3181794"/>
+          </a:xfrm>
+          <a:prstGeom prst="rect">
+            <a:avLst/>
+          </a:prstGeom>
+        </p:spPr>
+      </p:pic>
     </p:spTree>
     <p:extLst>
       <p:ext uri="{BB962C8B-B14F-4D97-AF65-F5344CB8AC3E}">
-        <p14:creationId xmlns:p14="http://schemas.microsoft.com/office/powerpoint/2010/main" val="1303549122"/>
+        <p14:creationId xmlns:p14="http://schemas.microsoft.com/office/powerpoint/2010/main" val="648124802"/>
       </p:ext>
     </p:extLst>
   </p:cSld>
@@ -4087,7 +4606,7 @@
         </p:nvSpPr>
         <p:spPr>
           <a:xfrm>
-            <a:off x="1990725" y="619125"/>
+            <a:off x="1990724" y="571500"/>
             <a:ext cx="9601200" cy="581025"/>
           </a:xfrm>
         </p:spPr>
@@ -4098,8 +4617,10 @@
           <a:lstStyle/>
           <a:p>
             <a:r>
-              <a:rPr lang="en-US" sz="4000" b="1" dirty="0"/>
-              <a:t>Initial Test Market</a:t>
+              <a:rPr lang="en-US" sz="4000" b="1" dirty="0">
+                <a:latin typeface="Rockwell" panose="02060603020205020403" pitchFamily="18" charset="0"/>
+              </a:rPr>
+              <a:t>INITIAL TEST MARKET</a:t>
             </a:r>
           </a:p>
         </p:txBody>
@@ -4142,139 +4663,23 @@
               <a:buChar char="Ø"/>
             </a:pPr>
             <a:r>
-              <a:rPr lang="en-US" dirty="0"/>
-              <a:t>Connecticut</a:t>
-            </a:r>
-          </a:p>
-          <a:p>
-            <a:pPr marL="800100" lvl="1" indent="-342900" algn="l">
-              <a:buFont typeface="Wingdings" panose="05000000000000000000" pitchFamily="2" charset="2"/>
-              <a:buChar char="Ø"/>
-            </a:pPr>
-            <a:r>
-              <a:rPr lang="en-US" dirty="0"/>
-              <a:t>Location for Brewery: New Haven</a:t>
-            </a:r>
-          </a:p>
-          <a:p>
-            <a:pPr marL="1714500" lvl="3" indent="-342900" algn="l">
-              <a:buFont typeface="Wingdings" panose="05000000000000000000" pitchFamily="2" charset="2"/>
-              <a:buChar char="Ø"/>
-            </a:pPr>
-            <a:r>
-              <a:rPr lang="en-US" dirty="0"/>
-              <a:t>Second largest city (</a:t>
-            </a:r>
-            <a:r>
               <a:rPr lang="en-US" dirty="0">
-                <a:hlinkClick r:id="rId2"/>
+                <a:latin typeface="Rockwell" panose="02060603020205020403" pitchFamily="18" charset="0"/>
               </a:rPr>
-              <a:t>https://en.wikipedia.org/wiki/List_of_cities_in_Connecticut</a:t>
-            </a:r>
-            <a:r>
-              <a:rPr lang="en-US" dirty="0"/>
-              <a:t>)</a:t>
-            </a:r>
-          </a:p>
-          <a:p>
-            <a:pPr marL="1714500" lvl="3" indent="-342900" algn="l">
-              <a:buFont typeface="Wingdings" panose="05000000000000000000" pitchFamily="2" charset="2"/>
-              <a:buChar char="Ø"/>
-            </a:pPr>
-            <a:r>
-              <a:rPr lang="en-US" dirty="0"/>
-              <a:t>Population: ~130,000</a:t>
-            </a:r>
-          </a:p>
-          <a:p>
-            <a:pPr marL="1714500" lvl="3" indent="-342900" algn="l">
-              <a:buFont typeface="Wingdings" panose="05000000000000000000" pitchFamily="2" charset="2"/>
-              <a:buChar char="Ø"/>
-            </a:pPr>
-            <a:r>
-              <a:rPr lang="en-US" dirty="0"/>
-              <a:t>Universities: (</a:t>
-            </a:r>
-            <a:r>
-              <a:rPr lang="en-US" dirty="0">
-                <a:hlinkClick r:id="rId3"/>
+              <a:t>Connecticut Drinking Age Population</a:t>
+            </a:r>
+            <a:r>
+              <a:rPr lang="en-US" baseline="30000" dirty="0">
+                <a:latin typeface="Rockwell" panose="02060603020205020403" pitchFamily="18" charset="0"/>
               </a:rPr>
-              <a:t>https://en.wikipedia.org/wiki/List_of_colleges_and_universities_in_Connecticut</a:t>
-            </a:r>
-            <a:r>
-              <a:rPr lang="en-US" dirty="0"/>
-              <a:t>)</a:t>
-            </a:r>
-          </a:p>
-          <a:p>
-            <a:pPr marL="2171700" lvl="4" indent="-342900" algn="l">
-              <a:buFont typeface="Wingdings" panose="05000000000000000000" pitchFamily="2" charset="2"/>
-              <a:buChar char="Ø"/>
-            </a:pPr>
-            <a:r>
-              <a:rPr lang="en-US" dirty="0"/>
-              <a:t>Yale</a:t>
-            </a:r>
-          </a:p>
-          <a:p>
-            <a:pPr marL="2171700" lvl="4" indent="-342900" algn="l">
-              <a:buFont typeface="Wingdings" panose="05000000000000000000" pitchFamily="2" charset="2"/>
-              <a:buChar char="Ø"/>
-            </a:pPr>
-            <a:r>
-              <a:rPr lang="en-US" dirty="0"/>
-              <a:t>Albertus Magnus College</a:t>
-            </a:r>
-          </a:p>
-          <a:p>
-            <a:pPr marL="2171700" lvl="4" indent="-342900" algn="l">
-              <a:buFont typeface="Wingdings" panose="05000000000000000000" pitchFamily="2" charset="2"/>
-              <a:buChar char="Ø"/>
-            </a:pPr>
-            <a:r>
-              <a:rPr lang="en-US" dirty="0"/>
-              <a:t>Southern Connecticut State University</a:t>
-            </a:r>
-          </a:p>
-          <a:p>
-            <a:pPr marL="1714500" lvl="3" indent="-342900" algn="l">
-              <a:buFont typeface="Wingdings" panose="05000000000000000000" pitchFamily="2" charset="2"/>
-              <a:buChar char="Ø"/>
-            </a:pPr>
-            <a:endParaRPr lang="en-US" dirty="0"/>
-          </a:p>
-          <a:p>
-            <a:pPr marL="2171700" lvl="4" indent="-342900" algn="l">
-              <a:buFont typeface="Wingdings" panose="05000000000000000000" pitchFamily="2" charset="2"/>
-              <a:buChar char="Ø"/>
-            </a:pPr>
-            <a:endParaRPr lang="en-US" dirty="0"/>
-          </a:p>
-          <a:p>
-            <a:pPr marL="1714500" lvl="3" indent="-342900" algn="l">
-              <a:buFont typeface="Wingdings" panose="05000000000000000000" pitchFamily="2" charset="2"/>
-              <a:buChar char="Ø"/>
-            </a:pPr>
-            <a:endParaRPr lang="en-US" dirty="0"/>
+              <a:t>1</a:t>
+            </a:r>
           </a:p>
           <a:p>
             <a:pPr marL="1257300" lvl="2" indent="-342900" algn="l">
               <a:buFont typeface="Wingdings" panose="05000000000000000000" pitchFamily="2" charset="2"/>
               <a:buChar char="Ø"/>
             </a:pPr>
-            <a:endParaRPr lang="en-US" dirty="0"/>
-          </a:p>
-          <a:p>
-            <a:pPr marL="1257300" lvl="2" indent="-342900" algn="l">
-              <a:buFont typeface="Wingdings" panose="05000000000000000000" pitchFamily="2" charset="2"/>
-              <a:buChar char="Ø"/>
-            </a:pPr>
-            <a:endParaRPr lang="en-US" dirty="0"/>
-          </a:p>
-          <a:p>
-            <a:endParaRPr lang="en-US" dirty="0"/>
-          </a:p>
-          <a:p>
             <a:endParaRPr lang="en-US" dirty="0"/>
           </a:p>
         </p:txBody>
@@ -4294,7 +4699,7 @@
           <p:nvPr/>
         </p:nvPicPr>
         <p:blipFill rotWithShape="1">
-          <a:blip r:embed="rId4">
+          <a:blip r:embed="rId2">
             <a:extLst>
               <a:ext uri="{28A0092B-C50C-407E-A947-70E740481C1C}">
                 <a14:useLocalDpi xmlns:a14="http://schemas.microsoft.com/office/drawing/2010/main" val="0"/>
@@ -4314,10 +4719,422 @@
           </a:prstGeom>
         </p:spPr>
       </p:pic>
+      <p:pic>
+        <p:nvPicPr>
+          <p:cNvPr id="6" name="Picture 5">
+            <a:extLst>
+              <a:ext uri="{FF2B5EF4-FFF2-40B4-BE49-F238E27FC236}">
+                <a16:creationId xmlns:a16="http://schemas.microsoft.com/office/drawing/2014/main" id="{DED98BCD-8F4B-4C30-942B-73348C489C0F}"/>
+              </a:ext>
+            </a:extLst>
+          </p:cNvPr>
+          <p:cNvPicPr>
+            <a:picLocks noChangeAspect="1"/>
+          </p:cNvPicPr>
+          <p:nvPr/>
+        </p:nvPicPr>
+        <p:blipFill>
+          <a:blip r:embed="rId3">
+            <a:extLst>
+              <a:ext uri="{28A0092B-C50C-407E-A947-70E740481C1C}">
+                <a14:useLocalDpi xmlns:a14="http://schemas.microsoft.com/office/drawing/2010/main" val="0"/>
+              </a:ext>
+            </a:extLst>
+          </a:blip>
+          <a:stretch>
+            <a:fillRect/>
+          </a:stretch>
+        </p:blipFill>
+        <p:spPr>
+          <a:xfrm>
+            <a:off x="313168" y="3490913"/>
+            <a:ext cx="1079796" cy="1623017"/>
+          </a:xfrm>
+          <a:prstGeom prst="rect">
+            <a:avLst/>
+          </a:prstGeom>
+        </p:spPr>
+      </p:pic>
+      <p:sp>
+        <p:nvSpPr>
+          <p:cNvPr id="7" name="TextBox 6">
+            <a:extLst>
+              <a:ext uri="{FF2B5EF4-FFF2-40B4-BE49-F238E27FC236}">
+                <a16:creationId xmlns:a16="http://schemas.microsoft.com/office/drawing/2014/main" id="{1363F1D6-102D-4178-956D-44E1784F39E8}"/>
+              </a:ext>
+            </a:extLst>
+          </p:cNvPr>
+          <p:cNvSpPr txBox="1"/>
+          <p:nvPr/>
+        </p:nvSpPr>
+        <p:spPr>
+          <a:xfrm>
+            <a:off x="208547" y="5113930"/>
+            <a:ext cx="1259305" cy="369332"/>
+          </a:xfrm>
+          <a:prstGeom prst="rect">
+            <a:avLst/>
+          </a:prstGeom>
+          <a:noFill/>
+        </p:spPr>
+        <p:txBody>
+          <a:bodyPr wrap="square" rtlCol="0">
+            <a:spAutoFit/>
+          </a:bodyPr>
+          <a:lstStyle/>
+          <a:p>
+            <a:pPr algn="ctr"/>
+            <a:r>
+              <a:rPr lang="en-US" b="1" dirty="0">
+                <a:solidFill>
+                  <a:schemeClr val="bg1"/>
+                </a:solidFill>
+                <a:latin typeface="Bradley Hand ITC" panose="03070402050302030203" pitchFamily="66" charset="0"/>
+              </a:rPr>
+              <a:t>PICASSO</a:t>
+            </a:r>
+          </a:p>
+        </p:txBody>
+      </p:sp>
+      <p:graphicFrame>
+        <p:nvGraphicFramePr>
+          <p:cNvPr id="4" name="Table 3">
+            <a:extLst>
+              <a:ext uri="{FF2B5EF4-FFF2-40B4-BE49-F238E27FC236}">
+                <a16:creationId xmlns:a16="http://schemas.microsoft.com/office/drawing/2014/main" id="{F2C235D4-4C1C-4955-ADE7-2F458D51E874}"/>
+              </a:ext>
+            </a:extLst>
+          </p:cNvPr>
+          <p:cNvGraphicFramePr>
+            <a:graphicFrameLocks noGrp="1"/>
+          </p:cNvGraphicFramePr>
+          <p:nvPr>
+            <p:extLst>
+              <p:ext uri="{D42A27DB-BD31-4B8C-83A1-F6EECF244321}">
+                <p14:modId xmlns:p14="http://schemas.microsoft.com/office/powerpoint/2010/main" val="947193844"/>
+              </p:ext>
+            </p:extLst>
+          </p:nvPr>
+        </p:nvGraphicFramePr>
+        <p:xfrm>
+          <a:off x="2457115" y="2131371"/>
+          <a:ext cx="8660064" cy="1884770"/>
+        </p:xfrm>
+        <a:graphic>
+          <a:graphicData uri="http://schemas.openxmlformats.org/drawingml/2006/table">
+            <a:tbl>
+              <a:tblPr firstRow="1" bandRow="1">
+                <a:tableStyleId>{5C22544A-7EE6-4342-B048-85BDC9FD1C3A}</a:tableStyleId>
+              </a:tblPr>
+              <a:tblGrid>
+                <a:gridCol w="2886688">
+                  <a:extLst>
+                    <a:ext uri="{9D8B030D-6E8A-4147-A177-3AD203B41FA5}">
+                      <a16:colId xmlns:a16="http://schemas.microsoft.com/office/drawing/2014/main" val="1282836405"/>
+                    </a:ext>
+                  </a:extLst>
+                </a:gridCol>
+                <a:gridCol w="2886688">
+                  <a:extLst>
+                    <a:ext uri="{9D8B030D-6E8A-4147-A177-3AD203B41FA5}">
+                      <a16:colId xmlns:a16="http://schemas.microsoft.com/office/drawing/2014/main" val="1688657844"/>
+                    </a:ext>
+                  </a:extLst>
+                </a:gridCol>
+                <a:gridCol w="2886688">
+                  <a:extLst>
+                    <a:ext uri="{9D8B030D-6E8A-4147-A177-3AD203B41FA5}">
+                      <a16:colId xmlns:a16="http://schemas.microsoft.com/office/drawing/2014/main" val="264761383"/>
+                    </a:ext>
+                  </a:extLst>
+                </a:gridCol>
+              </a:tblGrid>
+              <a:tr h="370840">
+                <a:tc>
+                  <a:txBody>
+                    <a:bodyPr/>
+                    <a:lstStyle/>
+                    <a:p>
+                      <a:pPr algn="ctr"/>
+                      <a:r>
+                        <a:rPr lang="en-US" dirty="0"/>
+                        <a:t>Generation</a:t>
+                      </a:r>
+                    </a:p>
+                  </a:txBody>
+                  <a:tcPr/>
+                </a:tc>
+                <a:tc>
+                  <a:txBody>
+                    <a:bodyPr/>
+                    <a:lstStyle/>
+                    <a:p>
+                      <a:pPr algn="ctr"/>
+                      <a:r>
+                        <a:rPr lang="en-US" dirty="0"/>
+                        <a:t>Percentage</a:t>
+                      </a:r>
+                    </a:p>
+                  </a:txBody>
+                  <a:tcPr/>
+                </a:tc>
+                <a:tc>
+                  <a:txBody>
+                    <a:bodyPr/>
+                    <a:lstStyle/>
+                    <a:p>
+                      <a:pPr algn="ctr"/>
+                      <a:r>
+                        <a:rPr lang="en-US" dirty="0"/>
+                        <a:t>Count</a:t>
+                      </a:r>
+                    </a:p>
+                  </a:txBody>
+                  <a:tcPr/>
+                </a:tc>
+                <a:extLst>
+                  <a:ext uri="{0D108BD9-81ED-4DB2-BD59-A6C34878D82A}">
+                    <a16:rowId xmlns:a16="http://schemas.microsoft.com/office/drawing/2014/main" val="1346213538"/>
+                  </a:ext>
+                </a:extLst>
+              </a:tr>
+              <a:tr h="401410">
+                <a:tc>
+                  <a:txBody>
+                    <a:bodyPr/>
+                    <a:lstStyle/>
+                    <a:p>
+                      <a:pPr algn="ctr"/>
+                      <a:r>
+                        <a:rPr lang="en-US" dirty="0" err="1">
+                          <a:latin typeface="Rockwell" panose="02060603020205020403" pitchFamily="18" charset="0"/>
+                        </a:rPr>
+                        <a:t>iGen</a:t>
+                      </a:r>
+                      <a:r>
+                        <a:rPr lang="en-US" dirty="0">
+                          <a:latin typeface="Rockwell" panose="02060603020205020403" pitchFamily="18" charset="0"/>
+                        </a:rPr>
+                        <a:t>* (&gt;=21)</a:t>
+                      </a:r>
+                      <a:endParaRPr lang="en-US" dirty="0"/>
+                    </a:p>
+                  </a:txBody>
+                  <a:tcPr/>
+                </a:tc>
+                <a:tc>
+                  <a:txBody>
+                    <a:bodyPr/>
+                    <a:lstStyle/>
+                    <a:p>
+                      <a:pPr algn="ctr"/>
+                      <a:r>
+                        <a:rPr lang="en-US" dirty="0">
+                          <a:latin typeface="Rockwell" panose="02060603020205020403" pitchFamily="18" charset="0"/>
+                        </a:rPr>
+                        <a:t>4.7%</a:t>
+                      </a:r>
+                      <a:endParaRPr lang="en-US" dirty="0"/>
+                    </a:p>
+                  </a:txBody>
+                  <a:tcPr/>
+                </a:tc>
+                <a:tc>
+                  <a:txBody>
+                    <a:bodyPr/>
+                    <a:lstStyle/>
+                    <a:p>
+                      <a:pPr algn="ctr"/>
+                      <a:r>
+                        <a:rPr lang="en-US" dirty="0">
+                          <a:latin typeface="Rockwell" panose="02060603020205020403" pitchFamily="18" charset="0"/>
+                        </a:rPr>
+                        <a:t>~160,000</a:t>
+                      </a:r>
+                      <a:endParaRPr lang="en-US" dirty="0"/>
+                    </a:p>
+                  </a:txBody>
+                  <a:tcPr/>
+                </a:tc>
+                <a:extLst>
+                  <a:ext uri="{0D108BD9-81ED-4DB2-BD59-A6C34878D82A}">
+                    <a16:rowId xmlns:a16="http://schemas.microsoft.com/office/drawing/2014/main" val="1042802785"/>
+                  </a:ext>
+                </a:extLst>
+              </a:tr>
+              <a:tr h="370840">
+                <a:tc>
+                  <a:txBody>
+                    <a:bodyPr/>
+                    <a:lstStyle/>
+                    <a:p>
+                      <a:pPr algn="ctr"/>
+                      <a:r>
+                        <a:rPr lang="en-US" dirty="0" err="1">
+                          <a:latin typeface="Rockwell" panose="02060603020205020403" pitchFamily="18" charset="0"/>
+                        </a:rPr>
+                        <a:t>Millenials</a:t>
+                      </a:r>
+                      <a:endParaRPr lang="en-US" dirty="0"/>
+                    </a:p>
+                  </a:txBody>
+                  <a:tcPr/>
+                </a:tc>
+                <a:tc>
+                  <a:txBody>
+                    <a:bodyPr/>
+                    <a:lstStyle/>
+                    <a:p>
+                      <a:pPr algn="ctr"/>
+                      <a:r>
+                        <a:rPr lang="en-US" dirty="0">
+                          <a:latin typeface="Rockwell" panose="02060603020205020403" pitchFamily="18" charset="0"/>
+                        </a:rPr>
+                        <a:t>18.2%</a:t>
+                      </a:r>
+                      <a:endParaRPr lang="en-US" dirty="0"/>
+                    </a:p>
+                  </a:txBody>
+                  <a:tcPr/>
+                </a:tc>
+                <a:tc>
+                  <a:txBody>
+                    <a:bodyPr/>
+                    <a:lstStyle/>
+                    <a:p>
+                      <a:pPr algn="ctr"/>
+                      <a:r>
+                        <a:rPr lang="en-US" dirty="0">
+                          <a:latin typeface="Rockwell" panose="02060603020205020403" pitchFamily="18" charset="0"/>
+                        </a:rPr>
+                        <a:t>~630,000</a:t>
+                      </a:r>
+                      <a:endParaRPr lang="en-US" dirty="0"/>
+                    </a:p>
+                  </a:txBody>
+                  <a:tcPr/>
+                </a:tc>
+                <a:extLst>
+                  <a:ext uri="{0D108BD9-81ED-4DB2-BD59-A6C34878D82A}">
+                    <a16:rowId xmlns:a16="http://schemas.microsoft.com/office/drawing/2014/main" val="228945041"/>
+                  </a:ext>
+                </a:extLst>
+              </a:tr>
+              <a:tr h="370840">
+                <a:tc>
+                  <a:txBody>
+                    <a:bodyPr/>
+                    <a:lstStyle/>
+                    <a:p>
+                      <a:pPr algn="ctr"/>
+                      <a:r>
+                        <a:rPr lang="en-US" dirty="0" err="1">
+                          <a:latin typeface="Rockwell" panose="02060603020205020403" pitchFamily="18" charset="0"/>
+                        </a:rPr>
+                        <a:t>GenX</a:t>
+                      </a:r>
+                      <a:endParaRPr lang="en-US" dirty="0"/>
+                    </a:p>
+                  </a:txBody>
+                  <a:tcPr/>
+                </a:tc>
+                <a:tc>
+                  <a:txBody>
+                    <a:bodyPr/>
+                    <a:lstStyle/>
+                    <a:p>
+                      <a:pPr algn="ctr"/>
+                      <a:r>
+                        <a:rPr lang="en-US" dirty="0">
+                          <a:latin typeface="Rockwell" panose="02060603020205020403" pitchFamily="18" charset="0"/>
+                        </a:rPr>
+                        <a:t>23.9%</a:t>
+                      </a:r>
+                      <a:endParaRPr lang="en-US" dirty="0"/>
+                    </a:p>
+                  </a:txBody>
+                  <a:tcPr/>
+                </a:tc>
+                <a:tc>
+                  <a:txBody>
+                    <a:bodyPr/>
+                    <a:lstStyle/>
+                    <a:p>
+                      <a:pPr algn="ctr"/>
+                      <a:r>
+                        <a:rPr lang="en-US" dirty="0"/>
+                        <a:t>~825,000</a:t>
+                      </a:r>
+                    </a:p>
+                  </a:txBody>
+                  <a:tcPr/>
+                </a:tc>
+                <a:extLst>
+                  <a:ext uri="{0D108BD9-81ED-4DB2-BD59-A6C34878D82A}">
+                    <a16:rowId xmlns:a16="http://schemas.microsoft.com/office/drawing/2014/main" val="3343382186"/>
+                  </a:ext>
+                </a:extLst>
+              </a:tr>
+              <a:tr h="370840">
+                <a:tc>
+                  <a:txBody>
+                    <a:bodyPr/>
+                    <a:lstStyle/>
+                    <a:p>
+                      <a:pPr algn="ctr"/>
+                      <a:r>
+                        <a:rPr lang="en-US" dirty="0">
+                          <a:latin typeface="Rockwell" panose="02060603020205020403" pitchFamily="18" charset="0"/>
+                        </a:rPr>
+                        <a:t>Boomers</a:t>
+                      </a:r>
+                      <a:endParaRPr lang="en-US" dirty="0"/>
+                    </a:p>
+                  </a:txBody>
+                  <a:tcPr/>
+                </a:tc>
+                <a:tc>
+                  <a:txBody>
+                    <a:bodyPr/>
+                    <a:lstStyle/>
+                    <a:p>
+                      <a:pPr algn="ctr"/>
+                      <a:r>
+                        <a:rPr lang="en-US" dirty="0"/>
+                        <a:t>19.9%</a:t>
+                      </a:r>
+                    </a:p>
+                  </a:txBody>
+                  <a:tcPr/>
+                </a:tc>
+                <a:tc>
+                  <a:txBody>
+                    <a:bodyPr/>
+                    <a:lstStyle/>
+                    <a:p>
+                      <a:pPr algn="ctr"/>
+                      <a:r>
+                        <a:rPr lang="en-US" dirty="0"/>
+                        <a:t>~690,000</a:t>
+                      </a:r>
+                    </a:p>
+                  </a:txBody>
+                  <a:tcPr/>
+                </a:tc>
+                <a:extLst>
+                  <a:ext uri="{0D108BD9-81ED-4DB2-BD59-A6C34878D82A}">
+                    <a16:rowId xmlns:a16="http://schemas.microsoft.com/office/drawing/2014/main" val="3829317716"/>
+                  </a:ext>
+                </a:extLst>
+              </a:tr>
+            </a:tbl>
+          </a:graphicData>
+        </a:graphic>
+      </p:graphicFrame>
     </p:spTree>
     <p:extLst>
       <p:ext uri="{BB962C8B-B14F-4D97-AF65-F5344CB8AC3E}">
-        <p14:creationId xmlns:p14="http://schemas.microsoft.com/office/powerpoint/2010/main" val="402921285"/>
+        <p14:creationId xmlns:p14="http://schemas.microsoft.com/office/powerpoint/2010/main" val="1303549122"/>
       </p:ext>
     </p:extLst>
   </p:cSld>
@@ -4346,41 +5163,6 @@
       </p:grpSpPr>
       <p:sp>
         <p:nvSpPr>
-          <p:cNvPr id="2" name="Title 1">
-            <a:extLst>
-              <a:ext uri="{FF2B5EF4-FFF2-40B4-BE49-F238E27FC236}">
-                <a16:creationId xmlns:a16="http://schemas.microsoft.com/office/drawing/2014/main" id="{E7EB5BA5-87DD-41AA-B3B4-81DBDF2F9AF4}"/>
-              </a:ext>
-            </a:extLst>
-          </p:cNvPr>
-          <p:cNvSpPr>
-            <a:spLocks noGrp="1"/>
-          </p:cNvSpPr>
-          <p:nvPr>
-            <p:ph type="ctrTitle"/>
-          </p:nvPr>
-        </p:nvSpPr>
-        <p:spPr>
-          <a:xfrm>
-            <a:off x="1990724" y="571500"/>
-            <a:ext cx="9601200" cy="581025"/>
-          </a:xfrm>
-        </p:spPr>
-        <p:txBody>
-          <a:bodyPr>
-            <a:normAutofit fontScale="90000"/>
-          </a:bodyPr>
-          <a:lstStyle/>
-          <a:p>
-            <a:r>
-              <a:rPr lang="en-US" sz="4000" b="1" dirty="0"/>
-              <a:t>Expansion Test Markets</a:t>
-            </a:r>
-          </a:p>
-        </p:txBody>
-      </p:sp>
-      <p:sp>
-        <p:nvSpPr>
           <p:cNvPr id="3" name="Subtitle 2">
             <a:extLst>
               <a:ext uri="{FF2B5EF4-FFF2-40B4-BE49-F238E27FC236}">
@@ -4417,75 +5199,137 @@
               <a:buChar char="Ø"/>
             </a:pPr>
             <a:r>
-              <a:rPr lang="en-US" dirty="0"/>
-              <a:t>Maryland</a:t>
-            </a:r>
-          </a:p>
-          <a:p>
-            <a:pPr marL="800100" lvl="1" indent="-342900" algn="l">
+              <a:rPr lang="en-US" dirty="0">
+                <a:latin typeface="Rockwell" panose="02060603020205020403" pitchFamily="18" charset="0"/>
+              </a:rPr>
+              <a:t>Connecticut</a:t>
+            </a:r>
+          </a:p>
+          <a:p>
+            <a:pPr marL="690563" lvl="1" indent="-346075" algn="l">
               <a:buFont typeface="Wingdings" panose="05000000000000000000" pitchFamily="2" charset="2"/>
               <a:buChar char="Ø"/>
             </a:pPr>
             <a:r>
-              <a:rPr lang="en-US" dirty="0"/>
-              <a:t>Brewery Location: Baltimore</a:t>
-            </a:r>
-          </a:p>
-          <a:p>
-            <a:pPr marL="342900" indent="-342900" algn="l">
+              <a:rPr lang="en-US" dirty="0">
+                <a:latin typeface="Rockwell" panose="02060603020205020403" pitchFamily="18" charset="0"/>
+              </a:rPr>
+              <a:t>Location for Brewery: New Haven</a:t>
+            </a:r>
+          </a:p>
+          <a:p>
+            <a:pPr marL="690563" lvl="1" indent="-346075" algn="l">
               <a:buFont typeface="Wingdings" panose="05000000000000000000" pitchFamily="2" charset="2"/>
               <a:buChar char="Ø"/>
             </a:pPr>
             <a:r>
-              <a:rPr lang="en-US" dirty="0"/>
-              <a:t>Indiana / Illinois</a:t>
-            </a:r>
-          </a:p>
-          <a:p>
-            <a:pPr marL="800100" lvl="1" indent="-342900" algn="l">
+              <a:rPr lang="en-US" dirty="0">
+                <a:latin typeface="Rockwell" panose="02060603020205020403" pitchFamily="18" charset="0"/>
+              </a:rPr>
+              <a:t>Selection Criteria:</a:t>
+            </a:r>
+          </a:p>
+          <a:p>
+            <a:pPr marL="1027113" lvl="3" indent="-336550" algn="l">
               <a:buFont typeface="Wingdings" panose="05000000000000000000" pitchFamily="2" charset="2"/>
               <a:buChar char="Ø"/>
             </a:pPr>
             <a:r>
-              <a:rPr lang="en-US" dirty="0"/>
-              <a:t>Brewery Location: South Bend</a:t>
-            </a:r>
-          </a:p>
-          <a:p>
-            <a:pPr marL="1257300" lvl="2" indent="-342900" algn="l">
+              <a:rPr lang="en-US" dirty="0">
+                <a:latin typeface="Rockwell" panose="02060603020205020403" pitchFamily="18" charset="0"/>
+              </a:rPr>
+              <a:t>Second largest city</a:t>
+            </a:r>
+            <a:r>
+              <a:rPr lang="en-US" baseline="30000" dirty="0">
+                <a:latin typeface="Rockwell" panose="02060603020205020403" pitchFamily="18" charset="0"/>
+              </a:rPr>
+              <a:t>2</a:t>
+            </a:r>
+            <a:endParaRPr lang="en-US" dirty="0">
+              <a:latin typeface="Rockwell" panose="02060603020205020403" pitchFamily="18" charset="0"/>
+            </a:endParaRPr>
+          </a:p>
+          <a:p>
+            <a:pPr marL="1027113" lvl="3" indent="-336550" algn="l">
               <a:buFont typeface="Wingdings" panose="05000000000000000000" pitchFamily="2" charset="2"/>
               <a:buChar char="Ø"/>
             </a:pPr>
             <a:r>
-              <a:rPr lang="en-US" dirty="0"/>
-              <a:t>96 Miles from Chicago</a:t>
-            </a:r>
-          </a:p>
-          <a:p>
-            <a:pPr marL="1714500" lvl="3" indent="-342900" algn="l">
+              <a:rPr lang="en-US" dirty="0">
+                <a:latin typeface="Rockwell" panose="02060603020205020403" pitchFamily="18" charset="0"/>
+              </a:rPr>
+              <a:t>Population: ~130,000</a:t>
+            </a:r>
+          </a:p>
+          <a:p>
+            <a:pPr marL="1027113" lvl="3" indent="-336550" algn="l">
               <a:buFont typeface="Wingdings" panose="05000000000000000000" pitchFamily="2" charset="2"/>
               <a:buChar char="Ø"/>
             </a:pPr>
-            <a:endParaRPr lang="en-US" dirty="0"/>
-          </a:p>
-          <a:p>
-            <a:pPr marL="1257300" lvl="2" indent="-342900" algn="l">
+            <a:r>
+              <a:rPr lang="en-US" dirty="0">
+                <a:latin typeface="Rockwell" panose="02060603020205020403" pitchFamily="18" charset="0"/>
+              </a:rPr>
+              <a:t>Universities</a:t>
+            </a:r>
+            <a:r>
+              <a:rPr lang="en-US" baseline="30000" dirty="0">
+                <a:latin typeface="Rockwell" panose="02060603020205020403" pitchFamily="18" charset="0"/>
+              </a:rPr>
+              <a:t>3</a:t>
+            </a:r>
+            <a:endParaRPr lang="en-US" dirty="0">
+              <a:latin typeface="Rockwell" panose="02060603020205020403" pitchFamily="18" charset="0"/>
+            </a:endParaRPr>
+          </a:p>
+          <a:p>
+            <a:pPr marL="1371600" lvl="5" indent="-336550" algn="l">
               <a:buFont typeface="Wingdings" panose="05000000000000000000" pitchFamily="2" charset="2"/>
               <a:buChar char="Ø"/>
             </a:pPr>
-            <a:endParaRPr lang="en-US" dirty="0"/>
-          </a:p>
-          <a:p>
-            <a:pPr marL="1257300" lvl="2" indent="-342900" algn="l">
+            <a:r>
+              <a:rPr lang="en-US" dirty="0">
+                <a:latin typeface="Rockwell" panose="02060603020205020403" pitchFamily="18" charset="0"/>
+              </a:rPr>
+              <a:t>Yale</a:t>
+            </a:r>
+          </a:p>
+          <a:p>
+            <a:pPr marL="1371600" lvl="5" indent="-336550" algn="l">
               <a:buFont typeface="Wingdings" panose="05000000000000000000" pitchFamily="2" charset="2"/>
               <a:buChar char="Ø"/>
             </a:pPr>
-            <a:endParaRPr lang="en-US" dirty="0"/>
-          </a:p>
-          <a:p>
-            <a:endParaRPr lang="en-US" dirty="0"/>
-          </a:p>
-          <a:p>
+            <a:r>
+              <a:rPr lang="en-US" dirty="0">
+                <a:latin typeface="Rockwell" panose="02060603020205020403" pitchFamily="18" charset="0"/>
+              </a:rPr>
+              <a:t>Albertus Magnus College</a:t>
+            </a:r>
+          </a:p>
+          <a:p>
+            <a:pPr marL="1371600" lvl="5" indent="-336550" algn="l">
+              <a:buFont typeface="Wingdings" panose="05000000000000000000" pitchFamily="2" charset="2"/>
+              <a:buChar char="Ø"/>
+            </a:pPr>
+            <a:r>
+              <a:rPr lang="en-US" dirty="0">
+                <a:latin typeface="Rockwell" panose="02060603020205020403" pitchFamily="18" charset="0"/>
+              </a:rPr>
+              <a:t>Southern Connecticut State University</a:t>
+            </a:r>
+          </a:p>
+          <a:p>
+            <a:pPr marL="1027113" lvl="3" indent="-336550" algn="l">
+              <a:buFont typeface="Wingdings" panose="05000000000000000000" pitchFamily="2" charset="2"/>
+              <a:buChar char="Ø"/>
+            </a:pPr>
+            <a:r>
+              <a:rPr lang="en-US" dirty="0">
+                <a:latin typeface="Rockwell" panose="02060603020205020403" pitchFamily="18" charset="0"/>
+              </a:rPr>
+              <a:t>No Connecticut brewers are headquartered in New Haven</a:t>
+            </a:r>
             <a:endParaRPr lang="en-US" dirty="0"/>
           </a:p>
         </p:txBody>
@@ -4525,10 +5369,143 @@
           </a:prstGeom>
         </p:spPr>
       </p:pic>
+      <p:pic>
+        <p:nvPicPr>
+          <p:cNvPr id="6" name="Picture 5">
+            <a:extLst>
+              <a:ext uri="{FF2B5EF4-FFF2-40B4-BE49-F238E27FC236}">
+                <a16:creationId xmlns:a16="http://schemas.microsoft.com/office/drawing/2014/main" id="{86999E52-8D18-45D8-B13E-76BD1CC0B1EE}"/>
+              </a:ext>
+            </a:extLst>
+          </p:cNvPr>
+          <p:cNvPicPr>
+            <a:picLocks noChangeAspect="1"/>
+          </p:cNvPicPr>
+          <p:nvPr/>
+        </p:nvPicPr>
+        <p:blipFill>
+          <a:blip r:embed="rId3">
+            <a:extLst>
+              <a:ext uri="{28A0092B-C50C-407E-A947-70E740481C1C}">
+                <a14:useLocalDpi xmlns:a14="http://schemas.microsoft.com/office/drawing/2010/main" val="0"/>
+              </a:ext>
+            </a:extLst>
+          </a:blip>
+          <a:stretch>
+            <a:fillRect/>
+          </a:stretch>
+        </p:blipFill>
+        <p:spPr>
+          <a:xfrm>
+            <a:off x="313168" y="3490913"/>
+            <a:ext cx="1079796" cy="1623017"/>
+          </a:xfrm>
+          <a:prstGeom prst="rect">
+            <a:avLst/>
+          </a:prstGeom>
+        </p:spPr>
+      </p:pic>
+      <p:sp>
+        <p:nvSpPr>
+          <p:cNvPr id="9" name="Title 1">
+            <a:extLst>
+              <a:ext uri="{FF2B5EF4-FFF2-40B4-BE49-F238E27FC236}">
+                <a16:creationId xmlns:a16="http://schemas.microsoft.com/office/drawing/2014/main" id="{D6D5E054-862E-4467-A632-320E38AA589B}"/>
+              </a:ext>
+            </a:extLst>
+          </p:cNvPr>
+          <p:cNvSpPr txBox="1">
+            <a:spLocks/>
+          </p:cNvSpPr>
+          <p:nvPr/>
+        </p:nvSpPr>
+        <p:spPr>
+          <a:xfrm>
+            <a:off x="1990724" y="571500"/>
+            <a:ext cx="9601200" cy="581025"/>
+          </a:xfrm>
+          <a:prstGeom prst="rect">
+            <a:avLst/>
+          </a:prstGeom>
+        </p:spPr>
+        <p:txBody>
+          <a:bodyPr vert="horz" lIns="91440" tIns="45720" rIns="91440" bIns="45720" rtlCol="0" anchor="b">
+            <a:normAutofit fontScale="90000" lnSpcReduction="10000"/>
+          </a:bodyPr>
+          <a:lstStyle>
+            <a:lvl1pPr algn="ctr" defTabSz="914400" rtl="0" eaLnBrk="1" latinLnBrk="0" hangingPunct="1">
+              <a:lnSpc>
+                <a:spcPct val="90000"/>
+              </a:lnSpc>
+              <a:spcBef>
+                <a:spcPct val="0"/>
+              </a:spcBef>
+              <a:buNone/>
+              <a:defRPr sz="6000" kern="1200">
+                <a:solidFill>
+                  <a:schemeClr val="tx1"/>
+                </a:solidFill>
+                <a:latin typeface="+mj-lt"/>
+                <a:ea typeface="+mj-ea"/>
+                <a:cs typeface="+mj-cs"/>
+              </a:defRPr>
+            </a:lvl1pPr>
+          </a:lstStyle>
+          <a:p>
+            <a:r>
+              <a:rPr lang="en-US" sz="4000" b="1" cap="all" dirty="0">
+                <a:latin typeface="Rockwell" panose="02060603020205020403" pitchFamily="18" charset="0"/>
+              </a:rPr>
+              <a:t>Initial Test Market</a:t>
+            </a:r>
+          </a:p>
+        </p:txBody>
+      </p:sp>
+      <p:sp>
+        <p:nvSpPr>
+          <p:cNvPr id="11" name="TextBox 10">
+            <a:extLst>
+              <a:ext uri="{FF2B5EF4-FFF2-40B4-BE49-F238E27FC236}">
+                <a16:creationId xmlns:a16="http://schemas.microsoft.com/office/drawing/2014/main" id="{133B61F0-76D5-48E4-8B2A-3F1DA2C15289}"/>
+              </a:ext>
+            </a:extLst>
+          </p:cNvPr>
+          <p:cNvSpPr txBox="1"/>
+          <p:nvPr/>
+        </p:nvSpPr>
+        <p:spPr>
+          <a:xfrm>
+            <a:off x="208547" y="5113930"/>
+            <a:ext cx="1259305" cy="369332"/>
+          </a:xfrm>
+          <a:prstGeom prst="rect">
+            <a:avLst/>
+          </a:prstGeom>
+          <a:noFill/>
+        </p:spPr>
+        <p:txBody>
+          <a:bodyPr wrap="square" rtlCol="0">
+            <a:spAutoFit/>
+          </a:bodyPr>
+          <a:lstStyle/>
+          <a:p>
+            <a:pPr algn="ctr"/>
+            <a:r>
+              <a:rPr lang="en-US" b="1" dirty="0">
+                <a:solidFill>
+                  <a:schemeClr val="bg1"/>
+                </a:solidFill>
+                <a:latin typeface="Bradley Hand ITC" panose="03070402050302030203" pitchFamily="66" charset="0"/>
+              </a:rPr>
+              <a:t>PICASSO</a:t>
+            </a:r>
+          </a:p>
+        </p:txBody>
+      </p:sp>
     </p:spTree>
     <p:extLst>
       <p:ext uri="{BB962C8B-B14F-4D97-AF65-F5344CB8AC3E}">
-        <p14:creationId xmlns:p14="http://schemas.microsoft.com/office/powerpoint/2010/main" val="4205591082"/>
+        <p14:creationId xmlns:p14="http://schemas.microsoft.com/office/powerpoint/2010/main" val="402921285"/>
       </p:ext>
     </p:extLst>
   </p:cSld>
@@ -4584,16 +5561,10 @@
           <a:lstStyle/>
           <a:p>
             <a:r>
-              <a:rPr lang="en-US" sz="4000" b="1" dirty="0"/>
-              <a:t>Mass </a:t>
-            </a:r>
-            <a:r>
-              <a:rPr lang="en-US" sz="4000" b="1" dirty="0" err="1"/>
-              <a:t>Producation</a:t>
-            </a:r>
-            <a:r>
-              <a:rPr lang="en-US" sz="4000" b="1" dirty="0"/>
-              <a:t> Brewery Locations</a:t>
+              <a:rPr lang="en-US" sz="4000" b="1" cap="all" dirty="0">
+                <a:latin typeface="Rockwell" panose="02060603020205020403" pitchFamily="18" charset="0"/>
+              </a:rPr>
+              <a:t>Expansion Test Markets</a:t>
             </a:r>
           </a:p>
         </p:txBody>
@@ -4636,8 +5607,22 @@
               <a:buChar char="Ø"/>
             </a:pPr>
             <a:r>
-              <a:rPr lang="en-US" dirty="0"/>
-              <a:t>New Jersey</a:t>
+              <a:rPr lang="en-US" dirty="0">
+                <a:latin typeface="Rockwell" panose="02060603020205020403" pitchFamily="18" charset="0"/>
+              </a:rPr>
+              <a:t>Maryland</a:t>
+            </a:r>
+          </a:p>
+          <a:p>
+            <a:pPr marL="800100" lvl="1" indent="-342900" algn="l">
+              <a:buFont typeface="Wingdings" panose="05000000000000000000" pitchFamily="2" charset="2"/>
+              <a:buChar char="Ø"/>
+            </a:pPr>
+            <a:r>
+              <a:rPr lang="en-US" dirty="0">
+                <a:latin typeface="Rockwell" panose="02060603020205020403" pitchFamily="18" charset="0"/>
+              </a:rPr>
+              <a:t>Brewery Location: Baltimore</a:t>
             </a:r>
           </a:p>
           <a:p>
@@ -4646,35 +5631,35 @@
               <a:buChar char="Ø"/>
             </a:pPr>
             <a:r>
-              <a:rPr lang="en-US" dirty="0"/>
-              <a:t>Chicago</a:t>
-            </a:r>
-          </a:p>
-          <a:p>
-            <a:pPr marL="1714500" lvl="3" indent="-342900" algn="l">
+              <a:rPr lang="en-US" dirty="0">
+                <a:latin typeface="Rockwell" panose="02060603020205020403" pitchFamily="18" charset="0"/>
+              </a:rPr>
+              <a:t>Indiana / Illinois</a:t>
+            </a:r>
+          </a:p>
+          <a:p>
+            <a:pPr marL="800100" lvl="1" indent="-342900" algn="l">
               <a:buFont typeface="Wingdings" panose="05000000000000000000" pitchFamily="2" charset="2"/>
               <a:buChar char="Ø"/>
             </a:pPr>
-            <a:endParaRPr lang="en-US" dirty="0"/>
+            <a:r>
+              <a:rPr lang="en-US" dirty="0">
+                <a:latin typeface="Rockwell" panose="02060603020205020403" pitchFamily="18" charset="0"/>
+              </a:rPr>
+              <a:t>Brewery Location: South Bend</a:t>
+            </a:r>
           </a:p>
           <a:p>
             <a:pPr marL="1257300" lvl="2" indent="-342900" algn="l">
               <a:buFont typeface="Wingdings" panose="05000000000000000000" pitchFamily="2" charset="2"/>
               <a:buChar char="Ø"/>
             </a:pPr>
-            <a:endParaRPr lang="en-US" dirty="0"/>
-          </a:p>
-          <a:p>
-            <a:pPr marL="1257300" lvl="2" indent="-342900" algn="l">
-              <a:buFont typeface="Wingdings" panose="05000000000000000000" pitchFamily="2" charset="2"/>
-              <a:buChar char="Ø"/>
-            </a:pPr>
-            <a:endParaRPr lang="en-US" dirty="0"/>
-          </a:p>
-          <a:p>
-            <a:endParaRPr lang="en-US" dirty="0"/>
-          </a:p>
-          <a:p>
+            <a:r>
+              <a:rPr lang="en-US" dirty="0">
+                <a:latin typeface="Rockwell" panose="02060603020205020403" pitchFamily="18" charset="0"/>
+              </a:rPr>
+              <a:t>96 Miles from Chicago</a:t>
+            </a:r>
             <a:endParaRPr lang="en-US" dirty="0"/>
           </a:p>
         </p:txBody>
@@ -4714,10 +5699,1302 @@
           </a:prstGeom>
         </p:spPr>
       </p:pic>
+      <p:pic>
+        <p:nvPicPr>
+          <p:cNvPr id="6" name="Picture 5">
+            <a:extLst>
+              <a:ext uri="{FF2B5EF4-FFF2-40B4-BE49-F238E27FC236}">
+                <a16:creationId xmlns:a16="http://schemas.microsoft.com/office/drawing/2014/main" id="{756ACFF7-2C2B-4029-B172-AC227D2B7253}"/>
+              </a:ext>
+            </a:extLst>
+          </p:cNvPr>
+          <p:cNvPicPr>
+            <a:picLocks noChangeAspect="1"/>
+          </p:cNvPicPr>
+          <p:nvPr/>
+        </p:nvPicPr>
+        <p:blipFill>
+          <a:blip r:embed="rId3">
+            <a:extLst>
+              <a:ext uri="{28A0092B-C50C-407E-A947-70E740481C1C}">
+                <a14:useLocalDpi xmlns:a14="http://schemas.microsoft.com/office/drawing/2010/main" val="0"/>
+              </a:ext>
+            </a:extLst>
+          </a:blip>
+          <a:stretch>
+            <a:fillRect/>
+          </a:stretch>
+        </p:blipFill>
+        <p:spPr>
+          <a:xfrm>
+            <a:off x="313168" y="3490913"/>
+            <a:ext cx="1079796" cy="1623017"/>
+          </a:xfrm>
+          <a:prstGeom prst="rect">
+            <a:avLst/>
+          </a:prstGeom>
+        </p:spPr>
+      </p:pic>
+      <p:sp>
+        <p:nvSpPr>
+          <p:cNvPr id="9" name="TextBox 8">
+            <a:extLst>
+              <a:ext uri="{FF2B5EF4-FFF2-40B4-BE49-F238E27FC236}">
+                <a16:creationId xmlns:a16="http://schemas.microsoft.com/office/drawing/2014/main" id="{C44D9A30-5351-4BCD-83C1-5442D2652491}"/>
+              </a:ext>
+            </a:extLst>
+          </p:cNvPr>
+          <p:cNvSpPr txBox="1"/>
+          <p:nvPr/>
+        </p:nvSpPr>
+        <p:spPr>
+          <a:xfrm>
+            <a:off x="208547" y="5113930"/>
+            <a:ext cx="1259305" cy="369332"/>
+          </a:xfrm>
+          <a:prstGeom prst="rect">
+            <a:avLst/>
+          </a:prstGeom>
+          <a:noFill/>
+        </p:spPr>
+        <p:txBody>
+          <a:bodyPr wrap="square" rtlCol="0">
+            <a:spAutoFit/>
+          </a:bodyPr>
+          <a:lstStyle/>
+          <a:p>
+            <a:pPr algn="ctr"/>
+            <a:r>
+              <a:rPr lang="en-US" b="1" dirty="0">
+                <a:solidFill>
+                  <a:schemeClr val="bg1"/>
+                </a:solidFill>
+                <a:latin typeface="Bradley Hand ITC" panose="03070402050302030203" pitchFamily="66" charset="0"/>
+              </a:rPr>
+              <a:t>PICASSO</a:t>
+            </a:r>
+          </a:p>
+        </p:txBody>
+      </p:sp>
+    </p:spTree>
+    <p:extLst>
+      <p:ext uri="{BB962C8B-B14F-4D97-AF65-F5344CB8AC3E}">
+        <p14:creationId xmlns:p14="http://schemas.microsoft.com/office/powerpoint/2010/main" val="4205591082"/>
+      </p:ext>
+    </p:extLst>
+  </p:cSld>
+  <p:clrMapOvr>
+    <a:masterClrMapping/>
+  </p:clrMapOvr>
+</p:sld>
+</file>
+
+<file path=ppt/slides/slide7.xml><?xml version="1.0" encoding="utf-8"?>
+<p:sld xmlns:a="http://schemas.openxmlformats.org/drawingml/2006/main" xmlns:r="http://schemas.openxmlformats.org/officeDocument/2006/relationships" xmlns:p="http://schemas.openxmlformats.org/presentationml/2006/main">
+  <p:cSld>
+    <p:spTree>
+      <p:nvGrpSpPr>
+        <p:cNvPr id="1" name=""/>
+        <p:cNvGrpSpPr/>
+        <p:nvPr/>
+      </p:nvGrpSpPr>
+      <p:grpSpPr>
+        <a:xfrm>
+          <a:off x="0" y="0"/>
+          <a:ext cx="0" cy="0"/>
+          <a:chOff x="0" y="0"/>
+          <a:chExt cx="0" cy="0"/>
+        </a:xfrm>
+      </p:grpSpPr>
+      <p:sp>
+        <p:nvSpPr>
+          <p:cNvPr id="2" name="Title 1">
+            <a:extLst>
+              <a:ext uri="{FF2B5EF4-FFF2-40B4-BE49-F238E27FC236}">
+                <a16:creationId xmlns:a16="http://schemas.microsoft.com/office/drawing/2014/main" id="{E7EB5BA5-87DD-41AA-B3B4-81DBDF2F9AF4}"/>
+              </a:ext>
+            </a:extLst>
+          </p:cNvPr>
+          <p:cNvSpPr>
+            <a:spLocks noGrp="1"/>
+          </p:cNvSpPr>
+          <p:nvPr>
+            <p:ph type="ctrTitle"/>
+          </p:nvPr>
+        </p:nvSpPr>
+        <p:spPr>
+          <a:xfrm>
+            <a:off x="1990724" y="571500"/>
+            <a:ext cx="9601200" cy="581025"/>
+          </a:xfrm>
+        </p:spPr>
+        <p:txBody>
+          <a:bodyPr>
+            <a:normAutofit fontScale="90000"/>
+          </a:bodyPr>
+          <a:lstStyle/>
+          <a:p>
+            <a:r>
+              <a:rPr lang="en-US" sz="4000" b="1" cap="all" dirty="0">
+                <a:latin typeface="Rockwell" panose="02060603020205020403" pitchFamily="18" charset="0"/>
+              </a:rPr>
+              <a:t>Mass Production Locations</a:t>
+            </a:r>
+          </a:p>
+        </p:txBody>
+      </p:sp>
+      <p:sp>
+        <p:nvSpPr>
+          <p:cNvPr id="3" name="Subtitle 2">
+            <a:extLst>
+              <a:ext uri="{FF2B5EF4-FFF2-40B4-BE49-F238E27FC236}">
+                <a16:creationId xmlns:a16="http://schemas.microsoft.com/office/drawing/2014/main" id="{AB26E057-05F7-4574-B513-2D85CBE6CC15}"/>
+              </a:ext>
+            </a:extLst>
+          </p:cNvPr>
+          <p:cNvSpPr>
+            <a:spLocks noGrp="1"/>
+          </p:cNvSpPr>
+          <p:nvPr>
+            <p:ph type="subTitle" idx="1"/>
+          </p:nvPr>
+        </p:nvSpPr>
+        <p:spPr>
+          <a:xfrm>
+            <a:off x="1990725" y="1152525"/>
+            <a:ext cx="9601199" cy="5257799"/>
+          </a:xfrm>
+        </p:spPr>
+        <p:txBody>
+          <a:bodyPr>
+            <a:normAutofit/>
+          </a:bodyPr>
+          <a:lstStyle/>
+          <a:p>
+            <a:pPr marL="342900" indent="-342900" algn="l">
+              <a:buFont typeface="Wingdings" panose="05000000000000000000" pitchFamily="2" charset="2"/>
+              <a:buChar char="Ø"/>
+            </a:pPr>
+            <a:endParaRPr lang="en-US" dirty="0"/>
+          </a:p>
+          <a:p>
+            <a:pPr marL="342900" indent="-342900" algn="l">
+              <a:buFont typeface="Wingdings" panose="05000000000000000000" pitchFamily="2" charset="2"/>
+              <a:buChar char="Ø"/>
+            </a:pPr>
+            <a:endParaRPr lang="en-US" dirty="0">
+              <a:latin typeface="Rockwell" panose="02060603020205020403" pitchFamily="18" charset="0"/>
+            </a:endParaRPr>
+          </a:p>
+        </p:txBody>
+      </p:sp>
+      <p:pic>
+        <p:nvPicPr>
+          <p:cNvPr id="5" name="Picture 4">
+            <a:extLst>
+              <a:ext uri="{FF2B5EF4-FFF2-40B4-BE49-F238E27FC236}">
+                <a16:creationId xmlns:a16="http://schemas.microsoft.com/office/drawing/2014/main" id="{48072B84-5C8E-4C7C-BC9B-81281140D1BD}"/>
+              </a:ext>
+            </a:extLst>
+          </p:cNvPr>
+          <p:cNvPicPr>
+            <a:picLocks noChangeAspect="1"/>
+          </p:cNvPicPr>
+          <p:nvPr/>
+        </p:nvPicPr>
+        <p:blipFill rotWithShape="1">
+          <a:blip r:embed="rId2">
+            <a:extLst>
+              <a:ext uri="{28A0092B-C50C-407E-A947-70E740481C1C}">
+                <a14:useLocalDpi xmlns:a14="http://schemas.microsoft.com/office/drawing/2010/main" val="0"/>
+              </a:ext>
+            </a:extLst>
+          </a:blip>
+          <a:srcRect l="36385" r="37139"/>
+          <a:stretch/>
+        </p:blipFill>
+        <p:spPr>
+          <a:xfrm>
+            <a:off x="0" y="1"/>
+            <a:ext cx="1704975" cy="6876256"/>
+          </a:xfrm>
+          <a:prstGeom prst="rect">
+            <a:avLst/>
+          </a:prstGeom>
+        </p:spPr>
+      </p:pic>
+      <p:pic>
+        <p:nvPicPr>
+          <p:cNvPr id="6" name="Picture 5">
+            <a:extLst>
+              <a:ext uri="{FF2B5EF4-FFF2-40B4-BE49-F238E27FC236}">
+                <a16:creationId xmlns:a16="http://schemas.microsoft.com/office/drawing/2014/main" id="{6C68EC35-8431-4AA3-8647-14D30960EB93}"/>
+              </a:ext>
+            </a:extLst>
+          </p:cNvPr>
+          <p:cNvPicPr>
+            <a:picLocks noChangeAspect="1"/>
+          </p:cNvPicPr>
+          <p:nvPr/>
+        </p:nvPicPr>
+        <p:blipFill>
+          <a:blip r:embed="rId3">
+            <a:extLst>
+              <a:ext uri="{28A0092B-C50C-407E-A947-70E740481C1C}">
+                <a14:useLocalDpi xmlns:a14="http://schemas.microsoft.com/office/drawing/2010/main" val="0"/>
+              </a:ext>
+            </a:extLst>
+          </a:blip>
+          <a:stretch>
+            <a:fillRect/>
+          </a:stretch>
+        </p:blipFill>
+        <p:spPr>
+          <a:xfrm>
+            <a:off x="313168" y="3490913"/>
+            <a:ext cx="1079796" cy="1623017"/>
+          </a:xfrm>
+          <a:prstGeom prst="rect">
+            <a:avLst/>
+          </a:prstGeom>
+        </p:spPr>
+      </p:pic>
+      <p:sp>
+        <p:nvSpPr>
+          <p:cNvPr id="7" name="TextBox 6">
+            <a:extLst>
+              <a:ext uri="{FF2B5EF4-FFF2-40B4-BE49-F238E27FC236}">
+                <a16:creationId xmlns:a16="http://schemas.microsoft.com/office/drawing/2014/main" id="{0A47B5BC-977E-45A5-90C0-468FF2E80C8E}"/>
+              </a:ext>
+            </a:extLst>
+          </p:cNvPr>
+          <p:cNvSpPr txBox="1"/>
+          <p:nvPr/>
+        </p:nvSpPr>
+        <p:spPr>
+          <a:xfrm>
+            <a:off x="208547" y="5113930"/>
+            <a:ext cx="1259305" cy="369332"/>
+          </a:xfrm>
+          <a:prstGeom prst="rect">
+            <a:avLst/>
+          </a:prstGeom>
+          <a:noFill/>
+        </p:spPr>
+        <p:txBody>
+          <a:bodyPr wrap="square" rtlCol="0">
+            <a:spAutoFit/>
+          </a:bodyPr>
+          <a:lstStyle/>
+          <a:p>
+            <a:pPr algn="ctr"/>
+            <a:r>
+              <a:rPr lang="en-US" b="1" dirty="0">
+                <a:solidFill>
+                  <a:schemeClr val="bg1"/>
+                </a:solidFill>
+                <a:latin typeface="Bradley Hand ITC" panose="03070402050302030203" pitchFamily="66" charset="0"/>
+              </a:rPr>
+              <a:t>PICASSO</a:t>
+            </a:r>
+          </a:p>
+        </p:txBody>
+      </p:sp>
+      <p:graphicFrame>
+        <p:nvGraphicFramePr>
+          <p:cNvPr id="8" name="Table 7">
+            <a:extLst>
+              <a:ext uri="{FF2B5EF4-FFF2-40B4-BE49-F238E27FC236}">
+                <a16:creationId xmlns:a16="http://schemas.microsoft.com/office/drawing/2014/main" id="{084747D5-64B0-43F2-96DD-A0F2BF94E0D6}"/>
+              </a:ext>
+            </a:extLst>
+          </p:cNvPr>
+          <p:cNvGraphicFramePr>
+            <a:graphicFrameLocks noGrp="1"/>
+          </p:cNvGraphicFramePr>
+          <p:nvPr>
+            <p:extLst>
+              <p:ext uri="{D42A27DB-BD31-4B8C-83A1-F6EECF244321}">
+                <p14:modId xmlns:p14="http://schemas.microsoft.com/office/powerpoint/2010/main" val="2988497210"/>
+              </p:ext>
+            </p:extLst>
+          </p:nvPr>
+        </p:nvGraphicFramePr>
+        <p:xfrm>
+          <a:off x="2933280" y="2282862"/>
+          <a:ext cx="7716088" cy="3200400"/>
+        </p:xfrm>
+        <a:graphic>
+          <a:graphicData uri="http://schemas.openxmlformats.org/drawingml/2006/table">
+            <a:tbl>
+              <a:tblPr firstRow="1" bandRow="1">
+                <a:tableStyleId>{5C22544A-7EE6-4342-B048-85BDC9FD1C3A}</a:tableStyleId>
+              </a:tblPr>
+              <a:tblGrid>
+                <a:gridCol w="3858044">
+                  <a:extLst>
+                    <a:ext uri="{9D8B030D-6E8A-4147-A177-3AD203B41FA5}">
+                      <a16:colId xmlns:a16="http://schemas.microsoft.com/office/drawing/2014/main" val="2063888987"/>
+                    </a:ext>
+                  </a:extLst>
+                </a:gridCol>
+                <a:gridCol w="3858044">
+                  <a:extLst>
+                    <a:ext uri="{9D8B030D-6E8A-4147-A177-3AD203B41FA5}">
+                      <a16:colId xmlns:a16="http://schemas.microsoft.com/office/drawing/2014/main" val="3053484273"/>
+                    </a:ext>
+                  </a:extLst>
+                </a:gridCol>
+              </a:tblGrid>
+              <a:tr h="370840">
+                <a:tc>
+                  <a:txBody>
+                    <a:bodyPr/>
+                    <a:lstStyle/>
+                    <a:p>
+                      <a:pPr algn="ctr"/>
+                      <a:r>
+                        <a:rPr lang="en-US" sz="2400" dirty="0">
+                          <a:latin typeface="Rockwell" panose="02060603020205020403" pitchFamily="18" charset="0"/>
+                        </a:rPr>
+                        <a:t>REGION</a:t>
+                      </a:r>
+                    </a:p>
+                  </a:txBody>
+                  <a:tcPr/>
+                </a:tc>
+                <a:tc>
+                  <a:txBody>
+                    <a:bodyPr/>
+                    <a:lstStyle/>
+                    <a:p>
+                      <a:pPr algn="ctr"/>
+                      <a:r>
+                        <a:rPr lang="en-US" sz="2400" dirty="0">
+                          <a:latin typeface="Rockwell" panose="02060603020205020403" pitchFamily="18" charset="0"/>
+                        </a:rPr>
+                        <a:t>CITY</a:t>
+                      </a:r>
+                    </a:p>
+                  </a:txBody>
+                  <a:tcPr/>
+                </a:tc>
+                <a:extLst>
+                  <a:ext uri="{0D108BD9-81ED-4DB2-BD59-A6C34878D82A}">
+                    <a16:rowId xmlns:a16="http://schemas.microsoft.com/office/drawing/2014/main" val="1418171296"/>
+                  </a:ext>
+                </a:extLst>
+              </a:tr>
+              <a:tr h="370840">
+                <a:tc>
+                  <a:txBody>
+                    <a:bodyPr/>
+                    <a:lstStyle/>
+                    <a:p>
+                      <a:pPr algn="ctr"/>
+                      <a:r>
+                        <a:rPr lang="en-US" sz="2400" dirty="0">
+                          <a:latin typeface="Rockwell" panose="02060603020205020403" pitchFamily="18" charset="0"/>
+                        </a:rPr>
+                        <a:t>Northeast</a:t>
+                      </a:r>
+                    </a:p>
+                  </a:txBody>
+                  <a:tcPr/>
+                </a:tc>
+                <a:tc>
+                  <a:txBody>
+                    <a:bodyPr/>
+                    <a:lstStyle/>
+                    <a:p>
+                      <a:pPr algn="ctr"/>
+                      <a:r>
+                        <a:rPr lang="en-US" sz="2400" dirty="0">
+                          <a:latin typeface="Rockwell" panose="02060603020205020403" pitchFamily="18" charset="0"/>
+                        </a:rPr>
+                        <a:t>Newark</a:t>
+                      </a:r>
+                    </a:p>
+                  </a:txBody>
+                  <a:tcPr/>
+                </a:tc>
+                <a:extLst>
+                  <a:ext uri="{0D108BD9-81ED-4DB2-BD59-A6C34878D82A}">
+                    <a16:rowId xmlns:a16="http://schemas.microsoft.com/office/drawing/2014/main" val="1954664898"/>
+                  </a:ext>
+                </a:extLst>
+              </a:tr>
+              <a:tr h="370840">
+                <a:tc>
+                  <a:txBody>
+                    <a:bodyPr/>
+                    <a:lstStyle/>
+                    <a:p>
+                      <a:pPr algn="ctr"/>
+                      <a:r>
+                        <a:rPr lang="en-US" sz="2400" dirty="0">
+                          <a:latin typeface="Rockwell" panose="02060603020205020403" pitchFamily="18" charset="0"/>
+                        </a:rPr>
+                        <a:t>Midwest</a:t>
+                      </a:r>
+                    </a:p>
+                  </a:txBody>
+                  <a:tcPr/>
+                </a:tc>
+                <a:tc>
+                  <a:txBody>
+                    <a:bodyPr/>
+                    <a:lstStyle/>
+                    <a:p>
+                      <a:pPr algn="ctr"/>
+                      <a:r>
+                        <a:rPr lang="en-US" sz="2400" dirty="0">
+                          <a:latin typeface="Rockwell" panose="02060603020205020403" pitchFamily="18" charset="0"/>
+                        </a:rPr>
+                        <a:t>Chicago</a:t>
+                      </a:r>
+                    </a:p>
+                  </a:txBody>
+                  <a:tcPr/>
+                </a:tc>
+                <a:extLst>
+                  <a:ext uri="{0D108BD9-81ED-4DB2-BD59-A6C34878D82A}">
+                    <a16:rowId xmlns:a16="http://schemas.microsoft.com/office/drawing/2014/main" val="270331122"/>
+                  </a:ext>
+                </a:extLst>
+              </a:tr>
+              <a:tr h="370840">
+                <a:tc>
+                  <a:txBody>
+                    <a:bodyPr/>
+                    <a:lstStyle/>
+                    <a:p>
+                      <a:pPr algn="ctr"/>
+                      <a:r>
+                        <a:rPr lang="en-US" sz="2400" dirty="0">
+                          <a:latin typeface="Rockwell" panose="02060603020205020403" pitchFamily="18" charset="0"/>
+                        </a:rPr>
+                        <a:t>Southeast</a:t>
+                      </a:r>
+                    </a:p>
+                  </a:txBody>
+                  <a:tcPr/>
+                </a:tc>
+                <a:tc>
+                  <a:txBody>
+                    <a:bodyPr/>
+                    <a:lstStyle/>
+                    <a:p>
+                      <a:pPr algn="ctr"/>
+                      <a:r>
+                        <a:rPr lang="en-US" sz="2400" dirty="0">
+                          <a:latin typeface="Rockwell" panose="02060603020205020403" pitchFamily="18" charset="0"/>
+                        </a:rPr>
+                        <a:t>Atlanta</a:t>
+                      </a:r>
+                    </a:p>
+                  </a:txBody>
+                  <a:tcPr/>
+                </a:tc>
+                <a:extLst>
+                  <a:ext uri="{0D108BD9-81ED-4DB2-BD59-A6C34878D82A}">
+                    <a16:rowId xmlns:a16="http://schemas.microsoft.com/office/drawing/2014/main" val="2198309744"/>
+                  </a:ext>
+                </a:extLst>
+              </a:tr>
+              <a:tr h="370840">
+                <a:tc>
+                  <a:txBody>
+                    <a:bodyPr/>
+                    <a:lstStyle/>
+                    <a:p>
+                      <a:pPr algn="ctr"/>
+                      <a:r>
+                        <a:rPr lang="en-US" sz="2400" dirty="0">
+                          <a:latin typeface="Rockwell" panose="02060603020205020403" pitchFamily="18" charset="0"/>
+                        </a:rPr>
+                        <a:t>Northwest</a:t>
+                      </a:r>
+                    </a:p>
+                  </a:txBody>
+                  <a:tcPr/>
+                </a:tc>
+                <a:tc>
+                  <a:txBody>
+                    <a:bodyPr/>
+                    <a:lstStyle/>
+                    <a:p>
+                      <a:pPr algn="ctr"/>
+                      <a:r>
+                        <a:rPr lang="en-US" sz="2400" dirty="0">
+                          <a:latin typeface="Rockwell" panose="02060603020205020403" pitchFamily="18" charset="0"/>
+                        </a:rPr>
+                        <a:t>Boise</a:t>
+                      </a:r>
+                    </a:p>
+                  </a:txBody>
+                  <a:tcPr/>
+                </a:tc>
+                <a:extLst>
+                  <a:ext uri="{0D108BD9-81ED-4DB2-BD59-A6C34878D82A}">
+                    <a16:rowId xmlns:a16="http://schemas.microsoft.com/office/drawing/2014/main" val="3523140290"/>
+                  </a:ext>
+                </a:extLst>
+              </a:tr>
+              <a:tr h="370840">
+                <a:tc>
+                  <a:txBody>
+                    <a:bodyPr/>
+                    <a:lstStyle/>
+                    <a:p>
+                      <a:pPr algn="ctr"/>
+                      <a:r>
+                        <a:rPr lang="en-US" sz="2400" dirty="0">
+                          <a:latin typeface="Rockwell" panose="02060603020205020403" pitchFamily="18" charset="0"/>
+                        </a:rPr>
+                        <a:t>Rocky Mountain</a:t>
+                      </a:r>
+                    </a:p>
+                  </a:txBody>
+                  <a:tcPr/>
+                </a:tc>
+                <a:tc>
+                  <a:txBody>
+                    <a:bodyPr/>
+                    <a:lstStyle/>
+                    <a:p>
+                      <a:pPr algn="ctr"/>
+                      <a:r>
+                        <a:rPr lang="en-US" sz="2400" dirty="0">
+                          <a:latin typeface="Rockwell" panose="02060603020205020403" pitchFamily="18" charset="0"/>
+                        </a:rPr>
+                        <a:t>Denver</a:t>
+                      </a:r>
+                    </a:p>
+                  </a:txBody>
+                  <a:tcPr/>
+                </a:tc>
+                <a:extLst>
+                  <a:ext uri="{0D108BD9-81ED-4DB2-BD59-A6C34878D82A}">
+                    <a16:rowId xmlns:a16="http://schemas.microsoft.com/office/drawing/2014/main" val="3627541741"/>
+                  </a:ext>
+                </a:extLst>
+              </a:tr>
+              <a:tr h="370840">
+                <a:tc>
+                  <a:txBody>
+                    <a:bodyPr/>
+                    <a:lstStyle/>
+                    <a:p>
+                      <a:pPr algn="ctr"/>
+                      <a:r>
+                        <a:rPr lang="en-US" sz="2400" dirty="0">
+                          <a:latin typeface="Rockwell" panose="02060603020205020403" pitchFamily="18" charset="0"/>
+                        </a:rPr>
+                        <a:t>Southwest</a:t>
+                      </a:r>
+                    </a:p>
+                  </a:txBody>
+                  <a:tcPr/>
+                </a:tc>
+                <a:tc>
+                  <a:txBody>
+                    <a:bodyPr/>
+                    <a:lstStyle/>
+                    <a:p>
+                      <a:pPr algn="ctr"/>
+                      <a:r>
+                        <a:rPr lang="en-US" sz="2400" dirty="0">
+                          <a:latin typeface="Rockwell" panose="02060603020205020403" pitchFamily="18" charset="0"/>
+                        </a:rPr>
+                        <a:t>Dallas</a:t>
+                      </a:r>
+                    </a:p>
+                  </a:txBody>
+                  <a:tcPr/>
+                </a:tc>
+                <a:extLst>
+                  <a:ext uri="{0D108BD9-81ED-4DB2-BD59-A6C34878D82A}">
+                    <a16:rowId xmlns:a16="http://schemas.microsoft.com/office/drawing/2014/main" val="2263837643"/>
+                  </a:ext>
+                </a:extLst>
+              </a:tr>
+            </a:tbl>
+          </a:graphicData>
+        </a:graphic>
+      </p:graphicFrame>
     </p:spTree>
     <p:extLst>
       <p:ext uri="{BB962C8B-B14F-4D97-AF65-F5344CB8AC3E}">
         <p14:creationId xmlns:p14="http://schemas.microsoft.com/office/powerpoint/2010/main" val="1696164554"/>
+      </p:ext>
+    </p:extLst>
+  </p:cSld>
+  <p:clrMapOvr>
+    <a:masterClrMapping/>
+  </p:clrMapOvr>
+</p:sld>
+</file>
+
+<file path=ppt/slides/slide8.xml><?xml version="1.0" encoding="utf-8"?>
+<p:sld xmlns:a="http://schemas.openxmlformats.org/drawingml/2006/main" xmlns:r="http://schemas.openxmlformats.org/officeDocument/2006/relationships" xmlns:p="http://schemas.openxmlformats.org/presentationml/2006/main">
+  <p:cSld>
+    <p:spTree>
+      <p:nvGrpSpPr>
+        <p:cNvPr id="1" name=""/>
+        <p:cNvGrpSpPr/>
+        <p:nvPr/>
+      </p:nvGrpSpPr>
+      <p:grpSpPr>
+        <a:xfrm>
+          <a:off x="0" y="0"/>
+          <a:ext cx="0" cy="0"/>
+          <a:chOff x="0" y="0"/>
+          <a:chExt cx="0" cy="0"/>
+        </a:xfrm>
+      </p:grpSpPr>
+      <p:sp>
+        <p:nvSpPr>
+          <p:cNvPr id="2" name="Title 1">
+            <a:extLst>
+              <a:ext uri="{FF2B5EF4-FFF2-40B4-BE49-F238E27FC236}">
+                <a16:creationId xmlns:a16="http://schemas.microsoft.com/office/drawing/2014/main" id="{E7EB5BA5-87DD-41AA-B3B4-81DBDF2F9AF4}"/>
+              </a:ext>
+            </a:extLst>
+          </p:cNvPr>
+          <p:cNvSpPr>
+            <a:spLocks noGrp="1"/>
+          </p:cNvSpPr>
+          <p:nvPr>
+            <p:ph type="ctrTitle"/>
+          </p:nvPr>
+        </p:nvSpPr>
+        <p:spPr>
+          <a:xfrm>
+            <a:off x="1990724" y="571500"/>
+            <a:ext cx="9601200" cy="581025"/>
+          </a:xfrm>
+        </p:spPr>
+        <p:txBody>
+          <a:bodyPr>
+            <a:normAutofit fontScale="90000"/>
+          </a:bodyPr>
+          <a:lstStyle/>
+          <a:p>
+            <a:r>
+              <a:rPr lang="en-US" sz="4000" b="1" cap="all" dirty="0">
+                <a:latin typeface="Rockwell" panose="02060603020205020403" pitchFamily="18" charset="0"/>
+              </a:rPr>
+              <a:t>Summary</a:t>
+            </a:r>
+          </a:p>
+        </p:txBody>
+      </p:sp>
+      <p:sp>
+        <p:nvSpPr>
+          <p:cNvPr id="3" name="Subtitle 2">
+            <a:extLst>
+              <a:ext uri="{FF2B5EF4-FFF2-40B4-BE49-F238E27FC236}">
+                <a16:creationId xmlns:a16="http://schemas.microsoft.com/office/drawing/2014/main" id="{AB26E057-05F7-4574-B513-2D85CBE6CC15}"/>
+              </a:ext>
+            </a:extLst>
+          </p:cNvPr>
+          <p:cNvSpPr>
+            <a:spLocks noGrp="1"/>
+          </p:cNvSpPr>
+          <p:nvPr>
+            <p:ph type="subTitle" idx="1"/>
+          </p:nvPr>
+        </p:nvSpPr>
+        <p:spPr>
+          <a:xfrm>
+            <a:off x="1990725" y="1152525"/>
+            <a:ext cx="9601199" cy="5257799"/>
+          </a:xfrm>
+        </p:spPr>
+        <p:txBody>
+          <a:bodyPr>
+            <a:normAutofit fontScale="92500" lnSpcReduction="10000"/>
+          </a:bodyPr>
+          <a:lstStyle/>
+          <a:p>
+            <a:pPr marL="342900" indent="-342900" algn="l">
+              <a:buFont typeface="Wingdings" panose="05000000000000000000" pitchFamily="2" charset="2"/>
+              <a:buChar char="Ø"/>
+            </a:pPr>
+            <a:endParaRPr lang="en-US" dirty="0"/>
+          </a:p>
+          <a:p>
+            <a:pPr marL="342900" indent="-342900" algn="l">
+              <a:buFont typeface="Wingdings" panose="05000000000000000000" pitchFamily="2" charset="2"/>
+              <a:buChar char="Ø"/>
+            </a:pPr>
+            <a:r>
+              <a:rPr lang="en-US" dirty="0">
+                <a:latin typeface="Rockwell" panose="02060603020205020403" pitchFamily="18" charset="0"/>
+              </a:rPr>
+              <a:t>Introduce our newest beer that is high in alcohol content but low in bitterness</a:t>
+            </a:r>
+          </a:p>
+          <a:p>
+            <a:pPr marL="342900" indent="-342900" algn="l">
+              <a:buFont typeface="Wingdings" panose="05000000000000000000" pitchFamily="2" charset="2"/>
+              <a:buChar char="Ø"/>
+            </a:pPr>
+            <a:r>
+              <a:rPr lang="en-US" dirty="0">
+                <a:latin typeface="Rockwell" panose="02060603020205020403" pitchFamily="18" charset="0"/>
+              </a:rPr>
+              <a:t>Release as a local craft beer in test markets</a:t>
+            </a:r>
+          </a:p>
+          <a:p>
+            <a:pPr marL="800100" lvl="1" indent="-342900" algn="l">
+              <a:buFont typeface="Wingdings" panose="05000000000000000000" pitchFamily="2" charset="2"/>
+              <a:buChar char="Ø"/>
+            </a:pPr>
+            <a:r>
+              <a:rPr lang="en-US" dirty="0">
+                <a:latin typeface="Rockwell" panose="02060603020205020403" pitchFamily="18" charset="0"/>
+              </a:rPr>
+              <a:t>Initial: New Haven, Connecticut</a:t>
+            </a:r>
+          </a:p>
+          <a:p>
+            <a:pPr marL="800100" lvl="1" indent="-342900" algn="l">
+              <a:buFont typeface="Wingdings" panose="05000000000000000000" pitchFamily="2" charset="2"/>
+              <a:buChar char="Ø"/>
+            </a:pPr>
+            <a:r>
+              <a:rPr lang="en-US" dirty="0">
+                <a:latin typeface="Rockwell" panose="02060603020205020403" pitchFamily="18" charset="0"/>
+              </a:rPr>
+              <a:t>Follow-on: </a:t>
+            </a:r>
+          </a:p>
+          <a:p>
+            <a:pPr marL="1257300" lvl="2" indent="-342900" algn="l">
+              <a:buFont typeface="Wingdings" panose="05000000000000000000" pitchFamily="2" charset="2"/>
+              <a:buChar char="Ø"/>
+            </a:pPr>
+            <a:r>
+              <a:rPr lang="en-US" dirty="0">
+                <a:latin typeface="Rockwell" panose="02060603020205020403" pitchFamily="18" charset="0"/>
+              </a:rPr>
+              <a:t>South Bend, Indiana</a:t>
+            </a:r>
+          </a:p>
+          <a:p>
+            <a:pPr marL="1257300" lvl="2" indent="-342900" algn="l">
+              <a:buFont typeface="Wingdings" panose="05000000000000000000" pitchFamily="2" charset="2"/>
+              <a:buChar char="Ø"/>
+            </a:pPr>
+            <a:r>
+              <a:rPr lang="en-US" dirty="0">
+                <a:latin typeface="Rockwell" panose="02060603020205020403" pitchFamily="18" charset="0"/>
+              </a:rPr>
+              <a:t>Chicago, Illinois</a:t>
+            </a:r>
+          </a:p>
+          <a:p>
+            <a:pPr marL="1257300" lvl="2" indent="-342900" algn="l">
+              <a:buFont typeface="Wingdings" panose="05000000000000000000" pitchFamily="2" charset="2"/>
+              <a:buChar char="Ø"/>
+            </a:pPr>
+            <a:r>
+              <a:rPr lang="en-US" dirty="0">
+                <a:latin typeface="Rockwell" panose="02060603020205020403" pitchFamily="18" charset="0"/>
+              </a:rPr>
+              <a:t>Baltimore Maryland</a:t>
+            </a:r>
+          </a:p>
+          <a:p>
+            <a:pPr marL="342900" indent="-342900" algn="l">
+              <a:buFont typeface="Wingdings" panose="05000000000000000000" pitchFamily="2" charset="2"/>
+              <a:buChar char="Ø"/>
+            </a:pPr>
+            <a:r>
+              <a:rPr lang="en-US" dirty="0">
+                <a:latin typeface="Rockwell" panose="02060603020205020403" pitchFamily="18" charset="0"/>
+              </a:rPr>
+              <a:t>Expand nationwide placing major breweries in large distribution centers</a:t>
+            </a:r>
+          </a:p>
+          <a:p>
+            <a:pPr marL="800100" lvl="1" indent="-342900" algn="l">
+              <a:buFont typeface="Wingdings" panose="05000000000000000000" pitchFamily="2" charset="2"/>
+              <a:buChar char="Ø"/>
+            </a:pPr>
+            <a:r>
+              <a:rPr lang="en-US" dirty="0">
+                <a:latin typeface="Rockwell" panose="02060603020205020403" pitchFamily="18" charset="0"/>
+              </a:rPr>
+              <a:t>Chicago</a:t>
+            </a:r>
+          </a:p>
+          <a:p>
+            <a:pPr marL="800100" lvl="1" indent="-342900" algn="l">
+              <a:buFont typeface="Wingdings" panose="05000000000000000000" pitchFamily="2" charset="2"/>
+              <a:buChar char="Ø"/>
+            </a:pPr>
+            <a:r>
+              <a:rPr lang="en-US" dirty="0">
+                <a:latin typeface="Rockwell" panose="02060603020205020403" pitchFamily="18" charset="0"/>
+              </a:rPr>
+              <a:t>Newark</a:t>
+            </a:r>
+          </a:p>
+          <a:p>
+            <a:pPr marL="800100" lvl="1" indent="-342900" algn="l">
+              <a:buFont typeface="Wingdings" panose="05000000000000000000" pitchFamily="2" charset="2"/>
+              <a:buChar char="Ø"/>
+            </a:pPr>
+            <a:r>
+              <a:rPr lang="en-US" dirty="0">
+                <a:latin typeface="Rockwell" panose="02060603020205020403" pitchFamily="18" charset="0"/>
+              </a:rPr>
+              <a:t>Atlanta</a:t>
+            </a:r>
+          </a:p>
+          <a:p>
+            <a:pPr marL="800100" lvl="1" indent="-342900" algn="l">
+              <a:buFont typeface="Wingdings" panose="05000000000000000000" pitchFamily="2" charset="2"/>
+              <a:buChar char="Ø"/>
+            </a:pPr>
+            <a:r>
+              <a:rPr lang="en-US" dirty="0">
+                <a:latin typeface="Rockwell" panose="02060603020205020403" pitchFamily="18" charset="0"/>
+              </a:rPr>
+              <a:t>Boise</a:t>
+            </a:r>
+          </a:p>
+          <a:p>
+            <a:pPr marL="800100" lvl="1" indent="-342900" algn="l">
+              <a:buFont typeface="Wingdings" panose="05000000000000000000" pitchFamily="2" charset="2"/>
+              <a:buChar char="Ø"/>
+            </a:pPr>
+            <a:r>
+              <a:rPr lang="en-US" dirty="0">
+                <a:latin typeface="Rockwell" panose="02060603020205020403" pitchFamily="18" charset="0"/>
+              </a:rPr>
+              <a:t>Dallas</a:t>
+            </a:r>
+          </a:p>
+          <a:p>
+            <a:pPr marL="800100" lvl="1" indent="-342900" algn="l">
+              <a:buFont typeface="Wingdings" panose="05000000000000000000" pitchFamily="2" charset="2"/>
+              <a:buChar char="Ø"/>
+            </a:pPr>
+            <a:r>
+              <a:rPr lang="en-US" dirty="0">
+                <a:latin typeface="Rockwell" panose="02060603020205020403" pitchFamily="18" charset="0"/>
+              </a:rPr>
+              <a:t>Denver</a:t>
+            </a:r>
+          </a:p>
+          <a:p>
+            <a:pPr marL="1714500" lvl="3" indent="-342900" algn="l">
+              <a:buFont typeface="Wingdings" panose="05000000000000000000" pitchFamily="2" charset="2"/>
+              <a:buChar char="Ø"/>
+            </a:pPr>
+            <a:endParaRPr lang="en-US" dirty="0"/>
+          </a:p>
+          <a:p>
+            <a:pPr marL="1257300" lvl="2" indent="-342900" algn="l">
+              <a:buFont typeface="Wingdings" panose="05000000000000000000" pitchFamily="2" charset="2"/>
+              <a:buChar char="Ø"/>
+            </a:pPr>
+            <a:endParaRPr lang="en-US" dirty="0"/>
+          </a:p>
+          <a:p>
+            <a:pPr marL="1257300" lvl="2" indent="-342900" algn="l">
+              <a:buFont typeface="Wingdings" panose="05000000000000000000" pitchFamily="2" charset="2"/>
+              <a:buChar char="Ø"/>
+            </a:pPr>
+            <a:endParaRPr lang="en-US" dirty="0"/>
+          </a:p>
+          <a:p>
+            <a:endParaRPr lang="en-US" dirty="0"/>
+          </a:p>
+          <a:p>
+            <a:endParaRPr lang="en-US" dirty="0"/>
+          </a:p>
+        </p:txBody>
+      </p:sp>
+      <p:pic>
+        <p:nvPicPr>
+          <p:cNvPr id="5" name="Picture 4">
+            <a:extLst>
+              <a:ext uri="{FF2B5EF4-FFF2-40B4-BE49-F238E27FC236}">
+                <a16:creationId xmlns:a16="http://schemas.microsoft.com/office/drawing/2014/main" id="{48072B84-5C8E-4C7C-BC9B-81281140D1BD}"/>
+              </a:ext>
+            </a:extLst>
+          </p:cNvPr>
+          <p:cNvPicPr>
+            <a:picLocks noChangeAspect="1"/>
+          </p:cNvPicPr>
+          <p:nvPr/>
+        </p:nvPicPr>
+        <p:blipFill rotWithShape="1">
+          <a:blip r:embed="rId2">
+            <a:extLst>
+              <a:ext uri="{28A0092B-C50C-407E-A947-70E740481C1C}">
+                <a14:useLocalDpi xmlns:a14="http://schemas.microsoft.com/office/drawing/2010/main" val="0"/>
+              </a:ext>
+            </a:extLst>
+          </a:blip>
+          <a:srcRect l="36385" r="37139"/>
+          <a:stretch/>
+        </p:blipFill>
+        <p:spPr>
+          <a:xfrm>
+            <a:off x="0" y="1"/>
+            <a:ext cx="1704975" cy="6876256"/>
+          </a:xfrm>
+          <a:prstGeom prst="rect">
+            <a:avLst/>
+          </a:prstGeom>
+        </p:spPr>
+      </p:pic>
+      <p:pic>
+        <p:nvPicPr>
+          <p:cNvPr id="6" name="Picture 5">
+            <a:extLst>
+              <a:ext uri="{FF2B5EF4-FFF2-40B4-BE49-F238E27FC236}">
+                <a16:creationId xmlns:a16="http://schemas.microsoft.com/office/drawing/2014/main" id="{C31514B2-331B-4615-A644-9B5A4109572C}"/>
+              </a:ext>
+            </a:extLst>
+          </p:cNvPr>
+          <p:cNvPicPr>
+            <a:picLocks noChangeAspect="1"/>
+          </p:cNvPicPr>
+          <p:nvPr/>
+        </p:nvPicPr>
+        <p:blipFill>
+          <a:blip r:embed="rId3">
+            <a:extLst>
+              <a:ext uri="{28A0092B-C50C-407E-A947-70E740481C1C}">
+                <a14:useLocalDpi xmlns:a14="http://schemas.microsoft.com/office/drawing/2010/main" val="0"/>
+              </a:ext>
+            </a:extLst>
+          </a:blip>
+          <a:stretch>
+            <a:fillRect/>
+          </a:stretch>
+        </p:blipFill>
+        <p:spPr>
+          <a:xfrm>
+            <a:off x="313168" y="3490913"/>
+            <a:ext cx="1079796" cy="1623017"/>
+          </a:xfrm>
+          <a:prstGeom prst="rect">
+            <a:avLst/>
+          </a:prstGeom>
+        </p:spPr>
+      </p:pic>
+      <p:sp>
+        <p:nvSpPr>
+          <p:cNvPr id="8" name="TextBox 7">
+            <a:extLst>
+              <a:ext uri="{FF2B5EF4-FFF2-40B4-BE49-F238E27FC236}">
+                <a16:creationId xmlns:a16="http://schemas.microsoft.com/office/drawing/2014/main" id="{7A89448C-2EF2-459B-8ACF-5CE9A88D5AC6}"/>
+              </a:ext>
+            </a:extLst>
+          </p:cNvPr>
+          <p:cNvSpPr txBox="1"/>
+          <p:nvPr/>
+        </p:nvSpPr>
+        <p:spPr>
+          <a:xfrm>
+            <a:off x="208547" y="5113930"/>
+            <a:ext cx="1259305" cy="369332"/>
+          </a:xfrm>
+          <a:prstGeom prst="rect">
+            <a:avLst/>
+          </a:prstGeom>
+          <a:noFill/>
+        </p:spPr>
+        <p:txBody>
+          <a:bodyPr wrap="square" rtlCol="0">
+            <a:spAutoFit/>
+          </a:bodyPr>
+          <a:lstStyle/>
+          <a:p>
+            <a:pPr algn="ctr"/>
+            <a:r>
+              <a:rPr lang="en-US" b="1" dirty="0">
+                <a:solidFill>
+                  <a:schemeClr val="bg1"/>
+                </a:solidFill>
+                <a:latin typeface="Bradley Hand ITC" panose="03070402050302030203" pitchFamily="66" charset="0"/>
+              </a:rPr>
+              <a:t>PICASSO</a:t>
+            </a:r>
+          </a:p>
+        </p:txBody>
+      </p:sp>
+    </p:spTree>
+    <p:extLst>
+      <p:ext uri="{BB962C8B-B14F-4D97-AF65-F5344CB8AC3E}">
+        <p14:creationId xmlns:p14="http://schemas.microsoft.com/office/powerpoint/2010/main" val="2648040124"/>
+      </p:ext>
+    </p:extLst>
+  </p:cSld>
+  <p:clrMapOvr>
+    <a:masterClrMapping/>
+  </p:clrMapOvr>
+</p:sld>
+</file>
+
+<file path=ppt/slides/slide9.xml><?xml version="1.0" encoding="utf-8"?>
+<p:sld xmlns:a="http://schemas.openxmlformats.org/drawingml/2006/main" xmlns:r="http://schemas.openxmlformats.org/officeDocument/2006/relationships" xmlns:p="http://schemas.openxmlformats.org/presentationml/2006/main">
+  <p:cSld>
+    <p:spTree>
+      <p:nvGrpSpPr>
+        <p:cNvPr id="1" name=""/>
+        <p:cNvGrpSpPr/>
+        <p:nvPr/>
+      </p:nvGrpSpPr>
+      <p:grpSpPr>
+        <a:xfrm>
+          <a:off x="0" y="0"/>
+          <a:ext cx="0" cy="0"/>
+          <a:chOff x="0" y="0"/>
+          <a:chExt cx="0" cy="0"/>
+        </a:xfrm>
+      </p:grpSpPr>
+      <p:sp>
+        <p:nvSpPr>
+          <p:cNvPr id="2" name="Title 1">
+            <a:extLst>
+              <a:ext uri="{FF2B5EF4-FFF2-40B4-BE49-F238E27FC236}">
+                <a16:creationId xmlns:a16="http://schemas.microsoft.com/office/drawing/2014/main" id="{E7EB5BA5-87DD-41AA-B3B4-81DBDF2F9AF4}"/>
+              </a:ext>
+            </a:extLst>
+          </p:cNvPr>
+          <p:cNvSpPr>
+            <a:spLocks noGrp="1"/>
+          </p:cNvSpPr>
+          <p:nvPr>
+            <p:ph type="ctrTitle"/>
+          </p:nvPr>
+        </p:nvSpPr>
+        <p:spPr>
+          <a:xfrm>
+            <a:off x="1990724" y="571500"/>
+            <a:ext cx="9601200" cy="581025"/>
+          </a:xfrm>
+        </p:spPr>
+        <p:txBody>
+          <a:bodyPr>
+            <a:normAutofit fontScale="90000"/>
+          </a:bodyPr>
+          <a:lstStyle/>
+          <a:p>
+            <a:r>
+              <a:rPr lang="en-US" sz="4000" b="1" cap="all" dirty="0">
+                <a:latin typeface="Rockwell" panose="02060603020205020403" pitchFamily="18" charset="0"/>
+              </a:rPr>
+              <a:t>Footnotes</a:t>
+            </a:r>
+          </a:p>
+        </p:txBody>
+      </p:sp>
+      <p:sp>
+        <p:nvSpPr>
+          <p:cNvPr id="3" name="Subtitle 2">
+            <a:extLst>
+              <a:ext uri="{FF2B5EF4-FFF2-40B4-BE49-F238E27FC236}">
+                <a16:creationId xmlns:a16="http://schemas.microsoft.com/office/drawing/2014/main" id="{AB26E057-05F7-4574-B513-2D85CBE6CC15}"/>
+              </a:ext>
+            </a:extLst>
+          </p:cNvPr>
+          <p:cNvSpPr>
+            <a:spLocks noGrp="1"/>
+          </p:cNvSpPr>
+          <p:nvPr>
+            <p:ph type="subTitle" idx="1"/>
+          </p:nvPr>
+        </p:nvSpPr>
+        <p:spPr>
+          <a:xfrm>
+            <a:off x="1990725" y="1152525"/>
+            <a:ext cx="9601199" cy="5257799"/>
+          </a:xfrm>
+        </p:spPr>
+        <p:txBody>
+          <a:bodyPr/>
+          <a:lstStyle/>
+          <a:p>
+            <a:pPr marL="342900" indent="-342900" algn="l">
+              <a:buFont typeface="Wingdings" panose="05000000000000000000" pitchFamily="2" charset="2"/>
+              <a:buChar char="Ø"/>
+            </a:pPr>
+            <a:endParaRPr lang="en-US" dirty="0"/>
+          </a:p>
+          <a:p>
+            <a:pPr marL="230188" indent="-230188" algn="l">
+              <a:buFont typeface="+mj-lt"/>
+              <a:buAutoNum type="arabicPeriod"/>
+            </a:pPr>
+            <a:r>
+              <a:rPr lang="en-US" sz="1800" dirty="0">
+                <a:hlinkClick r:id="rId2"/>
+              </a:rPr>
+              <a:t>https://suburbanstats.org/population/how-many-people-live-in-connecticut </a:t>
+            </a:r>
+          </a:p>
+          <a:p>
+            <a:pPr marL="230188" indent="-230188" algn="l">
+              <a:buFont typeface="+mj-lt"/>
+              <a:buAutoNum type="arabicPeriod"/>
+            </a:pPr>
+            <a:r>
+              <a:rPr lang="en-US" sz="1800" dirty="0">
+                <a:hlinkClick r:id="rId2"/>
+              </a:rPr>
+              <a:t>https://en.wikipedia.org/wiki/List_of_cities_in_Connecticut</a:t>
+            </a:r>
+            <a:endParaRPr lang="en-US" sz="1800" dirty="0"/>
+          </a:p>
+          <a:p>
+            <a:pPr marL="230188" indent="-230188" algn="l">
+              <a:buFont typeface="+mj-lt"/>
+              <a:buAutoNum type="arabicPeriod"/>
+            </a:pPr>
+            <a:r>
+              <a:rPr lang="en-US" sz="1800" dirty="0">
+                <a:hlinkClick r:id="rId3"/>
+              </a:rPr>
+              <a:t>https://en.wikipedia.org/wiki/List_of_colleges_and_universities_in_Connecticut</a:t>
+            </a:r>
+            <a:endParaRPr lang="en-US" sz="1800" dirty="0"/>
+          </a:p>
+          <a:p>
+            <a:pPr marL="230188" indent="-230188" algn="l">
+              <a:buFont typeface="+mj-lt"/>
+              <a:buAutoNum type="arabicPeriod"/>
+            </a:pPr>
+            <a:endParaRPr lang="en-US" sz="1800" dirty="0"/>
+          </a:p>
+        </p:txBody>
+      </p:sp>
+      <p:pic>
+        <p:nvPicPr>
+          <p:cNvPr id="5" name="Picture 4">
+            <a:extLst>
+              <a:ext uri="{FF2B5EF4-FFF2-40B4-BE49-F238E27FC236}">
+                <a16:creationId xmlns:a16="http://schemas.microsoft.com/office/drawing/2014/main" id="{48072B84-5C8E-4C7C-BC9B-81281140D1BD}"/>
+              </a:ext>
+            </a:extLst>
+          </p:cNvPr>
+          <p:cNvPicPr>
+            <a:picLocks noChangeAspect="1"/>
+          </p:cNvPicPr>
+          <p:nvPr/>
+        </p:nvPicPr>
+        <p:blipFill rotWithShape="1">
+          <a:blip r:embed="rId4">
+            <a:extLst>
+              <a:ext uri="{28A0092B-C50C-407E-A947-70E740481C1C}">
+                <a14:useLocalDpi xmlns:a14="http://schemas.microsoft.com/office/drawing/2010/main" val="0"/>
+              </a:ext>
+            </a:extLst>
+          </a:blip>
+          <a:srcRect l="36385" r="37139"/>
+          <a:stretch/>
+        </p:blipFill>
+        <p:spPr>
+          <a:xfrm>
+            <a:off x="0" y="1"/>
+            <a:ext cx="1704975" cy="6876256"/>
+          </a:xfrm>
+          <a:prstGeom prst="rect">
+            <a:avLst/>
+          </a:prstGeom>
+        </p:spPr>
+      </p:pic>
+      <p:pic>
+        <p:nvPicPr>
+          <p:cNvPr id="6" name="Picture 5">
+            <a:extLst>
+              <a:ext uri="{FF2B5EF4-FFF2-40B4-BE49-F238E27FC236}">
+                <a16:creationId xmlns:a16="http://schemas.microsoft.com/office/drawing/2014/main" id="{6C68EC35-8431-4AA3-8647-14D30960EB93}"/>
+              </a:ext>
+            </a:extLst>
+          </p:cNvPr>
+          <p:cNvPicPr>
+            <a:picLocks noChangeAspect="1"/>
+          </p:cNvPicPr>
+          <p:nvPr/>
+        </p:nvPicPr>
+        <p:blipFill>
+          <a:blip r:embed="rId5">
+            <a:extLst>
+              <a:ext uri="{28A0092B-C50C-407E-A947-70E740481C1C}">
+                <a14:useLocalDpi xmlns:a14="http://schemas.microsoft.com/office/drawing/2010/main" val="0"/>
+              </a:ext>
+            </a:extLst>
+          </a:blip>
+          <a:stretch>
+            <a:fillRect/>
+          </a:stretch>
+        </p:blipFill>
+        <p:spPr>
+          <a:xfrm>
+            <a:off x="313168" y="3490913"/>
+            <a:ext cx="1079796" cy="1623017"/>
+          </a:xfrm>
+          <a:prstGeom prst="rect">
+            <a:avLst/>
+          </a:prstGeom>
+        </p:spPr>
+      </p:pic>
+      <p:sp>
+        <p:nvSpPr>
+          <p:cNvPr id="7" name="TextBox 6">
+            <a:extLst>
+              <a:ext uri="{FF2B5EF4-FFF2-40B4-BE49-F238E27FC236}">
+                <a16:creationId xmlns:a16="http://schemas.microsoft.com/office/drawing/2014/main" id="{DBFFCD10-9DBA-4976-8E41-4F700C066C67}"/>
+              </a:ext>
+            </a:extLst>
+          </p:cNvPr>
+          <p:cNvSpPr txBox="1"/>
+          <p:nvPr/>
+        </p:nvSpPr>
+        <p:spPr>
+          <a:xfrm>
+            <a:off x="208547" y="5113930"/>
+            <a:ext cx="1259305" cy="369332"/>
+          </a:xfrm>
+          <a:prstGeom prst="rect">
+            <a:avLst/>
+          </a:prstGeom>
+          <a:noFill/>
+        </p:spPr>
+        <p:txBody>
+          <a:bodyPr wrap="square" rtlCol="0">
+            <a:spAutoFit/>
+          </a:bodyPr>
+          <a:lstStyle/>
+          <a:p>
+            <a:pPr algn="ctr"/>
+            <a:r>
+              <a:rPr lang="en-US" b="1" dirty="0">
+                <a:solidFill>
+                  <a:schemeClr val="bg1"/>
+                </a:solidFill>
+                <a:latin typeface="Bradley Hand ITC" panose="03070402050302030203" pitchFamily="66" charset="0"/>
+              </a:rPr>
+              <a:t>PICASSO</a:t>
+            </a:r>
+          </a:p>
+        </p:txBody>
+      </p:sp>
+    </p:spTree>
+    <p:extLst>
+      <p:ext uri="{BB962C8B-B14F-4D97-AF65-F5344CB8AC3E}">
+        <p14:creationId xmlns:p14="http://schemas.microsoft.com/office/powerpoint/2010/main" val="3778872190"/>
       </p:ext>
     </p:extLst>
   </p:cSld>
@@ -5020,4 +7297,299 @@
     </a:ext>
   </a:extLst>
 </a:theme>
+</file>
+
+<file path=ppt/theme/theme2.xml><?xml version="1.0" encoding="utf-8"?>
+<a:theme xmlns:a="http://schemas.openxmlformats.org/drawingml/2006/main" name="Office Theme">
+  <a:themeElements>
+    <a:clrScheme name="Office">
+      <a:dk1>
+        <a:sysClr val="windowText" lastClr="000000"/>
+      </a:dk1>
+      <a:lt1>
+        <a:sysClr val="window" lastClr="FFFFFF"/>
+      </a:lt1>
+      <a:dk2>
+        <a:srgbClr val="44546A"/>
+      </a:dk2>
+      <a:lt2>
+        <a:srgbClr val="E7E6E6"/>
+      </a:lt2>
+      <a:accent1>
+        <a:srgbClr val="4472C4"/>
+      </a:accent1>
+      <a:accent2>
+        <a:srgbClr val="ED7D31"/>
+      </a:accent2>
+      <a:accent3>
+        <a:srgbClr val="A5A5A5"/>
+      </a:accent3>
+      <a:accent4>
+        <a:srgbClr val="FFC000"/>
+      </a:accent4>
+      <a:accent5>
+        <a:srgbClr val="5B9BD5"/>
+      </a:accent5>
+      <a:accent6>
+        <a:srgbClr val="70AD47"/>
+      </a:accent6>
+      <a:hlink>
+        <a:srgbClr val="0563C1"/>
+      </a:hlink>
+      <a:folHlink>
+        <a:srgbClr val="954F72"/>
+      </a:folHlink>
+    </a:clrScheme>
+    <a:fontScheme name="Office">
+      <a:majorFont>
+        <a:latin typeface="Calibri Light" panose="020F0302020204030204"/>
+        <a:ea typeface=""/>
+        <a:cs typeface=""/>
+        <a:font script="Jpan" typeface="游ゴシック Light"/>
+        <a:font script="Hang" typeface="맑은 고딕"/>
+        <a:font script="Hans" typeface="等线 Light"/>
+        <a:font script="Hant" typeface="新細明體"/>
+        <a:font script="Arab" typeface="Times New Roman"/>
+        <a:font script="Hebr" typeface="Times New Roman"/>
+        <a:font script="Thai" typeface="Angsana New"/>
+        <a:font script="Ethi" typeface="Nyala"/>
+        <a:font script="Beng" typeface="Vrinda"/>
+        <a:font script="Gujr" typeface="Shruti"/>
+        <a:font script="Khmr" typeface="MoolBoran"/>
+        <a:font script="Knda" typeface="Tunga"/>
+        <a:font script="Guru" typeface="Raavi"/>
+        <a:font script="Cans" typeface="Euphemia"/>
+        <a:font script="Cher" typeface="Plantagenet Cherokee"/>
+        <a:font script="Yiii" typeface="Microsoft Yi Baiti"/>
+        <a:font script="Tibt" typeface="Microsoft Himalaya"/>
+        <a:font script="Thaa" typeface="MV Boli"/>
+        <a:font script="Deva" typeface="Mangal"/>
+        <a:font script="Telu" typeface="Gautami"/>
+        <a:font script="Taml" typeface="Latha"/>
+        <a:font script="Syrc" typeface="Estrangelo Edessa"/>
+        <a:font script="Orya" typeface="Kalinga"/>
+        <a:font script="Mlym" typeface="Kartika"/>
+        <a:font script="Laoo" typeface="DokChampa"/>
+        <a:font script="Sinh" typeface="Iskoola Pota"/>
+        <a:font script="Mong" typeface="Mongolian Baiti"/>
+        <a:font script="Viet" typeface="Times New Roman"/>
+        <a:font script="Uigh" typeface="Microsoft Uighur"/>
+        <a:font script="Geor" typeface="Sylfaen"/>
+        <a:font script="Armn" typeface="Arial"/>
+        <a:font script="Bugi" typeface="Leelawadee UI"/>
+        <a:font script="Bopo" typeface="Microsoft JhengHei"/>
+        <a:font script="Java" typeface="Javanese Text"/>
+        <a:font script="Lisu" typeface="Segoe UI"/>
+        <a:font script="Mymr" typeface="Myanmar Text"/>
+        <a:font script="Nkoo" typeface="Ebrima"/>
+        <a:font script="Olck" typeface="Nirmala UI"/>
+        <a:font script="Osma" typeface="Ebrima"/>
+        <a:font script="Phag" typeface="Phagspa"/>
+        <a:font script="Syrn" typeface="Estrangelo Edessa"/>
+        <a:font script="Syrj" typeface="Estrangelo Edessa"/>
+        <a:font script="Syre" typeface="Estrangelo Edessa"/>
+        <a:font script="Sora" typeface="Nirmala UI"/>
+        <a:font script="Tale" typeface="Microsoft Tai Le"/>
+        <a:font script="Talu" typeface="Microsoft New Tai Lue"/>
+        <a:font script="Tfng" typeface="Ebrima"/>
+      </a:majorFont>
+      <a:minorFont>
+        <a:latin typeface="Calibri" panose="020F0502020204030204"/>
+        <a:ea typeface=""/>
+        <a:cs typeface=""/>
+        <a:font script="Jpan" typeface="游ゴシック"/>
+        <a:font script="Hang" typeface="맑은 고딕"/>
+        <a:font script="Hans" typeface="等线"/>
+        <a:font script="Hant" typeface="新細明體"/>
+        <a:font script="Arab" typeface="Arial"/>
+        <a:font script="Hebr" typeface="Arial"/>
+        <a:font script="Thai" typeface="Cordia New"/>
+        <a:font script="Ethi" typeface="Nyala"/>
+        <a:font script="Beng" typeface="Vrinda"/>
+        <a:font script="Gujr" typeface="Shruti"/>
+        <a:font script="Khmr" typeface="DaunPenh"/>
+        <a:font script="Knda" typeface="Tunga"/>
+        <a:font script="Guru" typeface="Raavi"/>
+        <a:font script="Cans" typeface="Euphemia"/>
+        <a:font script="Cher" typeface="Plantagenet Cherokee"/>
+        <a:font script="Yiii" typeface="Microsoft Yi Baiti"/>
+        <a:font script="Tibt" typeface="Microsoft Himalaya"/>
+        <a:font script="Thaa" typeface="MV Boli"/>
+        <a:font script="Deva" typeface="Mangal"/>
+        <a:font script="Telu" typeface="Gautami"/>
+        <a:font script="Taml" typeface="Latha"/>
+        <a:font script="Syrc" typeface="Estrangelo Edessa"/>
+        <a:font script="Orya" typeface="Kalinga"/>
+        <a:font script="Mlym" typeface="Kartika"/>
+        <a:font script="Laoo" typeface="DokChampa"/>
+        <a:font script="Sinh" typeface="Iskoola Pota"/>
+        <a:font script="Mong" typeface="Mongolian Baiti"/>
+        <a:font script="Viet" typeface="Arial"/>
+        <a:font script="Uigh" typeface="Microsoft Uighur"/>
+        <a:font script="Geor" typeface="Sylfaen"/>
+        <a:font script="Armn" typeface="Arial"/>
+        <a:font script="Bugi" typeface="Leelawadee UI"/>
+        <a:font script="Bopo" typeface="Microsoft JhengHei"/>
+        <a:font script="Java" typeface="Javanese Text"/>
+        <a:font script="Lisu" typeface="Segoe UI"/>
+        <a:font script="Mymr" typeface="Myanmar Text"/>
+        <a:font script="Nkoo" typeface="Ebrima"/>
+        <a:font script="Olck" typeface="Nirmala UI"/>
+        <a:font script="Osma" typeface="Ebrima"/>
+        <a:font script="Phag" typeface="Phagspa"/>
+        <a:font script="Syrn" typeface="Estrangelo Edessa"/>
+        <a:font script="Syrj" typeface="Estrangelo Edessa"/>
+        <a:font script="Syre" typeface="Estrangelo Edessa"/>
+        <a:font script="Sora" typeface="Nirmala UI"/>
+        <a:font script="Tale" typeface="Microsoft Tai Le"/>
+        <a:font script="Talu" typeface="Microsoft New Tai Lue"/>
+        <a:font script="Tfng" typeface="Ebrima"/>
+      </a:minorFont>
+    </a:fontScheme>
+    <a:fmtScheme name="Office">
+      <a:fillStyleLst>
+        <a:solidFill>
+          <a:schemeClr val="phClr"/>
+        </a:solidFill>
+        <a:gradFill rotWithShape="1">
+          <a:gsLst>
+            <a:gs pos="0">
+              <a:schemeClr val="phClr">
+                <a:lumMod val="110000"/>
+                <a:satMod val="105000"/>
+                <a:tint val="67000"/>
+              </a:schemeClr>
+            </a:gs>
+            <a:gs pos="50000">
+              <a:schemeClr val="phClr">
+                <a:lumMod val="105000"/>
+                <a:satMod val="103000"/>
+                <a:tint val="73000"/>
+              </a:schemeClr>
+            </a:gs>
+            <a:gs pos="100000">
+              <a:schemeClr val="phClr">
+                <a:lumMod val="105000"/>
+                <a:satMod val="109000"/>
+                <a:tint val="81000"/>
+              </a:schemeClr>
+            </a:gs>
+          </a:gsLst>
+          <a:lin ang="5400000" scaled="0"/>
+        </a:gradFill>
+        <a:gradFill rotWithShape="1">
+          <a:gsLst>
+            <a:gs pos="0">
+              <a:schemeClr val="phClr">
+                <a:satMod val="103000"/>
+                <a:lumMod val="102000"/>
+                <a:tint val="94000"/>
+              </a:schemeClr>
+            </a:gs>
+            <a:gs pos="50000">
+              <a:schemeClr val="phClr">
+                <a:satMod val="110000"/>
+                <a:lumMod val="100000"/>
+                <a:shade val="100000"/>
+              </a:schemeClr>
+            </a:gs>
+            <a:gs pos="100000">
+              <a:schemeClr val="phClr">
+                <a:lumMod val="99000"/>
+                <a:satMod val="120000"/>
+                <a:shade val="78000"/>
+              </a:schemeClr>
+            </a:gs>
+          </a:gsLst>
+          <a:lin ang="5400000" scaled="0"/>
+        </a:gradFill>
+      </a:fillStyleLst>
+      <a:lnStyleLst>
+        <a:ln w="6350" cap="flat" cmpd="sng" algn="ctr">
+          <a:solidFill>
+            <a:schemeClr val="phClr"/>
+          </a:solidFill>
+          <a:prstDash val="solid"/>
+          <a:miter lim="800000"/>
+        </a:ln>
+        <a:ln w="12700" cap="flat" cmpd="sng" algn="ctr">
+          <a:solidFill>
+            <a:schemeClr val="phClr"/>
+          </a:solidFill>
+          <a:prstDash val="solid"/>
+          <a:miter lim="800000"/>
+        </a:ln>
+        <a:ln w="19050" cap="flat" cmpd="sng" algn="ctr">
+          <a:solidFill>
+            <a:schemeClr val="phClr"/>
+          </a:solidFill>
+          <a:prstDash val="solid"/>
+          <a:miter lim="800000"/>
+        </a:ln>
+      </a:lnStyleLst>
+      <a:effectStyleLst>
+        <a:effectStyle>
+          <a:effectLst/>
+        </a:effectStyle>
+        <a:effectStyle>
+          <a:effectLst/>
+        </a:effectStyle>
+        <a:effectStyle>
+          <a:effectLst>
+            <a:outerShdw blurRad="57150" dist="19050" dir="5400000" algn="ctr" rotWithShape="0">
+              <a:srgbClr val="000000">
+                <a:alpha val="63000"/>
+              </a:srgbClr>
+            </a:outerShdw>
+          </a:effectLst>
+        </a:effectStyle>
+      </a:effectStyleLst>
+      <a:bgFillStyleLst>
+        <a:solidFill>
+          <a:schemeClr val="phClr"/>
+        </a:solidFill>
+        <a:solidFill>
+          <a:schemeClr val="phClr">
+            <a:tint val="95000"/>
+            <a:satMod val="170000"/>
+          </a:schemeClr>
+        </a:solidFill>
+        <a:gradFill rotWithShape="1">
+          <a:gsLst>
+            <a:gs pos="0">
+              <a:schemeClr val="phClr">
+                <a:tint val="93000"/>
+                <a:satMod val="150000"/>
+                <a:shade val="98000"/>
+                <a:lumMod val="102000"/>
+              </a:schemeClr>
+            </a:gs>
+            <a:gs pos="50000">
+              <a:schemeClr val="phClr">
+                <a:tint val="98000"/>
+                <a:satMod val="130000"/>
+                <a:shade val="90000"/>
+                <a:lumMod val="103000"/>
+              </a:schemeClr>
+            </a:gs>
+            <a:gs pos="100000">
+              <a:schemeClr val="phClr">
+                <a:shade val="63000"/>
+                <a:satMod val="120000"/>
+              </a:schemeClr>
+            </a:gs>
+          </a:gsLst>
+          <a:lin ang="5400000" scaled="0"/>
+        </a:gradFill>
+      </a:bgFillStyleLst>
+    </a:fmtScheme>
+  </a:themeElements>
+  <a:objectDefaults/>
+  <a:extraClrSchemeLst/>
+  <a:extLst>
+    <a:ext uri="{05A4C25C-085E-4340-85A3-A5531E510DB2}">
+      <thm15:themeFamily xmlns:thm15="http://schemas.microsoft.com/office/thememl/2012/main" name="Office Theme" id="{62F939B6-93AF-4DB8-9C6B-D6C7DFDC589F}" vid="{4A3C46E8-61CC-4603-A589-7422A47A8E4A}"/>
+    </a:ext>
+  </a:extLst>
+</a:theme>
 </file>
</xml_diff>

<commit_message>
Refinement of the presentation slides
Signed-off-by: kjurekSMU <45209579+kjurekSMU@users.noreply.github.com>
</commit_message>
<xml_diff>
--- a/Beer_Expansion_Project.pptx
+++ b/Beer_Expansion_Project.pptx
@@ -210,7 +210,7 @@
           <a:p>
             <a:fld id="{73F231FB-2A93-4DDD-97F2-FAA600697AA9}" type="datetimeFigureOut">
               <a:rPr lang="en-US" smtClean="0"/>
-              <a:t>1/3/2019</a:t>
+              <a:t>1/4/2019</a:t>
             </a:fld>
             <a:endParaRPr lang="en-US"/>
           </a:p>
@@ -477,6 +477,1182 @@
 </p:notesMaster>
 </file>
 
+<file path=ppt/notesSlides/notesSlide1.xml><?xml version="1.0" encoding="utf-8"?>
+<p:notes xmlns:a="http://schemas.openxmlformats.org/drawingml/2006/main" xmlns:r="http://schemas.openxmlformats.org/officeDocument/2006/relationships" xmlns:p="http://schemas.openxmlformats.org/presentationml/2006/main">
+  <p:cSld>
+    <p:spTree>
+      <p:nvGrpSpPr>
+        <p:cNvPr id="1" name=""/>
+        <p:cNvGrpSpPr/>
+        <p:nvPr/>
+      </p:nvGrpSpPr>
+      <p:grpSpPr>
+        <a:xfrm>
+          <a:off x="0" y="0"/>
+          <a:ext cx="0" cy="0"/>
+          <a:chOff x="0" y="0"/>
+          <a:chExt cx="0" cy="0"/>
+        </a:xfrm>
+      </p:grpSpPr>
+      <p:sp>
+        <p:nvSpPr>
+          <p:cNvPr id="2" name="Slide Image Placeholder 1"/>
+          <p:cNvSpPr>
+            <a:spLocks noGrp="1" noRot="1" noChangeAspect="1"/>
+          </p:cNvSpPr>
+          <p:nvPr>
+            <p:ph type="sldImg"/>
+          </p:nvPr>
+        </p:nvSpPr>
+        <p:spPr/>
+      </p:sp>
+      <p:sp>
+        <p:nvSpPr>
+          <p:cNvPr id="3" name="Notes Placeholder 2"/>
+          <p:cNvSpPr>
+            <a:spLocks noGrp="1"/>
+          </p:cNvSpPr>
+          <p:nvPr>
+            <p:ph type="body" idx="1"/>
+          </p:nvPr>
+        </p:nvSpPr>
+        <p:spPr/>
+        <p:txBody>
+          <a:bodyPr/>
+          <a:lstStyle/>
+          <a:p>
+            <a:endParaRPr lang="en-US" dirty="0"/>
+          </a:p>
+        </p:txBody>
+      </p:sp>
+      <p:sp>
+        <p:nvSpPr>
+          <p:cNvPr id="4" name="Slide Number Placeholder 3"/>
+          <p:cNvSpPr>
+            <a:spLocks noGrp="1"/>
+          </p:cNvSpPr>
+          <p:nvPr>
+            <p:ph type="sldNum" sz="quarter" idx="5"/>
+          </p:nvPr>
+        </p:nvSpPr>
+        <p:spPr/>
+        <p:txBody>
+          <a:bodyPr/>
+          <a:lstStyle/>
+          <a:p>
+            <a:fld id="{3BA84395-5BDD-4359-B2D9-32864B2540BF}" type="slidenum">
+              <a:rPr lang="en-US" smtClean="0"/>
+              <a:t>1</a:t>
+            </a:fld>
+            <a:endParaRPr lang="en-US"/>
+          </a:p>
+        </p:txBody>
+      </p:sp>
+    </p:spTree>
+    <p:extLst>
+      <p:ext uri="{BB962C8B-B14F-4D97-AF65-F5344CB8AC3E}">
+        <p14:creationId xmlns:p14="http://schemas.microsoft.com/office/powerpoint/2010/main" val="3786836302"/>
+      </p:ext>
+    </p:extLst>
+  </p:cSld>
+  <p:clrMapOvr>
+    <a:masterClrMapping/>
+  </p:clrMapOvr>
+</p:notes>
+</file>
+
+<file path=ppt/notesSlides/notesSlide10.xml><?xml version="1.0" encoding="utf-8"?>
+<p:notes xmlns:a="http://schemas.openxmlformats.org/drawingml/2006/main" xmlns:r="http://schemas.openxmlformats.org/officeDocument/2006/relationships" xmlns:p="http://schemas.openxmlformats.org/presentationml/2006/main">
+  <p:cSld>
+    <p:spTree>
+      <p:nvGrpSpPr>
+        <p:cNvPr id="1" name=""/>
+        <p:cNvGrpSpPr/>
+        <p:nvPr/>
+      </p:nvGrpSpPr>
+      <p:grpSpPr>
+        <a:xfrm>
+          <a:off x="0" y="0"/>
+          <a:ext cx="0" cy="0"/>
+          <a:chOff x="0" y="0"/>
+          <a:chExt cx="0" cy="0"/>
+        </a:xfrm>
+      </p:grpSpPr>
+      <p:sp>
+        <p:nvSpPr>
+          <p:cNvPr id="2" name="Slide Image Placeholder 1"/>
+          <p:cNvSpPr>
+            <a:spLocks noGrp="1" noRot="1" noChangeAspect="1"/>
+          </p:cNvSpPr>
+          <p:nvPr>
+            <p:ph type="sldImg"/>
+          </p:nvPr>
+        </p:nvSpPr>
+        <p:spPr/>
+      </p:sp>
+      <p:sp>
+        <p:nvSpPr>
+          <p:cNvPr id="3" name="Notes Placeholder 2"/>
+          <p:cNvSpPr>
+            <a:spLocks noGrp="1"/>
+          </p:cNvSpPr>
+          <p:nvPr>
+            <p:ph type="body" idx="1"/>
+          </p:nvPr>
+        </p:nvSpPr>
+        <p:spPr/>
+        <p:txBody>
+          <a:bodyPr/>
+          <a:lstStyle/>
+          <a:p>
+            <a:endParaRPr lang="en-US" dirty="0"/>
+          </a:p>
+        </p:txBody>
+      </p:sp>
+      <p:sp>
+        <p:nvSpPr>
+          <p:cNvPr id="4" name="Slide Number Placeholder 3"/>
+          <p:cNvSpPr>
+            <a:spLocks noGrp="1"/>
+          </p:cNvSpPr>
+          <p:nvPr>
+            <p:ph type="sldNum" sz="quarter" idx="5"/>
+          </p:nvPr>
+        </p:nvSpPr>
+        <p:spPr/>
+        <p:txBody>
+          <a:bodyPr/>
+          <a:lstStyle/>
+          <a:p>
+            <a:fld id="{3BA84395-5BDD-4359-B2D9-32864B2540BF}" type="slidenum">
+              <a:rPr lang="en-US" smtClean="0"/>
+              <a:t>10</a:t>
+            </a:fld>
+            <a:endParaRPr lang="en-US"/>
+          </a:p>
+        </p:txBody>
+      </p:sp>
+    </p:spTree>
+    <p:extLst>
+      <p:ext uri="{BB962C8B-B14F-4D97-AF65-F5344CB8AC3E}">
+        <p14:creationId xmlns:p14="http://schemas.microsoft.com/office/powerpoint/2010/main" val="498278250"/>
+      </p:ext>
+    </p:extLst>
+  </p:cSld>
+  <p:clrMapOvr>
+    <a:masterClrMapping/>
+  </p:clrMapOvr>
+</p:notes>
+</file>
+
+<file path=ppt/notesSlides/notesSlide11.xml><?xml version="1.0" encoding="utf-8"?>
+<p:notes xmlns:a="http://schemas.openxmlformats.org/drawingml/2006/main" xmlns:r="http://schemas.openxmlformats.org/officeDocument/2006/relationships" xmlns:p="http://schemas.openxmlformats.org/presentationml/2006/main">
+  <p:cSld>
+    <p:spTree>
+      <p:nvGrpSpPr>
+        <p:cNvPr id="1" name=""/>
+        <p:cNvGrpSpPr/>
+        <p:nvPr/>
+      </p:nvGrpSpPr>
+      <p:grpSpPr>
+        <a:xfrm>
+          <a:off x="0" y="0"/>
+          <a:ext cx="0" cy="0"/>
+          <a:chOff x="0" y="0"/>
+          <a:chExt cx="0" cy="0"/>
+        </a:xfrm>
+      </p:grpSpPr>
+      <p:sp>
+        <p:nvSpPr>
+          <p:cNvPr id="2" name="Slide Image Placeholder 1"/>
+          <p:cNvSpPr>
+            <a:spLocks noGrp="1" noRot="1" noChangeAspect="1"/>
+          </p:cNvSpPr>
+          <p:nvPr>
+            <p:ph type="sldImg"/>
+          </p:nvPr>
+        </p:nvSpPr>
+        <p:spPr/>
+      </p:sp>
+      <p:sp>
+        <p:nvSpPr>
+          <p:cNvPr id="3" name="Notes Placeholder 2"/>
+          <p:cNvSpPr>
+            <a:spLocks noGrp="1"/>
+          </p:cNvSpPr>
+          <p:nvPr>
+            <p:ph type="body" idx="1"/>
+          </p:nvPr>
+        </p:nvSpPr>
+        <p:spPr/>
+        <p:txBody>
+          <a:bodyPr/>
+          <a:lstStyle/>
+          <a:p>
+            <a:endParaRPr lang="en-US" dirty="0"/>
+          </a:p>
+        </p:txBody>
+      </p:sp>
+      <p:sp>
+        <p:nvSpPr>
+          <p:cNvPr id="4" name="Slide Number Placeholder 3"/>
+          <p:cNvSpPr>
+            <a:spLocks noGrp="1"/>
+          </p:cNvSpPr>
+          <p:nvPr>
+            <p:ph type="sldNum" sz="quarter" idx="5"/>
+          </p:nvPr>
+        </p:nvSpPr>
+        <p:spPr/>
+        <p:txBody>
+          <a:bodyPr/>
+          <a:lstStyle/>
+          <a:p>
+            <a:fld id="{3BA84395-5BDD-4359-B2D9-32864B2540BF}" type="slidenum">
+              <a:rPr lang="en-US" smtClean="0"/>
+              <a:t>11</a:t>
+            </a:fld>
+            <a:endParaRPr lang="en-US"/>
+          </a:p>
+        </p:txBody>
+      </p:sp>
+    </p:spTree>
+    <p:extLst>
+      <p:ext uri="{BB962C8B-B14F-4D97-AF65-F5344CB8AC3E}">
+        <p14:creationId xmlns:p14="http://schemas.microsoft.com/office/powerpoint/2010/main" val="3878428057"/>
+      </p:ext>
+    </p:extLst>
+  </p:cSld>
+  <p:clrMapOvr>
+    <a:masterClrMapping/>
+  </p:clrMapOvr>
+</p:notes>
+</file>
+
+<file path=ppt/notesSlides/notesSlide12.xml><?xml version="1.0" encoding="utf-8"?>
+<p:notes xmlns:a="http://schemas.openxmlformats.org/drawingml/2006/main" xmlns:r="http://schemas.openxmlformats.org/officeDocument/2006/relationships" xmlns:p="http://schemas.openxmlformats.org/presentationml/2006/main">
+  <p:cSld>
+    <p:spTree>
+      <p:nvGrpSpPr>
+        <p:cNvPr id="1" name=""/>
+        <p:cNvGrpSpPr/>
+        <p:nvPr/>
+      </p:nvGrpSpPr>
+      <p:grpSpPr>
+        <a:xfrm>
+          <a:off x="0" y="0"/>
+          <a:ext cx="0" cy="0"/>
+          <a:chOff x="0" y="0"/>
+          <a:chExt cx="0" cy="0"/>
+        </a:xfrm>
+      </p:grpSpPr>
+      <p:sp>
+        <p:nvSpPr>
+          <p:cNvPr id="2" name="Slide Image Placeholder 1"/>
+          <p:cNvSpPr>
+            <a:spLocks noGrp="1" noRot="1" noChangeAspect="1"/>
+          </p:cNvSpPr>
+          <p:nvPr>
+            <p:ph type="sldImg"/>
+          </p:nvPr>
+        </p:nvSpPr>
+        <p:spPr/>
+      </p:sp>
+      <p:sp>
+        <p:nvSpPr>
+          <p:cNvPr id="3" name="Notes Placeholder 2"/>
+          <p:cNvSpPr>
+            <a:spLocks noGrp="1"/>
+          </p:cNvSpPr>
+          <p:nvPr>
+            <p:ph type="body" idx="1"/>
+          </p:nvPr>
+        </p:nvSpPr>
+        <p:spPr/>
+        <p:txBody>
+          <a:bodyPr/>
+          <a:lstStyle/>
+          <a:p>
+            <a:endParaRPr lang="en-US" dirty="0"/>
+          </a:p>
+        </p:txBody>
+      </p:sp>
+      <p:sp>
+        <p:nvSpPr>
+          <p:cNvPr id="4" name="Slide Number Placeholder 3"/>
+          <p:cNvSpPr>
+            <a:spLocks noGrp="1"/>
+          </p:cNvSpPr>
+          <p:nvPr>
+            <p:ph type="sldNum" sz="quarter" idx="5"/>
+          </p:nvPr>
+        </p:nvSpPr>
+        <p:spPr/>
+        <p:txBody>
+          <a:bodyPr/>
+          <a:lstStyle/>
+          <a:p>
+            <a:fld id="{3BA84395-5BDD-4359-B2D9-32864B2540BF}" type="slidenum">
+              <a:rPr lang="en-US" smtClean="0"/>
+              <a:t>12</a:t>
+            </a:fld>
+            <a:endParaRPr lang="en-US"/>
+          </a:p>
+        </p:txBody>
+      </p:sp>
+    </p:spTree>
+    <p:extLst>
+      <p:ext uri="{BB962C8B-B14F-4D97-AF65-F5344CB8AC3E}">
+        <p14:creationId xmlns:p14="http://schemas.microsoft.com/office/powerpoint/2010/main" val="740003172"/>
+      </p:ext>
+    </p:extLst>
+  </p:cSld>
+  <p:clrMapOvr>
+    <a:masterClrMapping/>
+  </p:clrMapOvr>
+</p:notes>
+</file>
+
+<file path=ppt/notesSlides/notesSlide13.xml><?xml version="1.0" encoding="utf-8"?>
+<p:notes xmlns:a="http://schemas.openxmlformats.org/drawingml/2006/main" xmlns:r="http://schemas.openxmlformats.org/officeDocument/2006/relationships" xmlns:p="http://schemas.openxmlformats.org/presentationml/2006/main">
+  <p:cSld>
+    <p:spTree>
+      <p:nvGrpSpPr>
+        <p:cNvPr id="1" name=""/>
+        <p:cNvGrpSpPr/>
+        <p:nvPr/>
+      </p:nvGrpSpPr>
+      <p:grpSpPr>
+        <a:xfrm>
+          <a:off x="0" y="0"/>
+          <a:ext cx="0" cy="0"/>
+          <a:chOff x="0" y="0"/>
+          <a:chExt cx="0" cy="0"/>
+        </a:xfrm>
+      </p:grpSpPr>
+      <p:sp>
+        <p:nvSpPr>
+          <p:cNvPr id="2" name="Slide Image Placeholder 1"/>
+          <p:cNvSpPr>
+            <a:spLocks noGrp="1" noRot="1" noChangeAspect="1"/>
+          </p:cNvSpPr>
+          <p:nvPr>
+            <p:ph type="sldImg"/>
+          </p:nvPr>
+        </p:nvSpPr>
+        <p:spPr/>
+      </p:sp>
+      <p:sp>
+        <p:nvSpPr>
+          <p:cNvPr id="3" name="Notes Placeholder 2"/>
+          <p:cNvSpPr>
+            <a:spLocks noGrp="1"/>
+          </p:cNvSpPr>
+          <p:nvPr>
+            <p:ph type="body" idx="1"/>
+          </p:nvPr>
+        </p:nvSpPr>
+        <p:spPr/>
+        <p:txBody>
+          <a:bodyPr/>
+          <a:lstStyle/>
+          <a:p>
+            <a:endParaRPr lang="en-US" dirty="0"/>
+          </a:p>
+        </p:txBody>
+      </p:sp>
+      <p:sp>
+        <p:nvSpPr>
+          <p:cNvPr id="4" name="Slide Number Placeholder 3"/>
+          <p:cNvSpPr>
+            <a:spLocks noGrp="1"/>
+          </p:cNvSpPr>
+          <p:nvPr>
+            <p:ph type="sldNum" sz="quarter" idx="5"/>
+          </p:nvPr>
+        </p:nvSpPr>
+        <p:spPr/>
+        <p:txBody>
+          <a:bodyPr/>
+          <a:lstStyle/>
+          <a:p>
+            <a:fld id="{3BA84395-5BDD-4359-B2D9-32864B2540BF}" type="slidenum">
+              <a:rPr lang="en-US" smtClean="0"/>
+              <a:t>13</a:t>
+            </a:fld>
+            <a:endParaRPr lang="en-US"/>
+          </a:p>
+        </p:txBody>
+      </p:sp>
+    </p:spTree>
+    <p:extLst>
+      <p:ext uri="{BB962C8B-B14F-4D97-AF65-F5344CB8AC3E}">
+        <p14:creationId xmlns:p14="http://schemas.microsoft.com/office/powerpoint/2010/main" val="183502640"/>
+      </p:ext>
+    </p:extLst>
+  </p:cSld>
+  <p:clrMapOvr>
+    <a:masterClrMapping/>
+  </p:clrMapOvr>
+</p:notes>
+</file>
+
+<file path=ppt/notesSlides/notesSlide14.xml><?xml version="1.0" encoding="utf-8"?>
+<p:notes xmlns:a="http://schemas.openxmlformats.org/drawingml/2006/main" xmlns:r="http://schemas.openxmlformats.org/officeDocument/2006/relationships" xmlns:p="http://schemas.openxmlformats.org/presentationml/2006/main">
+  <p:cSld>
+    <p:spTree>
+      <p:nvGrpSpPr>
+        <p:cNvPr id="1" name=""/>
+        <p:cNvGrpSpPr/>
+        <p:nvPr/>
+      </p:nvGrpSpPr>
+      <p:grpSpPr>
+        <a:xfrm>
+          <a:off x="0" y="0"/>
+          <a:ext cx="0" cy="0"/>
+          <a:chOff x="0" y="0"/>
+          <a:chExt cx="0" cy="0"/>
+        </a:xfrm>
+      </p:grpSpPr>
+      <p:sp>
+        <p:nvSpPr>
+          <p:cNvPr id="2" name="Slide Image Placeholder 1"/>
+          <p:cNvSpPr>
+            <a:spLocks noGrp="1" noRot="1" noChangeAspect="1"/>
+          </p:cNvSpPr>
+          <p:nvPr>
+            <p:ph type="sldImg"/>
+          </p:nvPr>
+        </p:nvSpPr>
+        <p:spPr/>
+      </p:sp>
+      <p:sp>
+        <p:nvSpPr>
+          <p:cNvPr id="3" name="Notes Placeholder 2"/>
+          <p:cNvSpPr>
+            <a:spLocks noGrp="1"/>
+          </p:cNvSpPr>
+          <p:nvPr>
+            <p:ph type="body" idx="1"/>
+          </p:nvPr>
+        </p:nvSpPr>
+        <p:spPr/>
+        <p:txBody>
+          <a:bodyPr/>
+          <a:lstStyle/>
+          <a:p>
+            <a:endParaRPr lang="en-US" dirty="0"/>
+          </a:p>
+        </p:txBody>
+      </p:sp>
+      <p:sp>
+        <p:nvSpPr>
+          <p:cNvPr id="4" name="Slide Number Placeholder 3"/>
+          <p:cNvSpPr>
+            <a:spLocks noGrp="1"/>
+          </p:cNvSpPr>
+          <p:nvPr>
+            <p:ph type="sldNum" sz="quarter" idx="5"/>
+          </p:nvPr>
+        </p:nvSpPr>
+        <p:spPr/>
+        <p:txBody>
+          <a:bodyPr/>
+          <a:lstStyle/>
+          <a:p>
+            <a:fld id="{3BA84395-5BDD-4359-B2D9-32864B2540BF}" type="slidenum">
+              <a:rPr lang="en-US" smtClean="0"/>
+              <a:t>14</a:t>
+            </a:fld>
+            <a:endParaRPr lang="en-US"/>
+          </a:p>
+        </p:txBody>
+      </p:sp>
+    </p:spTree>
+    <p:extLst>
+      <p:ext uri="{BB962C8B-B14F-4D97-AF65-F5344CB8AC3E}">
+        <p14:creationId xmlns:p14="http://schemas.microsoft.com/office/powerpoint/2010/main" val="1356222236"/>
+      </p:ext>
+    </p:extLst>
+  </p:cSld>
+  <p:clrMapOvr>
+    <a:masterClrMapping/>
+  </p:clrMapOvr>
+</p:notes>
+</file>
+
+<file path=ppt/notesSlides/notesSlide2.xml><?xml version="1.0" encoding="utf-8"?>
+<p:notes xmlns:a="http://schemas.openxmlformats.org/drawingml/2006/main" xmlns:r="http://schemas.openxmlformats.org/officeDocument/2006/relationships" xmlns:p="http://schemas.openxmlformats.org/presentationml/2006/main">
+  <p:cSld>
+    <p:spTree>
+      <p:nvGrpSpPr>
+        <p:cNvPr id="1" name=""/>
+        <p:cNvGrpSpPr/>
+        <p:nvPr/>
+      </p:nvGrpSpPr>
+      <p:grpSpPr>
+        <a:xfrm>
+          <a:off x="0" y="0"/>
+          <a:ext cx="0" cy="0"/>
+          <a:chOff x="0" y="0"/>
+          <a:chExt cx="0" cy="0"/>
+        </a:xfrm>
+      </p:grpSpPr>
+      <p:sp>
+        <p:nvSpPr>
+          <p:cNvPr id="2" name="Slide Image Placeholder 1"/>
+          <p:cNvSpPr>
+            <a:spLocks noGrp="1" noRot="1" noChangeAspect="1"/>
+          </p:cNvSpPr>
+          <p:nvPr>
+            <p:ph type="sldImg"/>
+          </p:nvPr>
+        </p:nvSpPr>
+        <p:spPr/>
+      </p:sp>
+      <p:sp>
+        <p:nvSpPr>
+          <p:cNvPr id="3" name="Notes Placeholder 2"/>
+          <p:cNvSpPr>
+            <a:spLocks noGrp="1"/>
+          </p:cNvSpPr>
+          <p:nvPr>
+            <p:ph type="body" idx="1"/>
+          </p:nvPr>
+        </p:nvSpPr>
+        <p:spPr/>
+        <p:txBody>
+          <a:bodyPr/>
+          <a:lstStyle/>
+          <a:p>
+            <a:endParaRPr lang="en-US" dirty="0"/>
+          </a:p>
+        </p:txBody>
+      </p:sp>
+      <p:sp>
+        <p:nvSpPr>
+          <p:cNvPr id="4" name="Slide Number Placeholder 3"/>
+          <p:cNvSpPr>
+            <a:spLocks noGrp="1"/>
+          </p:cNvSpPr>
+          <p:nvPr>
+            <p:ph type="sldNum" sz="quarter" idx="5"/>
+          </p:nvPr>
+        </p:nvSpPr>
+        <p:spPr/>
+        <p:txBody>
+          <a:bodyPr/>
+          <a:lstStyle/>
+          <a:p>
+            <a:fld id="{3BA84395-5BDD-4359-B2D9-32864B2540BF}" type="slidenum">
+              <a:rPr lang="en-US" smtClean="0"/>
+              <a:t>2</a:t>
+            </a:fld>
+            <a:endParaRPr lang="en-US"/>
+          </a:p>
+        </p:txBody>
+      </p:sp>
+    </p:spTree>
+    <p:extLst>
+      <p:ext uri="{BB962C8B-B14F-4D97-AF65-F5344CB8AC3E}">
+        <p14:creationId xmlns:p14="http://schemas.microsoft.com/office/powerpoint/2010/main" val="657414254"/>
+      </p:ext>
+    </p:extLst>
+  </p:cSld>
+  <p:clrMapOvr>
+    <a:masterClrMapping/>
+  </p:clrMapOvr>
+</p:notes>
+</file>
+
+<file path=ppt/notesSlides/notesSlide3.xml><?xml version="1.0" encoding="utf-8"?>
+<p:notes xmlns:a="http://schemas.openxmlformats.org/drawingml/2006/main" xmlns:r="http://schemas.openxmlformats.org/officeDocument/2006/relationships" xmlns:p="http://schemas.openxmlformats.org/presentationml/2006/main">
+  <p:cSld>
+    <p:spTree>
+      <p:nvGrpSpPr>
+        <p:cNvPr id="1" name=""/>
+        <p:cNvGrpSpPr/>
+        <p:nvPr/>
+      </p:nvGrpSpPr>
+      <p:grpSpPr>
+        <a:xfrm>
+          <a:off x="0" y="0"/>
+          <a:ext cx="0" cy="0"/>
+          <a:chOff x="0" y="0"/>
+          <a:chExt cx="0" cy="0"/>
+        </a:xfrm>
+      </p:grpSpPr>
+      <p:sp>
+        <p:nvSpPr>
+          <p:cNvPr id="2" name="Slide Image Placeholder 1"/>
+          <p:cNvSpPr>
+            <a:spLocks noGrp="1" noRot="1" noChangeAspect="1"/>
+          </p:cNvSpPr>
+          <p:nvPr>
+            <p:ph type="sldImg"/>
+          </p:nvPr>
+        </p:nvSpPr>
+        <p:spPr/>
+      </p:sp>
+      <p:sp>
+        <p:nvSpPr>
+          <p:cNvPr id="3" name="Notes Placeholder 2"/>
+          <p:cNvSpPr>
+            <a:spLocks noGrp="1"/>
+          </p:cNvSpPr>
+          <p:nvPr>
+            <p:ph type="body" idx="1"/>
+          </p:nvPr>
+        </p:nvSpPr>
+        <p:spPr/>
+        <p:txBody>
+          <a:bodyPr/>
+          <a:lstStyle/>
+          <a:p>
+            <a:endParaRPr lang="en-US" dirty="0"/>
+          </a:p>
+        </p:txBody>
+      </p:sp>
+      <p:sp>
+        <p:nvSpPr>
+          <p:cNvPr id="4" name="Slide Number Placeholder 3"/>
+          <p:cNvSpPr>
+            <a:spLocks noGrp="1"/>
+          </p:cNvSpPr>
+          <p:nvPr>
+            <p:ph type="sldNum" sz="quarter" idx="5"/>
+          </p:nvPr>
+        </p:nvSpPr>
+        <p:spPr/>
+        <p:txBody>
+          <a:bodyPr/>
+          <a:lstStyle/>
+          <a:p>
+            <a:fld id="{3BA84395-5BDD-4359-B2D9-32864B2540BF}" type="slidenum">
+              <a:rPr lang="en-US" smtClean="0"/>
+              <a:t>3</a:t>
+            </a:fld>
+            <a:endParaRPr lang="en-US"/>
+          </a:p>
+        </p:txBody>
+      </p:sp>
+    </p:spTree>
+    <p:extLst>
+      <p:ext uri="{BB962C8B-B14F-4D97-AF65-F5344CB8AC3E}">
+        <p14:creationId xmlns:p14="http://schemas.microsoft.com/office/powerpoint/2010/main" val="2326220742"/>
+      </p:ext>
+    </p:extLst>
+  </p:cSld>
+  <p:clrMapOvr>
+    <a:masterClrMapping/>
+  </p:clrMapOvr>
+</p:notes>
+</file>
+
+<file path=ppt/notesSlides/notesSlide4.xml><?xml version="1.0" encoding="utf-8"?>
+<p:notes xmlns:a="http://schemas.openxmlformats.org/drawingml/2006/main" xmlns:r="http://schemas.openxmlformats.org/officeDocument/2006/relationships" xmlns:p="http://schemas.openxmlformats.org/presentationml/2006/main">
+  <p:cSld>
+    <p:spTree>
+      <p:nvGrpSpPr>
+        <p:cNvPr id="1" name=""/>
+        <p:cNvGrpSpPr/>
+        <p:nvPr/>
+      </p:nvGrpSpPr>
+      <p:grpSpPr>
+        <a:xfrm>
+          <a:off x="0" y="0"/>
+          <a:ext cx="0" cy="0"/>
+          <a:chOff x="0" y="0"/>
+          <a:chExt cx="0" cy="0"/>
+        </a:xfrm>
+      </p:grpSpPr>
+      <p:sp>
+        <p:nvSpPr>
+          <p:cNvPr id="2" name="Slide Image Placeholder 1"/>
+          <p:cNvSpPr>
+            <a:spLocks noGrp="1" noRot="1" noChangeAspect="1"/>
+          </p:cNvSpPr>
+          <p:nvPr>
+            <p:ph type="sldImg"/>
+          </p:nvPr>
+        </p:nvSpPr>
+        <p:spPr/>
+      </p:sp>
+      <p:sp>
+        <p:nvSpPr>
+          <p:cNvPr id="3" name="Notes Placeholder 2"/>
+          <p:cNvSpPr>
+            <a:spLocks noGrp="1"/>
+          </p:cNvSpPr>
+          <p:nvPr>
+            <p:ph type="body" idx="1"/>
+          </p:nvPr>
+        </p:nvSpPr>
+        <p:spPr/>
+        <p:txBody>
+          <a:bodyPr/>
+          <a:lstStyle/>
+          <a:p>
+            <a:endParaRPr lang="en-US" dirty="0"/>
+          </a:p>
+        </p:txBody>
+      </p:sp>
+      <p:sp>
+        <p:nvSpPr>
+          <p:cNvPr id="4" name="Slide Number Placeholder 3"/>
+          <p:cNvSpPr>
+            <a:spLocks noGrp="1"/>
+          </p:cNvSpPr>
+          <p:nvPr>
+            <p:ph type="sldNum" sz="quarter" idx="5"/>
+          </p:nvPr>
+        </p:nvSpPr>
+        <p:spPr/>
+        <p:txBody>
+          <a:bodyPr/>
+          <a:lstStyle/>
+          <a:p>
+            <a:fld id="{3BA84395-5BDD-4359-B2D9-32864B2540BF}" type="slidenum">
+              <a:rPr lang="en-US" smtClean="0"/>
+              <a:t>4</a:t>
+            </a:fld>
+            <a:endParaRPr lang="en-US"/>
+          </a:p>
+        </p:txBody>
+      </p:sp>
+    </p:spTree>
+    <p:extLst>
+      <p:ext uri="{BB962C8B-B14F-4D97-AF65-F5344CB8AC3E}">
+        <p14:creationId xmlns:p14="http://schemas.microsoft.com/office/powerpoint/2010/main" val="849784074"/>
+      </p:ext>
+    </p:extLst>
+  </p:cSld>
+  <p:clrMapOvr>
+    <a:masterClrMapping/>
+  </p:clrMapOvr>
+</p:notes>
+</file>
+
+<file path=ppt/notesSlides/notesSlide5.xml><?xml version="1.0" encoding="utf-8"?>
+<p:notes xmlns:a="http://schemas.openxmlformats.org/drawingml/2006/main" xmlns:r="http://schemas.openxmlformats.org/officeDocument/2006/relationships" xmlns:p="http://schemas.openxmlformats.org/presentationml/2006/main">
+  <p:cSld>
+    <p:spTree>
+      <p:nvGrpSpPr>
+        <p:cNvPr id="1" name=""/>
+        <p:cNvGrpSpPr/>
+        <p:nvPr/>
+      </p:nvGrpSpPr>
+      <p:grpSpPr>
+        <a:xfrm>
+          <a:off x="0" y="0"/>
+          <a:ext cx="0" cy="0"/>
+          <a:chOff x="0" y="0"/>
+          <a:chExt cx="0" cy="0"/>
+        </a:xfrm>
+      </p:grpSpPr>
+      <p:sp>
+        <p:nvSpPr>
+          <p:cNvPr id="2" name="Slide Image Placeholder 1"/>
+          <p:cNvSpPr>
+            <a:spLocks noGrp="1" noRot="1" noChangeAspect="1"/>
+          </p:cNvSpPr>
+          <p:nvPr>
+            <p:ph type="sldImg"/>
+          </p:nvPr>
+        </p:nvSpPr>
+        <p:spPr/>
+      </p:sp>
+      <p:sp>
+        <p:nvSpPr>
+          <p:cNvPr id="3" name="Notes Placeholder 2"/>
+          <p:cNvSpPr>
+            <a:spLocks noGrp="1"/>
+          </p:cNvSpPr>
+          <p:nvPr>
+            <p:ph type="body" idx="1"/>
+          </p:nvPr>
+        </p:nvSpPr>
+        <p:spPr/>
+        <p:txBody>
+          <a:bodyPr/>
+          <a:lstStyle/>
+          <a:p>
+            <a:endParaRPr lang="en-US" dirty="0"/>
+          </a:p>
+        </p:txBody>
+      </p:sp>
+      <p:sp>
+        <p:nvSpPr>
+          <p:cNvPr id="4" name="Slide Number Placeholder 3"/>
+          <p:cNvSpPr>
+            <a:spLocks noGrp="1"/>
+          </p:cNvSpPr>
+          <p:nvPr>
+            <p:ph type="sldNum" sz="quarter" idx="5"/>
+          </p:nvPr>
+        </p:nvSpPr>
+        <p:spPr/>
+        <p:txBody>
+          <a:bodyPr/>
+          <a:lstStyle/>
+          <a:p>
+            <a:fld id="{3BA84395-5BDD-4359-B2D9-32864B2540BF}" type="slidenum">
+              <a:rPr lang="en-US" smtClean="0"/>
+              <a:t>5</a:t>
+            </a:fld>
+            <a:endParaRPr lang="en-US"/>
+          </a:p>
+        </p:txBody>
+      </p:sp>
+    </p:spTree>
+    <p:extLst>
+      <p:ext uri="{BB962C8B-B14F-4D97-AF65-F5344CB8AC3E}">
+        <p14:creationId xmlns:p14="http://schemas.microsoft.com/office/powerpoint/2010/main" val="2757648126"/>
+      </p:ext>
+    </p:extLst>
+  </p:cSld>
+  <p:clrMapOvr>
+    <a:masterClrMapping/>
+  </p:clrMapOvr>
+</p:notes>
+</file>
+
+<file path=ppt/notesSlides/notesSlide6.xml><?xml version="1.0" encoding="utf-8"?>
+<p:notes xmlns:a="http://schemas.openxmlformats.org/drawingml/2006/main" xmlns:r="http://schemas.openxmlformats.org/officeDocument/2006/relationships" xmlns:p="http://schemas.openxmlformats.org/presentationml/2006/main">
+  <p:cSld>
+    <p:spTree>
+      <p:nvGrpSpPr>
+        <p:cNvPr id="1" name=""/>
+        <p:cNvGrpSpPr/>
+        <p:nvPr/>
+      </p:nvGrpSpPr>
+      <p:grpSpPr>
+        <a:xfrm>
+          <a:off x="0" y="0"/>
+          <a:ext cx="0" cy="0"/>
+          <a:chOff x="0" y="0"/>
+          <a:chExt cx="0" cy="0"/>
+        </a:xfrm>
+      </p:grpSpPr>
+      <p:sp>
+        <p:nvSpPr>
+          <p:cNvPr id="2" name="Slide Image Placeholder 1"/>
+          <p:cNvSpPr>
+            <a:spLocks noGrp="1" noRot="1" noChangeAspect="1"/>
+          </p:cNvSpPr>
+          <p:nvPr>
+            <p:ph type="sldImg"/>
+          </p:nvPr>
+        </p:nvSpPr>
+        <p:spPr/>
+      </p:sp>
+      <p:sp>
+        <p:nvSpPr>
+          <p:cNvPr id="3" name="Notes Placeholder 2"/>
+          <p:cNvSpPr>
+            <a:spLocks noGrp="1"/>
+          </p:cNvSpPr>
+          <p:nvPr>
+            <p:ph type="body" idx="1"/>
+          </p:nvPr>
+        </p:nvSpPr>
+        <p:spPr/>
+        <p:txBody>
+          <a:bodyPr/>
+          <a:lstStyle/>
+          <a:p>
+            <a:endParaRPr lang="en-US" dirty="0"/>
+          </a:p>
+        </p:txBody>
+      </p:sp>
+      <p:sp>
+        <p:nvSpPr>
+          <p:cNvPr id="4" name="Slide Number Placeholder 3"/>
+          <p:cNvSpPr>
+            <a:spLocks noGrp="1"/>
+          </p:cNvSpPr>
+          <p:nvPr>
+            <p:ph type="sldNum" sz="quarter" idx="5"/>
+          </p:nvPr>
+        </p:nvSpPr>
+        <p:spPr/>
+        <p:txBody>
+          <a:bodyPr/>
+          <a:lstStyle/>
+          <a:p>
+            <a:fld id="{3BA84395-5BDD-4359-B2D9-32864B2540BF}" type="slidenum">
+              <a:rPr lang="en-US" smtClean="0"/>
+              <a:t>6</a:t>
+            </a:fld>
+            <a:endParaRPr lang="en-US"/>
+          </a:p>
+        </p:txBody>
+      </p:sp>
+    </p:spTree>
+    <p:extLst>
+      <p:ext uri="{BB962C8B-B14F-4D97-AF65-F5344CB8AC3E}">
+        <p14:creationId xmlns:p14="http://schemas.microsoft.com/office/powerpoint/2010/main" val="2926935843"/>
+      </p:ext>
+    </p:extLst>
+  </p:cSld>
+  <p:clrMapOvr>
+    <a:masterClrMapping/>
+  </p:clrMapOvr>
+</p:notes>
+</file>
+
+<file path=ppt/notesSlides/notesSlide7.xml><?xml version="1.0" encoding="utf-8"?>
+<p:notes xmlns:a="http://schemas.openxmlformats.org/drawingml/2006/main" xmlns:r="http://schemas.openxmlformats.org/officeDocument/2006/relationships" xmlns:p="http://schemas.openxmlformats.org/presentationml/2006/main">
+  <p:cSld>
+    <p:spTree>
+      <p:nvGrpSpPr>
+        <p:cNvPr id="1" name=""/>
+        <p:cNvGrpSpPr/>
+        <p:nvPr/>
+      </p:nvGrpSpPr>
+      <p:grpSpPr>
+        <a:xfrm>
+          <a:off x="0" y="0"/>
+          <a:ext cx="0" cy="0"/>
+          <a:chOff x="0" y="0"/>
+          <a:chExt cx="0" cy="0"/>
+        </a:xfrm>
+      </p:grpSpPr>
+      <p:sp>
+        <p:nvSpPr>
+          <p:cNvPr id="2" name="Slide Image Placeholder 1"/>
+          <p:cNvSpPr>
+            <a:spLocks noGrp="1" noRot="1" noChangeAspect="1"/>
+          </p:cNvSpPr>
+          <p:nvPr>
+            <p:ph type="sldImg"/>
+          </p:nvPr>
+        </p:nvSpPr>
+        <p:spPr/>
+      </p:sp>
+      <p:sp>
+        <p:nvSpPr>
+          <p:cNvPr id="3" name="Notes Placeholder 2"/>
+          <p:cNvSpPr>
+            <a:spLocks noGrp="1"/>
+          </p:cNvSpPr>
+          <p:nvPr>
+            <p:ph type="body" idx="1"/>
+          </p:nvPr>
+        </p:nvSpPr>
+        <p:spPr/>
+        <p:txBody>
+          <a:bodyPr/>
+          <a:lstStyle/>
+          <a:p>
+            <a:endParaRPr lang="en-US" dirty="0"/>
+          </a:p>
+        </p:txBody>
+      </p:sp>
+      <p:sp>
+        <p:nvSpPr>
+          <p:cNvPr id="4" name="Slide Number Placeholder 3"/>
+          <p:cNvSpPr>
+            <a:spLocks noGrp="1"/>
+          </p:cNvSpPr>
+          <p:nvPr>
+            <p:ph type="sldNum" sz="quarter" idx="5"/>
+          </p:nvPr>
+        </p:nvSpPr>
+        <p:spPr/>
+        <p:txBody>
+          <a:bodyPr/>
+          <a:lstStyle/>
+          <a:p>
+            <a:fld id="{3BA84395-5BDD-4359-B2D9-32864B2540BF}" type="slidenum">
+              <a:rPr lang="en-US" smtClean="0"/>
+              <a:t>7</a:t>
+            </a:fld>
+            <a:endParaRPr lang="en-US"/>
+          </a:p>
+        </p:txBody>
+      </p:sp>
+    </p:spTree>
+    <p:extLst>
+      <p:ext uri="{BB962C8B-B14F-4D97-AF65-F5344CB8AC3E}">
+        <p14:creationId xmlns:p14="http://schemas.microsoft.com/office/powerpoint/2010/main" val="348613694"/>
+      </p:ext>
+    </p:extLst>
+  </p:cSld>
+  <p:clrMapOvr>
+    <a:masterClrMapping/>
+  </p:clrMapOvr>
+</p:notes>
+</file>
+
+<file path=ppt/notesSlides/notesSlide8.xml><?xml version="1.0" encoding="utf-8"?>
+<p:notes xmlns:a="http://schemas.openxmlformats.org/drawingml/2006/main" xmlns:r="http://schemas.openxmlformats.org/officeDocument/2006/relationships" xmlns:p="http://schemas.openxmlformats.org/presentationml/2006/main">
+  <p:cSld>
+    <p:spTree>
+      <p:nvGrpSpPr>
+        <p:cNvPr id="1" name=""/>
+        <p:cNvGrpSpPr/>
+        <p:nvPr/>
+      </p:nvGrpSpPr>
+      <p:grpSpPr>
+        <a:xfrm>
+          <a:off x="0" y="0"/>
+          <a:ext cx="0" cy="0"/>
+          <a:chOff x="0" y="0"/>
+          <a:chExt cx="0" cy="0"/>
+        </a:xfrm>
+      </p:grpSpPr>
+      <p:sp>
+        <p:nvSpPr>
+          <p:cNvPr id="2" name="Slide Image Placeholder 1"/>
+          <p:cNvSpPr>
+            <a:spLocks noGrp="1" noRot="1" noChangeAspect="1"/>
+          </p:cNvSpPr>
+          <p:nvPr>
+            <p:ph type="sldImg"/>
+          </p:nvPr>
+        </p:nvSpPr>
+        <p:spPr/>
+      </p:sp>
+      <p:sp>
+        <p:nvSpPr>
+          <p:cNvPr id="3" name="Notes Placeholder 2"/>
+          <p:cNvSpPr>
+            <a:spLocks noGrp="1"/>
+          </p:cNvSpPr>
+          <p:nvPr>
+            <p:ph type="body" idx="1"/>
+          </p:nvPr>
+        </p:nvSpPr>
+        <p:spPr/>
+        <p:txBody>
+          <a:bodyPr/>
+          <a:lstStyle/>
+          <a:p>
+            <a:endParaRPr lang="en-US" dirty="0"/>
+          </a:p>
+        </p:txBody>
+      </p:sp>
+      <p:sp>
+        <p:nvSpPr>
+          <p:cNvPr id="4" name="Slide Number Placeholder 3"/>
+          <p:cNvSpPr>
+            <a:spLocks noGrp="1"/>
+          </p:cNvSpPr>
+          <p:nvPr>
+            <p:ph type="sldNum" sz="quarter" idx="5"/>
+          </p:nvPr>
+        </p:nvSpPr>
+        <p:spPr/>
+        <p:txBody>
+          <a:bodyPr/>
+          <a:lstStyle/>
+          <a:p>
+            <a:fld id="{3BA84395-5BDD-4359-B2D9-32864B2540BF}" type="slidenum">
+              <a:rPr lang="en-US" smtClean="0"/>
+              <a:t>8</a:t>
+            </a:fld>
+            <a:endParaRPr lang="en-US"/>
+          </a:p>
+        </p:txBody>
+      </p:sp>
+    </p:spTree>
+    <p:extLst>
+      <p:ext uri="{BB962C8B-B14F-4D97-AF65-F5344CB8AC3E}">
+        <p14:creationId xmlns:p14="http://schemas.microsoft.com/office/powerpoint/2010/main" val="1141032061"/>
+      </p:ext>
+    </p:extLst>
+  </p:cSld>
+  <p:clrMapOvr>
+    <a:masterClrMapping/>
+  </p:clrMapOvr>
+</p:notes>
+</file>
+
+<file path=ppt/notesSlides/notesSlide9.xml><?xml version="1.0" encoding="utf-8"?>
+<p:notes xmlns:a="http://schemas.openxmlformats.org/drawingml/2006/main" xmlns:r="http://schemas.openxmlformats.org/officeDocument/2006/relationships" xmlns:p="http://schemas.openxmlformats.org/presentationml/2006/main">
+  <p:cSld>
+    <p:spTree>
+      <p:nvGrpSpPr>
+        <p:cNvPr id="1" name=""/>
+        <p:cNvGrpSpPr/>
+        <p:nvPr/>
+      </p:nvGrpSpPr>
+      <p:grpSpPr>
+        <a:xfrm>
+          <a:off x="0" y="0"/>
+          <a:ext cx="0" cy="0"/>
+          <a:chOff x="0" y="0"/>
+          <a:chExt cx="0" cy="0"/>
+        </a:xfrm>
+      </p:grpSpPr>
+      <p:sp>
+        <p:nvSpPr>
+          <p:cNvPr id="2" name="Slide Image Placeholder 1"/>
+          <p:cNvSpPr>
+            <a:spLocks noGrp="1" noRot="1" noChangeAspect="1"/>
+          </p:cNvSpPr>
+          <p:nvPr>
+            <p:ph type="sldImg"/>
+          </p:nvPr>
+        </p:nvSpPr>
+        <p:spPr/>
+      </p:sp>
+      <p:sp>
+        <p:nvSpPr>
+          <p:cNvPr id="3" name="Notes Placeholder 2"/>
+          <p:cNvSpPr>
+            <a:spLocks noGrp="1"/>
+          </p:cNvSpPr>
+          <p:nvPr>
+            <p:ph type="body" idx="1"/>
+          </p:nvPr>
+        </p:nvSpPr>
+        <p:spPr/>
+        <p:txBody>
+          <a:bodyPr/>
+          <a:lstStyle/>
+          <a:p>
+            <a:endParaRPr lang="en-US" dirty="0"/>
+          </a:p>
+        </p:txBody>
+      </p:sp>
+      <p:sp>
+        <p:nvSpPr>
+          <p:cNvPr id="4" name="Slide Number Placeholder 3"/>
+          <p:cNvSpPr>
+            <a:spLocks noGrp="1"/>
+          </p:cNvSpPr>
+          <p:nvPr>
+            <p:ph type="sldNum" sz="quarter" idx="5"/>
+          </p:nvPr>
+        </p:nvSpPr>
+        <p:spPr/>
+        <p:txBody>
+          <a:bodyPr/>
+          <a:lstStyle/>
+          <a:p>
+            <a:fld id="{3BA84395-5BDD-4359-B2D9-32864B2540BF}" type="slidenum">
+              <a:rPr lang="en-US" smtClean="0"/>
+              <a:t>9</a:t>
+            </a:fld>
+            <a:endParaRPr lang="en-US"/>
+          </a:p>
+        </p:txBody>
+      </p:sp>
+    </p:spTree>
+    <p:extLst>
+      <p:ext uri="{BB962C8B-B14F-4D97-AF65-F5344CB8AC3E}">
+        <p14:creationId xmlns:p14="http://schemas.microsoft.com/office/powerpoint/2010/main" val="1929055172"/>
+      </p:ext>
+    </p:extLst>
+  </p:cSld>
+  <p:clrMapOvr>
+    <a:masterClrMapping/>
+  </p:clrMapOvr>
+</p:notes>
+</file>
+
 <file path=ppt/slideLayouts/slideLayout1.xml><?xml version="1.0" encoding="utf-8"?>
 <p:sldLayout xmlns:a="http://schemas.openxmlformats.org/drawingml/2006/main" xmlns:r="http://schemas.openxmlformats.org/officeDocument/2006/relationships" xmlns:p="http://schemas.openxmlformats.org/presentationml/2006/main" type="title" preserve="1">
   <p:cSld name="Title Slide">
@@ -624,7 +1800,7 @@
           <a:p>
             <a:fld id="{2D333891-192C-48CF-8E1C-8D21CD273C07}" type="datetime1">
               <a:rPr lang="en-US" smtClean="0"/>
-              <a:t>1/3/2019</a:t>
+              <a:t>1/4/2019</a:t>
             </a:fld>
             <a:endParaRPr lang="en-US"/>
           </a:p>
@@ -822,7 +1998,7 @@
           <a:p>
             <a:fld id="{33DA4797-7741-4BF0-93E6-A27A12ABF4CE}" type="datetime1">
               <a:rPr lang="en-US" smtClean="0"/>
-              <a:t>1/3/2019</a:t>
+              <a:t>1/4/2019</a:t>
             </a:fld>
             <a:endParaRPr lang="en-US"/>
           </a:p>
@@ -1030,7 +2206,7 @@
           <a:p>
             <a:fld id="{A077AE2F-45D2-48FB-9F4F-5B1E7280739B}" type="datetime1">
               <a:rPr lang="en-US" smtClean="0"/>
-              <a:t>1/3/2019</a:t>
+              <a:t>1/4/2019</a:t>
             </a:fld>
             <a:endParaRPr lang="en-US"/>
           </a:p>
@@ -1228,7 +2404,7 @@
           <a:p>
             <a:fld id="{7ED8E002-B1F3-4940-BBED-F49DBA08020A}" type="datetime1">
               <a:rPr lang="en-US" smtClean="0"/>
-              <a:t>1/3/2019</a:t>
+              <a:t>1/4/2019</a:t>
             </a:fld>
             <a:endParaRPr lang="en-US"/>
           </a:p>
@@ -1503,7 +2679,7 @@
           <a:p>
             <a:fld id="{CA3FDA36-6E63-44F0-A51D-7FC598D78472}" type="datetime1">
               <a:rPr lang="en-US" smtClean="0"/>
-              <a:t>1/3/2019</a:t>
+              <a:t>1/4/2019</a:t>
             </a:fld>
             <a:endParaRPr lang="en-US"/>
           </a:p>
@@ -1768,7 +2944,7 @@
           <a:p>
             <a:fld id="{CA94171E-0128-4B06-ACA3-F559DF346C6A}" type="datetime1">
               <a:rPr lang="en-US" smtClean="0"/>
-              <a:t>1/3/2019</a:t>
+              <a:t>1/4/2019</a:t>
             </a:fld>
             <a:endParaRPr lang="en-US"/>
           </a:p>
@@ -2180,7 +3356,7 @@
           <a:p>
             <a:fld id="{D6D15CB3-C64B-4712-9E1A-804A2E49564E}" type="datetime1">
               <a:rPr lang="en-US" smtClean="0"/>
-              <a:t>1/3/2019</a:t>
+              <a:t>1/4/2019</a:t>
             </a:fld>
             <a:endParaRPr lang="en-US"/>
           </a:p>
@@ -2321,7 +3497,7 @@
           <a:p>
             <a:fld id="{8D6471B2-FE85-4121-ACDC-6B36CD9AA0E5}" type="datetime1">
               <a:rPr lang="en-US" smtClean="0"/>
-              <a:t>1/3/2019</a:t>
+              <a:t>1/4/2019</a:t>
             </a:fld>
             <a:endParaRPr lang="en-US"/>
           </a:p>
@@ -2434,7 +3610,7 @@
           <a:p>
             <a:fld id="{17B39D1E-0163-4BE9-9242-DC07273A7575}" type="datetime1">
               <a:rPr lang="en-US" smtClean="0"/>
-              <a:t>1/3/2019</a:t>
+              <a:t>1/4/2019</a:t>
             </a:fld>
             <a:endParaRPr lang="en-US"/>
           </a:p>
@@ -2745,7 +3921,7 @@
           <a:p>
             <a:fld id="{450875EA-6C1B-421B-8B66-C4C345A6C513}" type="datetime1">
               <a:rPr lang="en-US" smtClean="0"/>
-              <a:t>1/3/2019</a:t>
+              <a:t>1/4/2019</a:t>
             </a:fld>
             <a:endParaRPr lang="en-US"/>
           </a:p>
@@ -3033,7 +4209,7 @@
           <a:p>
             <a:fld id="{B5AEC0A5-694A-4050-9B9B-72FA6DE8F577}" type="datetime1">
               <a:rPr lang="en-US" smtClean="0"/>
-              <a:t>1/3/2019</a:t>
+              <a:t>1/4/2019</a:t>
             </a:fld>
             <a:endParaRPr lang="en-US"/>
           </a:p>
@@ -3304,7 +4480,7 @@
           <a:p>
             <a:fld id="{C0AA526B-76EB-4FEB-8AF5-FF4B218A5B42}" type="datetime1">
               <a:rPr lang="en-US" smtClean="0"/>
-              <a:t>1/3/2019</a:t>
+              <a:t>1/4/2019</a:t>
             </a:fld>
             <a:endParaRPr lang="en-US"/>
           </a:p>
@@ -3748,14 +4924,6 @@
           <a:bodyPr/>
           <a:lstStyle/>
           <a:p>
-            <a:r>
-              <a:rPr lang="en-US" sz="7200" b="1" dirty="0">
-                <a:latin typeface="Rockwell" panose="02060603020205020403" pitchFamily="18" charset="0"/>
-              </a:rPr>
-              <a:t>Blue Beer’s</a:t>
-            </a:r>
-          </a:p>
-          <a:p>
             <a:endParaRPr lang="en-US" sz="7200" b="1" dirty="0">
               <a:latin typeface="Rockwell" panose="02060603020205020403" pitchFamily="18" charset="0"/>
             </a:endParaRPr>
@@ -3763,15 +4931,9 @@
           <a:p>
             <a:r>
               <a:rPr lang="en-US" sz="7200" b="1" dirty="0">
-                <a:latin typeface="Bradley Hand ITC" panose="03070402050302030203" pitchFamily="66" charset="0"/>
-              </a:rPr>
-              <a:t>Picasso</a:t>
-            </a:r>
-            <a:r>
-              <a:rPr lang="en-US" sz="7200" b="1" dirty="0">
-                <a:latin typeface="Rockwell" panose="02060603020205020403" pitchFamily="18" charset="0"/>
-              </a:rPr>
-              <a:t> </a:t>
+                <a:latin typeface="Rockwell" panose="02060603020205020403" pitchFamily="18" charset="0"/>
+              </a:rPr>
+              <a:t>Blue Beer</a:t>
             </a:r>
           </a:p>
           <a:p>
@@ -3813,7 +4975,7 @@
           <p:nvPr/>
         </p:nvPicPr>
         <p:blipFill rotWithShape="1">
-          <a:blip r:embed="rId2">
+          <a:blip r:embed="rId3">
             <a:extLst>
               <a:ext uri="{28A0092B-C50C-407E-A947-70E740481C1C}">
                 <a14:useLocalDpi xmlns:a14="http://schemas.microsoft.com/office/drawing/2010/main" val="0"/>
@@ -3833,83 +4995,6 @@
           </a:prstGeom>
         </p:spPr>
       </p:pic>
-      <p:pic>
-        <p:nvPicPr>
-          <p:cNvPr id="4" name="Picture 3">
-            <a:extLst>
-              <a:ext uri="{FF2B5EF4-FFF2-40B4-BE49-F238E27FC236}">
-                <a16:creationId xmlns:a16="http://schemas.microsoft.com/office/drawing/2014/main" id="{A0E9478D-DE99-4EEB-A5A0-1827D5C1CAB0}"/>
-              </a:ext>
-            </a:extLst>
-          </p:cNvPr>
-          <p:cNvPicPr>
-            <a:picLocks noChangeAspect="1"/>
-          </p:cNvPicPr>
-          <p:nvPr/>
-        </p:nvPicPr>
-        <p:blipFill>
-          <a:blip r:embed="rId3">
-            <a:extLst>
-              <a:ext uri="{28A0092B-C50C-407E-A947-70E740481C1C}">
-                <a14:useLocalDpi xmlns:a14="http://schemas.microsoft.com/office/drawing/2010/main" val="0"/>
-              </a:ext>
-            </a:extLst>
-          </a:blip>
-          <a:stretch>
-            <a:fillRect/>
-          </a:stretch>
-        </p:blipFill>
-        <p:spPr>
-          <a:xfrm>
-            <a:off x="313168" y="3490913"/>
-            <a:ext cx="1079796" cy="1623017"/>
-          </a:xfrm>
-          <a:prstGeom prst="rect">
-            <a:avLst/>
-          </a:prstGeom>
-        </p:spPr>
-      </p:pic>
-      <p:sp>
-        <p:nvSpPr>
-          <p:cNvPr id="7" name="TextBox 6">
-            <a:extLst>
-              <a:ext uri="{FF2B5EF4-FFF2-40B4-BE49-F238E27FC236}">
-                <a16:creationId xmlns:a16="http://schemas.microsoft.com/office/drawing/2014/main" id="{843043E2-8D4E-4B3B-A412-79F3813D422C}"/>
-              </a:ext>
-            </a:extLst>
-          </p:cNvPr>
-          <p:cNvSpPr txBox="1"/>
-          <p:nvPr/>
-        </p:nvSpPr>
-        <p:spPr>
-          <a:xfrm>
-            <a:off x="208547" y="5113930"/>
-            <a:ext cx="1259305" cy="369332"/>
-          </a:xfrm>
-          <a:prstGeom prst="rect">
-            <a:avLst/>
-          </a:prstGeom>
-          <a:noFill/>
-        </p:spPr>
-        <p:txBody>
-          <a:bodyPr wrap="square" rtlCol="0">
-            <a:spAutoFit/>
-          </a:bodyPr>
-          <a:lstStyle/>
-          <a:p>
-            <a:pPr algn="ctr"/>
-            <a:r>
-              <a:rPr lang="en-US" b="1" dirty="0">
-                <a:solidFill>
-                  <a:schemeClr val="bg1"/>
-                </a:solidFill>
-                <a:latin typeface="Bradley Hand ITC" panose="03070402050302030203" pitchFamily="66" charset="0"/>
-              </a:rPr>
-              <a:t>PICASSO</a:t>
-            </a:r>
-          </a:p>
-        </p:txBody>
-      </p:sp>
     </p:spTree>
     <p:extLst>
       <p:ext uri="{BB962C8B-B14F-4D97-AF65-F5344CB8AC3E}">
@@ -4018,6 +5103,15 @@
               <a:buFont typeface="Wingdings" panose="05000000000000000000" pitchFamily="2" charset="2"/>
               <a:buChar char="Ø"/>
             </a:pPr>
+            <a:endParaRPr lang="en-US" dirty="0">
+              <a:latin typeface="Rockwell" panose="02060603020205020403" pitchFamily="18" charset="0"/>
+            </a:endParaRPr>
+          </a:p>
+          <a:p>
+            <a:pPr marL="342900" indent="-342900" algn="l">
+              <a:buFont typeface="Wingdings" panose="05000000000000000000" pitchFamily="2" charset="2"/>
+              <a:buChar char="Ø"/>
+            </a:pPr>
             <a:r>
               <a:rPr lang="en-US" dirty="0">
                 <a:latin typeface="Rockwell" panose="02060603020205020403" pitchFamily="18" charset="0"/>
@@ -4046,7 +5140,7 @@
               <a:rPr lang="en-US" dirty="0">
                 <a:latin typeface="Rockwell" panose="02060603020205020403" pitchFamily="18" charset="0"/>
               </a:rPr>
-              <a:t>In-state breweries: 22</a:t>
+              <a:t>In-state craft breweries: 22</a:t>
             </a:r>
           </a:p>
           <a:p>
@@ -4118,7 +5212,7 @@
               <a:rPr lang="en-US" dirty="0">
                 <a:latin typeface="Rockwell" panose="02060603020205020403" pitchFamily="18" charset="0"/>
               </a:rPr>
-              <a:t>In-state breweries: 18</a:t>
+              <a:t>In-state craft breweries: 18</a:t>
             </a:r>
           </a:p>
           <a:p>
@@ -4186,7 +5280,7 @@
           <p:nvPr/>
         </p:nvPicPr>
         <p:blipFill rotWithShape="1">
-          <a:blip r:embed="rId2">
+          <a:blip r:embed="rId3">
             <a:extLst>
               <a:ext uri="{28A0092B-C50C-407E-A947-70E740481C1C}">
                 <a14:useLocalDpi xmlns:a14="http://schemas.microsoft.com/office/drawing/2010/main" val="0"/>
@@ -4221,7 +5315,7 @@
           <p:nvPr/>
         </p:nvPicPr>
         <p:blipFill>
-          <a:blip r:embed="rId3">
+          <a:blip r:embed="rId4">
             <a:extLst>
               <a:ext uri="{28A0092B-C50C-407E-A947-70E740481C1C}">
                 <a14:useLocalDpi xmlns:a14="http://schemas.microsoft.com/office/drawing/2010/main" val="0"/>
@@ -4293,6 +5387,18 @@
   <p:clrMapOvr>
     <a:masterClrMapping/>
   </p:clrMapOvr>
+  <mc:AlternateContent xmlns:mc="http://schemas.openxmlformats.org/markup-compatibility/2006">
+    <mc:Choice xmlns:p15="http://schemas.microsoft.com/office/powerpoint/2012/main" Requires="p15">
+      <p:transition xmlns:p14="http://schemas.microsoft.com/office/powerpoint/2010/main" spd="slow" p14:dur="2000">
+        <p15:prstTrans prst="fallOver"/>
+      </p:transition>
+    </mc:Choice>
+    <mc:Fallback>
+      <p:transition spd="slow">
+        <p:fade/>
+      </p:transition>
+    </mc:Fallback>
+  </mc:AlternateContent>
 </p:sld>
 </file>
 
@@ -4354,6 +5460,15 @@
               <a:buFont typeface="Wingdings" panose="05000000000000000000" pitchFamily="2" charset="2"/>
               <a:buChar char="Ø"/>
             </a:pPr>
+            <a:endParaRPr lang="en-US" dirty="0">
+              <a:latin typeface="Rockwell" panose="02060603020205020403" pitchFamily="18" charset="0"/>
+            </a:endParaRPr>
+          </a:p>
+          <a:p>
+            <a:pPr marL="342900" indent="-342900" algn="l">
+              <a:buFont typeface="Wingdings" panose="05000000000000000000" pitchFamily="2" charset="2"/>
+              <a:buChar char="Ø"/>
+            </a:pPr>
             <a:r>
               <a:rPr lang="en-US" dirty="0">
                 <a:latin typeface="Rockwell" panose="02060603020205020403" pitchFamily="18" charset="0"/>
@@ -4382,7 +5497,7 @@
               <a:rPr lang="en-US" dirty="0">
                 <a:latin typeface="Rockwell" panose="02060603020205020403" pitchFamily="18" charset="0"/>
               </a:rPr>
-              <a:t>Selection Criteria:</a:t>
+              <a:t>Reasons for selection:</a:t>
             </a:r>
           </a:p>
           <a:p>
@@ -4408,6 +5523,15 @@
               </a:rPr>
               <a:t>South Bend-Chicago Population: ~2.8 million</a:t>
             </a:r>
+            <a:r>
+              <a:rPr lang="en-US" baseline="30000" dirty="0">
+                <a:latin typeface="Rockwell" panose="02060603020205020403" pitchFamily="18" charset="0"/>
+              </a:rPr>
+              <a:t>7,8</a:t>
+            </a:r>
+            <a:endParaRPr lang="en-US" dirty="0">
+              <a:latin typeface="Rockwell" panose="02060603020205020403" pitchFamily="18" charset="0"/>
+            </a:endParaRPr>
           </a:p>
           <a:p>
             <a:pPr marL="1147763" lvl="3" indent="-336550" algn="l">
@@ -4424,7 +5548,7 @@
               <a:rPr lang="en-US" baseline="30000" dirty="0">
                 <a:latin typeface="Rockwell" panose="02060603020205020403" pitchFamily="18" charset="0"/>
               </a:rPr>
-              <a:t>7,8</a:t>
+              <a:t>9,10</a:t>
             </a:r>
           </a:p>
           <a:p>
@@ -4564,7 +5688,7 @@
           <p:nvPr/>
         </p:nvPicPr>
         <p:blipFill rotWithShape="1">
-          <a:blip r:embed="rId2">
+          <a:blip r:embed="rId3">
             <a:extLst>
               <a:ext uri="{28A0092B-C50C-407E-A947-70E740481C1C}">
                 <a14:useLocalDpi xmlns:a14="http://schemas.microsoft.com/office/drawing/2010/main" val="0"/>
@@ -4599,7 +5723,7 @@
           <p:nvPr/>
         </p:nvPicPr>
         <p:blipFill>
-          <a:blip r:embed="rId3">
+          <a:blip r:embed="rId4">
             <a:extLst>
               <a:ext uri="{28A0092B-C50C-407E-A947-70E740481C1C}">
                 <a14:useLocalDpi xmlns:a14="http://schemas.microsoft.com/office/drawing/2010/main" val="0"/>
@@ -4719,6 +5843,18 @@
   <p:clrMapOvr>
     <a:masterClrMapping/>
   </p:clrMapOvr>
+  <mc:AlternateContent xmlns:mc="http://schemas.openxmlformats.org/markup-compatibility/2006">
+    <mc:Choice xmlns:p14="http://schemas.microsoft.com/office/powerpoint/2010/main" Requires="p14">
+      <p:transition spd="slow" p14:dur="800">
+        <p:circle/>
+      </p:transition>
+    </mc:Choice>
+    <mc:Fallback>
+      <p:transition spd="slow">
+        <p:circle/>
+      </p:transition>
+    </mc:Fallback>
+  </mc:AlternateContent>
 </p:sld>
 </file>
 
@@ -4836,7 +5972,7 @@
           <p:nvPr/>
         </p:nvPicPr>
         <p:blipFill rotWithShape="1">
-          <a:blip r:embed="rId2">
+          <a:blip r:embed="rId3">
             <a:extLst>
               <a:ext uri="{28A0092B-C50C-407E-A947-70E740481C1C}">
                 <a14:useLocalDpi xmlns:a14="http://schemas.microsoft.com/office/drawing/2010/main" val="0"/>
@@ -4871,7 +6007,7 @@
           <p:nvPr/>
         </p:nvPicPr>
         <p:blipFill>
-          <a:blip r:embed="rId3">
+          <a:blip r:embed="rId4">
             <a:extLst>
               <a:ext uri="{28A0092B-C50C-407E-A947-70E740481C1C}">
                 <a14:useLocalDpi xmlns:a14="http://schemas.microsoft.com/office/drawing/2010/main" val="0"/>
@@ -5266,6 +6402,18 @@
   <p:clrMapOvr>
     <a:masterClrMapping/>
   </p:clrMapOvr>
+  <mc:AlternateContent xmlns:mc="http://schemas.openxmlformats.org/markup-compatibility/2006">
+    <mc:Choice xmlns:p15="http://schemas.microsoft.com/office/powerpoint/2012/main" Requires="p15">
+      <p:transition xmlns:p14="http://schemas.microsoft.com/office/powerpoint/2010/main" spd="slow" p14:dur="2000">
+        <p15:prstTrans prst="fallOver"/>
+      </p:transition>
+    </mc:Choice>
+    <mc:Fallback>
+      <p:transition spd="slow">
+        <p:fade/>
+      </p:transition>
+    </mc:Fallback>
+  </mc:AlternateContent>
 </p:sld>
 </file>
 
@@ -5593,7 +6741,7 @@
           <p:nvPr/>
         </p:nvPicPr>
         <p:blipFill rotWithShape="1">
-          <a:blip r:embed="rId2">
+          <a:blip r:embed="rId3">
             <a:extLst>
               <a:ext uri="{28A0092B-C50C-407E-A947-70E740481C1C}">
                 <a14:useLocalDpi xmlns:a14="http://schemas.microsoft.com/office/drawing/2010/main" val="0"/>
@@ -5628,7 +6776,7 @@
           <p:nvPr/>
         </p:nvPicPr>
         <p:blipFill>
-          <a:blip r:embed="rId3">
+          <a:blip r:embed="rId4">
             <a:extLst>
               <a:ext uri="{28A0092B-C50C-407E-A947-70E740481C1C}">
                 <a14:useLocalDpi xmlns:a14="http://schemas.microsoft.com/office/drawing/2010/main" val="0"/>
@@ -5700,6 +6848,18 @@
   <p:clrMapOvr>
     <a:masterClrMapping/>
   </p:clrMapOvr>
+  <mc:AlternateContent xmlns:mc="http://schemas.openxmlformats.org/markup-compatibility/2006">
+    <mc:Choice xmlns:p15="http://schemas.microsoft.com/office/powerpoint/2012/main" Requires="p15">
+      <p:transition xmlns:p14="http://schemas.microsoft.com/office/powerpoint/2010/main" spd="slow" p14:dur="6000">
+        <p15:prstTrans prst="curtains"/>
+      </p:transition>
+    </mc:Choice>
+    <mc:Fallback>
+      <p:transition spd="slow">
+        <p:fade/>
+      </p:transition>
+    </mc:Fallback>
+  </mc:AlternateContent>
 </p:sld>
 </file>
 
@@ -5752,7 +6912,7 @@
               <a:rPr lang="en-US" sz="4000" b="1" cap="all" dirty="0">
                 <a:latin typeface="Rockwell" panose="02060603020205020403" pitchFamily="18" charset="0"/>
               </a:rPr>
-              <a:t>Footnotes</a:t>
+              <a:t>SOURCES</a:t>
             </a:r>
           </a:p>
         </p:txBody>
@@ -5801,7 +6961,7 @@
             <a:r>
               <a:rPr lang="en-US" sz="1800" dirty="0">
                 <a:latin typeface="Rockwell" panose="02060603020205020403" pitchFamily="18" charset="0"/>
-                <a:hlinkClick r:id="rId2"/>
+                <a:hlinkClick r:id="rId3"/>
               </a:rPr>
               <a:t>https://suburbanstats.org/population/how-many-people-live-in-connecticut </a:t>
             </a:r>
@@ -5814,7 +6974,7 @@
             <a:r>
               <a:rPr lang="en-US" sz="1800" dirty="0">
                 <a:latin typeface="Rockwell" panose="02060603020205020403" pitchFamily="18" charset="0"/>
-                <a:hlinkClick r:id="rId2"/>
+                <a:hlinkClick r:id="rId3"/>
               </a:rPr>
               <a:t>https://en.wikipedia.org/wiki/List_of_cities_in_Connecticut</a:t>
             </a:r>
@@ -5830,7 +6990,7 @@
             <a:r>
               <a:rPr lang="en-US" sz="1800" dirty="0">
                 <a:latin typeface="Rockwell" panose="02060603020205020403" pitchFamily="18" charset="0"/>
-                <a:hlinkClick r:id="rId3"/>
+                <a:hlinkClick r:id="rId4"/>
               </a:rPr>
               <a:t>https://en.wikipedia.org/wiki/List_of_colleges_and_universities_in_Connecticut</a:t>
             </a:r>
@@ -5846,7 +7006,7 @@
             <a:r>
               <a:rPr lang="en-US" sz="1800" dirty="0">
                 <a:latin typeface="Rockwell" panose="02060603020205020403" pitchFamily="18" charset="0"/>
-                <a:hlinkClick r:id="rId4"/>
+                <a:hlinkClick r:id="rId5"/>
               </a:rPr>
               <a:t>https://suburbanstats.org/population/how-many-people-live-in-maryland</a:t>
             </a:r>
@@ -5862,7 +7022,7 @@
             <a:r>
               <a:rPr lang="en-US" sz="1800" dirty="0">
                 <a:latin typeface="Rockwell" panose="02060603020205020403" pitchFamily="18" charset="0"/>
-                <a:hlinkClick r:id="rId5"/>
+                <a:hlinkClick r:id="rId6"/>
               </a:rPr>
               <a:t>https://en.wikipedia.org/wiki/List_of_municipalities_in_Maryland</a:t>
             </a:r>
@@ -5878,7 +7038,7 @@
             <a:r>
               <a:rPr lang="en-US" sz="1800" dirty="0">
                 <a:latin typeface="Rockwell" panose="02060603020205020403" pitchFamily="18" charset="0"/>
-                <a:hlinkClick r:id="rId6"/>
+                <a:hlinkClick r:id="rId7"/>
               </a:rPr>
               <a:t>https://en.wikipedia.org/wiki/List_of_colleges_and_universities_in_Maryland</a:t>
             </a:r>
@@ -5894,9 +7054,9 @@
             <a:r>
               <a:rPr lang="en-US" sz="1800" dirty="0">
                 <a:latin typeface="Rockwell" panose="02060603020205020403" pitchFamily="18" charset="0"/>
-                <a:hlinkClick r:id="rId7"/>
-              </a:rPr>
-              <a:t>https://en.wikipedia.org/wiki/List_of_colleges_and_universities_in_Indiana</a:t>
+                <a:hlinkClick r:id="rId8"/>
+              </a:rPr>
+              <a:t>https://www.google.com/search?q=population+of+chicago+2017&amp;rlz=1C1CHFX_enUS749US749&amp;oq=population+of+chicago+2017&amp;aqs=chrome.0.69i59j69i60l3j0l2.2727j1j7&amp;sourceid=chrome&amp;ie=UTF-8</a:t>
             </a:r>
           </a:p>
           <a:p>
@@ -5907,7 +7067,33 @@
             <a:r>
               <a:rPr lang="en-US" sz="1800" dirty="0">
                 <a:latin typeface="Rockwell" panose="02060603020205020403" pitchFamily="18" charset="0"/>
-                <a:hlinkClick r:id="rId7"/>
+                <a:hlinkClick r:id="rId8"/>
+              </a:rPr>
+              <a:t>https://en.wikipedia.org/wiki/List_of_cities_in_Indiana</a:t>
+            </a:r>
+          </a:p>
+          <a:p>
+            <a:pPr marL="230188" indent="-230188" algn="l">
+              <a:buFont typeface="+mj-lt"/>
+              <a:buAutoNum type="arabicPeriod"/>
+            </a:pPr>
+            <a:r>
+              <a:rPr lang="en-US" sz="1800" dirty="0">
+                <a:latin typeface="Rockwell" panose="02060603020205020403" pitchFamily="18" charset="0"/>
+                <a:hlinkClick r:id="rId8"/>
+              </a:rPr>
+              <a:t>https://en.wikipedia.org/wiki/List_of_colleges_and_universities_in_Indiana</a:t>
+            </a:r>
+          </a:p>
+          <a:p>
+            <a:pPr marL="230188" indent="-230188" algn="l">
+              <a:buFont typeface="+mj-lt"/>
+              <a:buAutoNum type="arabicPeriod"/>
+            </a:pPr>
+            <a:r>
+              <a:rPr lang="en-US" sz="1800" dirty="0">
+                <a:latin typeface="Rockwell" panose="02060603020205020403" pitchFamily="18" charset="0"/>
+                <a:hlinkClick r:id="rId8"/>
               </a:rPr>
               <a:t>https://en.wikipedia.org/wiki/List_of_colleges_and_universities_in_Chicago</a:t>
             </a:r>
@@ -5932,7 +7118,7 @@
           <p:nvPr/>
         </p:nvPicPr>
         <p:blipFill rotWithShape="1">
-          <a:blip r:embed="rId8">
+          <a:blip r:embed="rId9">
             <a:extLst>
               <a:ext uri="{28A0092B-C50C-407E-A947-70E740481C1C}">
                 <a14:useLocalDpi xmlns:a14="http://schemas.microsoft.com/office/drawing/2010/main" val="0"/>
@@ -5967,7 +7153,7 @@
           <p:nvPr/>
         </p:nvPicPr>
         <p:blipFill>
-          <a:blip r:embed="rId9">
+          <a:blip r:embed="rId10">
             <a:extLst>
               <a:ext uri="{28A0092B-C50C-407E-A947-70E740481C1C}">
                 <a14:useLocalDpi xmlns:a14="http://schemas.microsoft.com/office/drawing/2010/main" val="0"/>
@@ -6039,6 +7225,18 @@
   <p:clrMapOvr>
     <a:masterClrMapping/>
   </p:clrMapOvr>
+  <mc:AlternateContent xmlns:mc="http://schemas.openxmlformats.org/markup-compatibility/2006">
+    <mc:Choice xmlns:p14="http://schemas.microsoft.com/office/powerpoint/2010/main" Requires="p14">
+      <p:transition spd="slow" p14:dur="800">
+        <p:circle/>
+      </p:transition>
+    </mc:Choice>
+    <mc:Fallback>
+      <p:transition spd="slow">
+        <p:circle/>
+      </p:transition>
+    </mc:Fallback>
+  </mc:AlternateContent>
 </p:sld>
 </file>
 
@@ -6120,9 +7318,39 @@
         </p:spPr>
         <p:txBody>
           <a:bodyPr>
-            <a:normAutofit/>
+            <a:normAutofit fontScale="92500"/>
           </a:bodyPr>
           <a:lstStyle/>
+          <a:p>
+            <a:pPr algn="l"/>
+            <a:r>
+              <a:rPr lang="en-US" dirty="0">
+                <a:latin typeface="Rockwell" panose="02060603020205020403" pitchFamily="18" charset="0"/>
+              </a:rPr>
+              <a:t>Market research has shown that Millennials and </a:t>
+            </a:r>
+            <a:r>
+              <a:rPr lang="en-US" dirty="0" err="1">
+                <a:latin typeface="Rockwell" panose="02060603020205020403" pitchFamily="18" charset="0"/>
+              </a:rPr>
+              <a:t>iGen</a:t>
+            </a:r>
+            <a:r>
+              <a:rPr lang="en-US" dirty="0">
+                <a:latin typeface="Rockwell" panose="02060603020205020403" pitchFamily="18" charset="0"/>
+              </a:rPr>
+              <a:t> (&gt;=21) prefer locally crafted beers, that have a high alcohol content but are not drawn to highly bitter beers. </a:t>
+            </a:r>
+          </a:p>
+          <a:p>
+            <a:pPr algn="l"/>
+            <a:r>
+              <a:rPr lang="en-US" dirty="0">
+                <a:latin typeface="Rockwell" panose="02060603020205020403" pitchFamily="18" charset="0"/>
+              </a:rPr>
+              <a:t>To meet this demand we are introducing a new beer into the market. </a:t>
+            </a:r>
+          </a:p>
           <a:p>
             <a:pPr algn="l"/>
             <a:endParaRPr lang="en-US" dirty="0">
@@ -6130,42 +7358,35 @@
             </a:endParaRPr>
           </a:p>
           <a:p>
+            <a:r>
+              <a:rPr lang="en-US" sz="7800" b="1" dirty="0">
+                <a:latin typeface="Bradley Hand ITC" panose="03070402050302030203" pitchFamily="66" charset="0"/>
+              </a:rPr>
+              <a:t>Picasso</a:t>
+            </a:r>
+          </a:p>
+          <a:p>
             <a:pPr algn="l"/>
+            <a:endParaRPr lang="en-US" dirty="0">
+              <a:latin typeface="Rockwell" panose="02060603020205020403" pitchFamily="18" charset="0"/>
+            </a:endParaRPr>
+          </a:p>
+          <a:p>
+            <a:pPr algn="l"/>
             <a:r>
               <a:rPr lang="en-US" dirty="0">
                 <a:latin typeface="Rockwell" panose="02060603020205020403" pitchFamily="18" charset="0"/>
               </a:rPr>
-              <a:t>Market research has shown that Millennials and </a:t>
-            </a:r>
-            <a:r>
-              <a:rPr lang="en-US" dirty="0" err="1">
-                <a:latin typeface="Rockwell" panose="02060603020205020403" pitchFamily="18" charset="0"/>
-              </a:rPr>
-              <a:t>iGen</a:t>
-            </a:r>
+              <a:t>Blue Beer’s Picasso has a higher than typical alcohol content (ABV= 0.06) while having a lower than typical bitterness rating (IBU = 30). </a:t>
+            </a:r>
+          </a:p>
+          <a:p>
+            <a:pPr algn="l"/>
             <a:r>
               <a:rPr lang="en-US" dirty="0">
                 <a:latin typeface="Rockwell" panose="02060603020205020403" pitchFamily="18" charset="0"/>
               </a:rPr>
-              <a:t> (&gt;=21) prefer locally brewed beers, that have a high alcohol content but are not drawn to highly bitter beers. </a:t>
-            </a:r>
-          </a:p>
-          <a:p>
-            <a:pPr algn="l"/>
-            <a:r>
-              <a:rPr lang="en-US" dirty="0">
-                <a:latin typeface="Rockwell" panose="02060603020205020403" pitchFamily="18" charset="0"/>
-              </a:rPr>
-              <a:t>To meet this demand we are introducing a new beer into the market, Picasso. Blue Beer’s Picasso has a higher than typical alcohol content (ABV= 0.06) while having a lower than typical bitterness rating (IBU = 30). </a:t>
-            </a:r>
-          </a:p>
-          <a:p>
-            <a:pPr algn="l"/>
-            <a:r>
-              <a:rPr lang="en-US" dirty="0">
-                <a:latin typeface="Rockwell" panose="02060603020205020403" pitchFamily="18" charset="0"/>
-              </a:rPr>
-              <a:t>Blue Beer is looking to launch their brewery production in an area with as few breweries as possible in the state, has a supporting demographic, and prefers beers with Blue Beer’s ABV and IBU characteristics.</a:t>
+              <a:t>We are looking to launch our initial production in an area with as few craft breweries as possible in the state, has a supporting demographic, and prefers beers with Picasso’s ABV and IBU characteristics.</a:t>
             </a:r>
           </a:p>
           <a:p>
@@ -6219,7 +7440,7 @@
           <p:nvPr/>
         </p:nvPicPr>
         <p:blipFill rotWithShape="1">
-          <a:blip r:embed="rId2">
+          <a:blip r:embed="rId3">
             <a:extLst>
               <a:ext uri="{28A0092B-C50C-407E-A947-70E740481C1C}">
                 <a14:useLocalDpi xmlns:a14="http://schemas.microsoft.com/office/drawing/2010/main" val="0"/>
@@ -6254,7 +7475,7 @@
           <p:nvPr/>
         </p:nvPicPr>
         <p:blipFill>
-          <a:blip r:embed="rId3">
+          <a:blip r:embed="rId4">
             <a:extLst>
               <a:ext uri="{28A0092B-C50C-407E-A947-70E740481C1C}">
                 <a14:useLocalDpi xmlns:a14="http://schemas.microsoft.com/office/drawing/2010/main" val="0"/>
@@ -6326,6 +7547,18 @@
   <p:clrMapOvr>
     <a:masterClrMapping/>
   </p:clrMapOvr>
+  <mc:AlternateContent xmlns:mc="http://schemas.openxmlformats.org/markup-compatibility/2006">
+    <mc:Choice xmlns:p15="http://schemas.microsoft.com/office/powerpoint/2012/main" Requires="p15">
+      <p:transition xmlns:p14="http://schemas.microsoft.com/office/powerpoint/2010/main" spd="slow" p14:dur="2000">
+        <p15:prstTrans prst="fallOver"/>
+      </p:transition>
+    </mc:Choice>
+    <mc:Fallback>
+      <p:transition spd="slow">
+        <p:fade/>
+      </p:transition>
+    </mc:Fallback>
+  </mc:AlternateContent>
 </p:sld>
 </file>
 
@@ -6398,7 +7631,7 @@
           <p:nvPr/>
         </p:nvPicPr>
         <p:blipFill rotWithShape="1">
-          <a:blip r:embed="rId2">
+          <a:blip r:embed="rId3">
             <a:extLst>
               <a:ext uri="{28A0092B-C50C-407E-A947-70E740481C1C}">
                 <a14:useLocalDpi xmlns:a14="http://schemas.microsoft.com/office/drawing/2010/main" val="0"/>
@@ -6433,7 +7666,7 @@
           <p:nvPr/>
         </p:nvPicPr>
         <p:blipFill>
-          <a:blip r:embed="rId3">
+          <a:blip r:embed="rId4">
             <a:extLst>
               <a:ext uri="{28A0092B-C50C-407E-A947-70E740481C1C}">
                 <a14:useLocalDpi xmlns:a14="http://schemas.microsoft.com/office/drawing/2010/main" val="0"/>
@@ -6510,7 +7743,7 @@
           <p:nvPr/>
         </p:nvPicPr>
         <p:blipFill>
-          <a:blip r:embed="rId4">
+          <a:blip r:embed="rId5">
             <a:extLst>
               <a:ext uri="{28A0092B-C50C-407E-A947-70E740481C1C}">
                 <a14:useLocalDpi xmlns:a14="http://schemas.microsoft.com/office/drawing/2010/main" val="0"/>
@@ -6541,6 +7774,18 @@
   <p:clrMapOvr>
     <a:masterClrMapping/>
   </p:clrMapOvr>
+  <mc:AlternateContent xmlns:mc="http://schemas.openxmlformats.org/markup-compatibility/2006">
+    <mc:Choice xmlns:p14="http://schemas.microsoft.com/office/powerpoint/2010/main" Requires="p14">
+      <p:transition spd="slow" p14:dur="800">
+        <p:circle/>
+      </p:transition>
+    </mc:Choice>
+    <mc:Fallback>
+      <p:transition spd="slow">
+        <p:circle/>
+      </p:transition>
+    </mc:Fallback>
+  </mc:AlternateContent>
 </p:sld>
 </file>
 
@@ -6593,7 +7838,7 @@
               <a:rPr lang="en-US" sz="4000" b="1" dirty="0">
                 <a:latin typeface="Rockwell" panose="02060603020205020403" pitchFamily="18" charset="0"/>
               </a:rPr>
-              <a:t>PILOT MARKET</a:t>
+              <a:t>PILOT STATE</a:t>
             </a:r>
           </a:p>
         </p:txBody>
@@ -6653,7 +7898,7 @@
               <a:rPr lang="en-US" dirty="0">
                 <a:latin typeface="Rockwell" panose="02060603020205020403" pitchFamily="18" charset="0"/>
               </a:rPr>
-              <a:t>Selection Criteria:</a:t>
+              <a:t>Reasons for Selection:</a:t>
             </a:r>
           </a:p>
           <a:p>
@@ -6665,7 +7910,19 @@
               <a:rPr lang="en-US" dirty="0">
                 <a:latin typeface="Rockwell" panose="02060603020205020403" pitchFamily="18" charset="0"/>
               </a:rPr>
-              <a:t>In-state breweries: 8</a:t>
+              <a:t>7</a:t>
+            </a:r>
+            <a:r>
+              <a:rPr lang="en-US" baseline="30000" dirty="0">
+                <a:latin typeface="Rockwell" panose="02060603020205020403" pitchFamily="18" charset="0"/>
+              </a:rPr>
+              <a:t>th</a:t>
+            </a:r>
+            <a:r>
+              <a:rPr lang="en-US" dirty="0">
+                <a:latin typeface="Rockwell" panose="02060603020205020403" pitchFamily="18" charset="0"/>
+              </a:rPr>
+              <a:t> Highest Median Alcohol By Volume (ABV) – 0.06</a:t>
             </a:r>
           </a:p>
           <a:p>
@@ -6677,7 +7934,7 @@
               <a:rPr lang="en-US" dirty="0">
                 <a:latin typeface="Rockwell" panose="02060603020205020403" pitchFamily="18" charset="0"/>
               </a:rPr>
-              <a:t>7</a:t>
+              <a:t>9</a:t>
             </a:r>
             <a:r>
               <a:rPr lang="en-US" baseline="30000" dirty="0">
@@ -6689,7 +7946,7 @@
               <a:rPr lang="en-US" dirty="0">
                 <a:latin typeface="Rockwell" panose="02060603020205020403" pitchFamily="18" charset="0"/>
               </a:rPr>
-              <a:t> Highest Median Alcohol By Volume (ABV) – 0.06</a:t>
+              <a:t> Lowest Median International Bitterness Unit (IBU) – 29.0</a:t>
             </a:r>
           </a:p>
           <a:p>
@@ -6701,19 +7958,7 @@
               <a:rPr lang="en-US" dirty="0">
                 <a:latin typeface="Rockwell" panose="02060603020205020403" pitchFamily="18" charset="0"/>
               </a:rPr>
-              <a:t>9</a:t>
-            </a:r>
-            <a:r>
-              <a:rPr lang="en-US" baseline="30000" dirty="0">
-                <a:latin typeface="Rockwell" panose="02060603020205020403" pitchFamily="18" charset="0"/>
-              </a:rPr>
-              <a:t>th</a:t>
-            </a:r>
-            <a:r>
-              <a:rPr lang="en-US" dirty="0">
-                <a:latin typeface="Rockwell" panose="02060603020205020403" pitchFamily="18" charset="0"/>
-              </a:rPr>
-              <a:t> Lowest Median International Bitterness Unit (IBU) – 29.0</a:t>
+              <a:t>In-state craft breweries: 8</a:t>
             </a:r>
           </a:p>
           <a:p>
@@ -6739,7 +7984,7 @@
           <p:nvPr/>
         </p:nvPicPr>
         <p:blipFill rotWithShape="1">
-          <a:blip r:embed="rId2">
+          <a:blip r:embed="rId3">
             <a:extLst>
               <a:ext uri="{28A0092B-C50C-407E-A947-70E740481C1C}">
                 <a14:useLocalDpi xmlns:a14="http://schemas.microsoft.com/office/drawing/2010/main" val="0"/>
@@ -6774,7 +8019,7 @@
           <p:nvPr/>
         </p:nvPicPr>
         <p:blipFill>
-          <a:blip r:embed="rId3">
+          <a:blip r:embed="rId4">
             <a:extLst>
               <a:ext uri="{28A0092B-C50C-407E-A947-70E740481C1C}">
                 <a14:useLocalDpi xmlns:a14="http://schemas.microsoft.com/office/drawing/2010/main" val="0"/>
@@ -6851,7 +8096,7 @@
           <p:nvPr/>
         </p:nvPicPr>
         <p:blipFill rotWithShape="1">
-          <a:blip r:embed="rId4">
+          <a:blip r:embed="rId5">
             <a:extLst>
               <a:ext uri="{28A0092B-C50C-407E-A947-70E740481C1C}">
                 <a14:useLocalDpi xmlns:a14="http://schemas.microsoft.com/office/drawing/2010/main" val="0"/>
@@ -6881,6 +8126,18 @@
   <p:clrMapOvr>
     <a:masterClrMapping/>
   </p:clrMapOvr>
+  <mc:AlternateContent xmlns:mc="http://schemas.openxmlformats.org/markup-compatibility/2006">
+    <mc:Choice xmlns:p15="http://schemas.microsoft.com/office/powerpoint/2012/main" Requires="p15">
+      <p:transition xmlns:p14="http://schemas.microsoft.com/office/powerpoint/2010/main" spd="slow" p14:dur="2000">
+        <p15:prstTrans prst="fallOver"/>
+      </p:transition>
+    </mc:Choice>
+    <mc:Fallback>
+      <p:transition spd="slow">
+        <p:fade/>
+      </p:transition>
+    </mc:Fallback>
+  </mc:AlternateContent>
 </p:sld>
 </file>
 
@@ -6933,7 +8190,7 @@
               <a:rPr lang="en-US" sz="4000" b="1" dirty="0">
                 <a:latin typeface="Rockwell" panose="02060603020205020403" pitchFamily="18" charset="0"/>
               </a:rPr>
-              <a:t>PILOT MARKET: CONNECTICUT</a:t>
+              <a:t>PILOT STATE</a:t>
             </a:r>
           </a:p>
         </p:txBody>
@@ -7016,7 +8273,7 @@
           <p:nvPr/>
         </p:nvPicPr>
         <p:blipFill rotWithShape="1">
-          <a:blip r:embed="rId2">
+          <a:blip r:embed="rId3">
             <a:extLst>
               <a:ext uri="{28A0092B-C50C-407E-A947-70E740481C1C}">
                 <a14:useLocalDpi xmlns:a14="http://schemas.microsoft.com/office/drawing/2010/main" val="0"/>
@@ -7051,7 +8308,7 @@
           <p:nvPr/>
         </p:nvPicPr>
         <p:blipFill>
-          <a:blip r:embed="rId3">
+          <a:blip r:embed="rId4">
             <a:extLst>
               <a:ext uri="{28A0092B-C50C-407E-A947-70E740481C1C}">
                 <a14:useLocalDpi xmlns:a14="http://schemas.microsoft.com/office/drawing/2010/main" val="0"/>
@@ -7467,6 +8724,18 @@
   <p:clrMapOvr>
     <a:masterClrMapping/>
   </p:clrMapOvr>
+  <mc:AlternateContent xmlns:mc="http://schemas.openxmlformats.org/markup-compatibility/2006">
+    <mc:Choice xmlns:p14="http://schemas.microsoft.com/office/powerpoint/2010/main" Requires="p14">
+      <p:transition spd="slow">
+        <p14:flash/>
+      </p:transition>
+    </mc:Choice>
+    <mc:Fallback>
+      <p:transition spd="slow">
+        <p:fade/>
+      </p:transition>
+    </mc:Fallback>
+  </mc:AlternateContent>
 </p:sld>
 </file>
 
@@ -7530,7 +8799,7 @@
               <a:rPr lang="en-US" dirty="0">
                 <a:latin typeface="Rockwell" panose="02060603020205020403" pitchFamily="18" charset="0"/>
               </a:rPr>
-              <a:t>Connecticut</a:t>
+              <a:t>New Haven</a:t>
             </a:r>
           </a:p>
           <a:p>
@@ -7542,19 +8811,7 @@
               <a:rPr lang="en-US" dirty="0">
                 <a:latin typeface="Rockwell" panose="02060603020205020403" pitchFamily="18" charset="0"/>
               </a:rPr>
-              <a:t>Location for Brewery: New Haven</a:t>
-            </a:r>
-          </a:p>
-          <a:p>
-            <a:pPr marL="690563" lvl="1" indent="-346075" algn="l">
-              <a:buFont typeface="Wingdings" panose="05000000000000000000" pitchFamily="2" charset="2"/>
-              <a:buChar char="v"/>
-            </a:pPr>
-            <a:r>
-              <a:rPr lang="en-US" dirty="0">
-                <a:latin typeface="Rockwell" panose="02060603020205020403" pitchFamily="18" charset="0"/>
-              </a:rPr>
-              <a:t>Selection Criteria:</a:t>
+              <a:t>Reasons for selection:</a:t>
             </a:r>
           </a:p>
           <a:p>
@@ -7656,7 +8913,7 @@
               <a:rPr lang="en-US" dirty="0">
                 <a:latin typeface="Rockwell" panose="02060603020205020403" pitchFamily="18" charset="0"/>
               </a:rPr>
-              <a:t>No Connecticut brewers are headquartered in New Haven</a:t>
+              <a:t>No craft brewers headquarters</a:t>
             </a:r>
           </a:p>
         </p:txBody>
@@ -7676,7 +8933,7 @@
           <p:nvPr/>
         </p:nvPicPr>
         <p:blipFill rotWithShape="1">
-          <a:blip r:embed="rId2">
+          <a:blip r:embed="rId3">
             <a:extLst>
               <a:ext uri="{28A0092B-C50C-407E-A947-70E740481C1C}">
                 <a14:useLocalDpi xmlns:a14="http://schemas.microsoft.com/office/drawing/2010/main" val="0"/>
@@ -7711,7 +8968,7 @@
           <p:nvPr/>
         </p:nvPicPr>
         <p:blipFill>
-          <a:blip r:embed="rId3">
+          <a:blip r:embed="rId4">
             <a:extLst>
               <a:ext uri="{28A0092B-C50C-407E-A947-70E740481C1C}">
                 <a14:useLocalDpi xmlns:a14="http://schemas.microsoft.com/office/drawing/2010/main" val="0"/>
@@ -7783,7 +9040,7 @@
               <a:rPr lang="en-US" sz="4000" b="1" cap="all" dirty="0">
                 <a:latin typeface="Rockwell" panose="02060603020205020403" pitchFamily="18" charset="0"/>
               </a:rPr>
-              <a:t>Pilot Market: Connecticut</a:t>
+              <a:t>Pilot Market</a:t>
             </a:r>
           </a:p>
         </p:txBody>
@@ -7839,6 +9096,18 @@
   <p:clrMapOvr>
     <a:masterClrMapping/>
   </p:clrMapOvr>
+  <mc:AlternateContent xmlns:mc="http://schemas.openxmlformats.org/markup-compatibility/2006">
+    <mc:Choice xmlns:p15="http://schemas.microsoft.com/office/powerpoint/2012/main" Requires="p15">
+      <p:transition xmlns:p14="http://schemas.microsoft.com/office/powerpoint/2010/main" spd="slow" p14:dur="2000">
+        <p15:prstTrans prst="drape"/>
+      </p:transition>
+    </mc:Choice>
+    <mc:Fallback>
+      <p:transition spd="slow">
+        <p:fade/>
+      </p:transition>
+    </mc:Fallback>
+  </mc:AlternateContent>
 </p:sld>
 </file>
 
@@ -7891,7 +9160,7 @@
               <a:rPr lang="en-US" sz="4000" b="1" cap="all" dirty="0">
                 <a:latin typeface="Rockwell" panose="02060603020205020403" pitchFamily="18" charset="0"/>
               </a:rPr>
-              <a:t>Second Test Market: Maryland</a:t>
+              <a:t>Second Test State</a:t>
             </a:r>
           </a:p>
         </p:txBody>
@@ -7943,64 +9212,85 @@
             </a:r>
           </a:p>
           <a:p>
+            <a:pPr marL="685800" lvl="1" indent="-342900" algn="l">
+              <a:buFont typeface="Wingdings" panose="05000000000000000000" pitchFamily="2" charset="2"/>
+              <a:buChar char="v"/>
+            </a:pPr>
+            <a:r>
+              <a:rPr lang="en-US" dirty="0">
+                <a:latin typeface="Rockwell" panose="02060603020205020403" pitchFamily="18" charset="0"/>
+              </a:rPr>
+              <a:t>Reasons for Selection:</a:t>
+            </a:r>
+          </a:p>
+          <a:p>
+            <a:pPr marL="1147763" lvl="2" indent="-342900" algn="l">
+              <a:buFont typeface="Wingdings" panose="05000000000000000000" pitchFamily="2" charset="2"/>
+              <a:buChar char="q"/>
+            </a:pPr>
+            <a:r>
+              <a:rPr lang="en-US" dirty="0">
+                <a:latin typeface="Rockwell" panose="02060603020205020403" pitchFamily="18" charset="0"/>
+              </a:rPr>
+              <a:t>12</a:t>
+            </a:r>
+            <a:r>
+              <a:rPr lang="en-US" baseline="30000" dirty="0">
+                <a:latin typeface="Rockwell" panose="02060603020205020403" pitchFamily="18" charset="0"/>
+              </a:rPr>
+              <a:t>th</a:t>
+            </a:r>
+            <a:r>
+              <a:rPr lang="en-US" dirty="0">
+                <a:latin typeface="Rockwell" panose="02060603020205020403" pitchFamily="18" charset="0"/>
+              </a:rPr>
+              <a:t> Highest Median Alcohol By Volume (ABV) – 0.058</a:t>
+            </a:r>
+          </a:p>
+          <a:p>
+            <a:pPr marL="1147763" lvl="2" indent="-342900" algn="l">
+              <a:buFont typeface="Wingdings" panose="05000000000000000000" pitchFamily="2" charset="2"/>
+              <a:buChar char="q"/>
+            </a:pPr>
+            <a:r>
+              <a:rPr lang="en-US" dirty="0">
+                <a:latin typeface="Rockwell" panose="02060603020205020403" pitchFamily="18" charset="0"/>
+              </a:rPr>
+              <a:t>10</a:t>
+            </a:r>
+            <a:r>
+              <a:rPr lang="en-US" baseline="30000" dirty="0">
+                <a:latin typeface="Rockwell" panose="02060603020205020403" pitchFamily="18" charset="0"/>
+              </a:rPr>
+              <a:t>th</a:t>
+            </a:r>
+            <a:r>
+              <a:rPr lang="en-US" dirty="0">
+                <a:latin typeface="Rockwell" panose="02060603020205020403" pitchFamily="18" charset="0"/>
+              </a:rPr>
+              <a:t> Lowest Median International Bitterness Unit (IBU) – 29.0</a:t>
+            </a:r>
+          </a:p>
+          <a:p>
+            <a:pPr marL="1147763" lvl="2" indent="-342900" algn="l">
+              <a:buFont typeface="Wingdings" panose="05000000000000000000" pitchFamily="2" charset="2"/>
+              <a:buChar char="q"/>
+            </a:pPr>
+            <a:r>
+              <a:rPr lang="en-US" dirty="0">
+                <a:latin typeface="Rockwell" panose="02060603020205020403" pitchFamily="18" charset="0"/>
+              </a:rPr>
+              <a:t>In-state craft breweries: 7</a:t>
+            </a:r>
+          </a:p>
+          <a:p>
             <a:pPr marL="690563" lvl="1" indent="-342900" algn="l">
               <a:buFont typeface="Wingdings" panose="05000000000000000000" pitchFamily="2" charset="2"/>
               <a:buChar char="v"/>
             </a:pPr>
-            <a:r>
-              <a:rPr lang="en-US" dirty="0">
-                <a:latin typeface="Rockwell" panose="02060603020205020403" pitchFamily="18" charset="0"/>
-              </a:rPr>
-              <a:t>In-state breweries: 7</a:t>
-            </a:r>
-          </a:p>
-          <a:p>
-            <a:pPr marL="690563" lvl="1" indent="-342900" algn="l">
-              <a:buFont typeface="Wingdings" panose="05000000000000000000" pitchFamily="2" charset="2"/>
-              <a:buChar char="v"/>
-            </a:pPr>
-            <a:r>
-              <a:rPr lang="en-US" dirty="0">
-                <a:latin typeface="Rockwell" panose="02060603020205020403" pitchFamily="18" charset="0"/>
-              </a:rPr>
-              <a:t>12</a:t>
-            </a:r>
-            <a:r>
-              <a:rPr lang="en-US" baseline="30000" dirty="0">
-                <a:latin typeface="Rockwell" panose="02060603020205020403" pitchFamily="18" charset="0"/>
-              </a:rPr>
-              <a:t>th</a:t>
-            </a:r>
-            <a:r>
-              <a:rPr lang="en-US" dirty="0">
-                <a:latin typeface="Rockwell" panose="02060603020205020403" pitchFamily="18" charset="0"/>
-              </a:rPr>
-              <a:t> Highest Median Alcohol By Volume (ABV) – 0.058</a:t>
-            </a:r>
-          </a:p>
-          <a:p>
-            <a:pPr marL="690563" lvl="1" indent="-342900" algn="l">
-              <a:buFont typeface="Wingdings" panose="05000000000000000000" pitchFamily="2" charset="2"/>
-              <a:buChar char="v"/>
-            </a:pPr>
-            <a:r>
-              <a:rPr lang="en-US" dirty="0">
-                <a:latin typeface="Rockwell" panose="02060603020205020403" pitchFamily="18" charset="0"/>
-              </a:rPr>
-              <a:t>10</a:t>
-            </a:r>
-            <a:r>
-              <a:rPr lang="en-US" baseline="30000" dirty="0">
-                <a:latin typeface="Rockwell" panose="02060603020205020403" pitchFamily="18" charset="0"/>
-              </a:rPr>
-              <a:t>th</a:t>
-            </a:r>
-            <a:r>
-              <a:rPr lang="en-US" dirty="0">
-                <a:latin typeface="Rockwell" panose="02060603020205020403" pitchFamily="18" charset="0"/>
-              </a:rPr>
-              <a:t> Lowest Median International Bitterness Unit (IBU) – 29.0</a:t>
-            </a:r>
+            <a:endParaRPr lang="en-US" dirty="0">
+              <a:latin typeface="Rockwell" panose="02060603020205020403" pitchFamily="18" charset="0"/>
+            </a:endParaRPr>
           </a:p>
         </p:txBody>
       </p:sp>
@@ -8019,7 +9309,7 @@
           <p:nvPr/>
         </p:nvPicPr>
         <p:blipFill rotWithShape="1">
-          <a:blip r:embed="rId2">
+          <a:blip r:embed="rId3">
             <a:extLst>
               <a:ext uri="{28A0092B-C50C-407E-A947-70E740481C1C}">
                 <a14:useLocalDpi xmlns:a14="http://schemas.microsoft.com/office/drawing/2010/main" val="0"/>
@@ -8054,7 +9344,7 @@
           <p:nvPr/>
         </p:nvPicPr>
         <p:blipFill>
-          <a:blip r:embed="rId3">
+          <a:blip r:embed="rId4">
             <a:extLst>
               <a:ext uri="{28A0092B-C50C-407E-A947-70E740481C1C}">
                 <a14:useLocalDpi xmlns:a14="http://schemas.microsoft.com/office/drawing/2010/main" val="0"/>
@@ -8131,7 +9421,7 @@
           <p:nvPr/>
         </p:nvPicPr>
         <p:blipFill rotWithShape="1">
-          <a:blip r:embed="rId4">
+          <a:blip r:embed="rId5">
             <a:extLst>
               <a:ext uri="{28A0092B-C50C-407E-A947-70E740481C1C}">
                 <a14:useLocalDpi xmlns:a14="http://schemas.microsoft.com/office/drawing/2010/main" val="0"/>
@@ -8143,8 +9433,8 @@
         </p:blipFill>
         <p:spPr>
           <a:xfrm>
-            <a:off x="2823408" y="3184358"/>
-            <a:ext cx="6962276" cy="3225966"/>
+            <a:off x="3238999" y="3429000"/>
+            <a:ext cx="6353057" cy="2857500"/>
           </a:xfrm>
           <a:prstGeom prst="rect">
             <a:avLst/>
@@ -8161,6 +9451,18 @@
   <p:clrMapOvr>
     <a:masterClrMapping/>
   </p:clrMapOvr>
+  <mc:AlternateContent xmlns:mc="http://schemas.openxmlformats.org/markup-compatibility/2006">
+    <mc:Choice xmlns:p15="http://schemas.microsoft.com/office/powerpoint/2012/main" Requires="p15">
+      <p:transition xmlns:p14="http://schemas.microsoft.com/office/powerpoint/2010/main" spd="slow" p14:dur="2000">
+        <p15:prstTrans prst="fallOver"/>
+      </p:transition>
+    </mc:Choice>
+    <mc:Fallback>
+      <p:transition spd="slow">
+        <p:fade/>
+      </p:transition>
+    </mc:Fallback>
+  </mc:AlternateContent>
 </p:sld>
 </file>
 
@@ -8210,10 +9512,10 @@
           <a:lstStyle/>
           <a:p>
             <a:r>
-              <a:rPr lang="en-US" sz="4000" b="1" dirty="0">
-                <a:latin typeface="Rockwell" panose="02060603020205020403" pitchFamily="18" charset="0"/>
-              </a:rPr>
-              <a:t>SECOND TEST MARKET: MARYLAND</a:t>
+              <a:rPr lang="en-US" sz="4000" b="1" cap="all" dirty="0">
+                <a:latin typeface="Rockwell" panose="02060603020205020403" pitchFamily="18" charset="0"/>
+              </a:rPr>
+              <a:t>SECOND TEST STATE</a:t>
             </a:r>
           </a:p>
         </p:txBody>
@@ -8296,7 +9598,7 @@
           <p:nvPr/>
         </p:nvPicPr>
         <p:blipFill rotWithShape="1">
-          <a:blip r:embed="rId2">
+          <a:blip r:embed="rId3">
             <a:extLst>
               <a:ext uri="{28A0092B-C50C-407E-A947-70E740481C1C}">
                 <a14:useLocalDpi xmlns:a14="http://schemas.microsoft.com/office/drawing/2010/main" val="0"/>
@@ -8331,7 +9633,7 @@
           <p:nvPr/>
         </p:nvPicPr>
         <p:blipFill>
-          <a:blip r:embed="rId3">
+          <a:blip r:embed="rId4">
             <a:extLst>
               <a:ext uri="{28A0092B-C50C-407E-A947-70E740481C1C}">
                 <a14:useLocalDpi xmlns:a14="http://schemas.microsoft.com/office/drawing/2010/main" val="0"/>
@@ -8747,6 +10049,18 @@
   <p:clrMapOvr>
     <a:masterClrMapping/>
   </p:clrMapOvr>
+  <mc:AlternateContent xmlns:mc="http://schemas.openxmlformats.org/markup-compatibility/2006">
+    <mc:Choice xmlns:p14="http://schemas.microsoft.com/office/powerpoint/2010/main" Requires="p14">
+      <p:transition spd="slow" p14:dur="800">
+        <p:circle/>
+      </p:transition>
+    </mc:Choice>
+    <mc:Fallback>
+      <p:transition spd="slow">
+        <p:circle/>
+      </p:transition>
+    </mc:Fallback>
+  </mc:AlternateContent>
 </p:sld>
 </file>
 
@@ -8799,7 +10113,7 @@
               <a:rPr lang="en-US" sz="4000" b="1" cap="all" dirty="0">
                 <a:latin typeface="Rockwell" panose="02060603020205020403" pitchFamily="18" charset="0"/>
               </a:rPr>
-              <a:t>SECOND TEST Market: Maryland</a:t>
+              <a:t>SECOND TEST MARKET: Baltimore</a:t>
             </a:r>
           </a:p>
         </p:txBody>
@@ -8845,19 +10159,7 @@
               <a:rPr lang="en-US" dirty="0">
                 <a:latin typeface="Rockwell" panose="02060603020205020403" pitchFamily="18" charset="0"/>
               </a:rPr>
-              <a:t>Maryland</a:t>
-            </a:r>
-          </a:p>
-          <a:p>
-            <a:pPr marL="690563" lvl="1" indent="-342900" algn="l">
-              <a:buFont typeface="Wingdings" panose="05000000000000000000" pitchFamily="2" charset="2"/>
-              <a:buChar char="v"/>
-            </a:pPr>
-            <a:r>
-              <a:rPr lang="en-US" dirty="0">
-                <a:latin typeface="Rockwell" panose="02060603020205020403" pitchFamily="18" charset="0"/>
-              </a:rPr>
-              <a:t>Brewery Location: Baltimore</a:t>
+              <a:t>Baltimore</a:t>
             </a:r>
           </a:p>
           <a:p>
@@ -8869,7 +10171,7 @@
               <a:rPr lang="en-US" dirty="0">
                 <a:latin typeface="Rockwell" panose="02060603020205020403" pitchFamily="18" charset="0"/>
               </a:rPr>
-              <a:t>Selection Criteria:</a:t>
+              <a:t>Reasons for selection:</a:t>
             </a:r>
           </a:p>
           <a:p>
@@ -8899,7 +10201,13 @@
               <a:rPr lang="en-US" dirty="0">
                 <a:latin typeface="Rockwell" panose="02060603020205020403" pitchFamily="18" charset="0"/>
               </a:rPr>
-              <a:t>Population: ~651,000</a:t>
+              <a:t>Population: ~650,000</a:t>
+            </a:r>
+            <a:r>
+              <a:rPr lang="en-US" baseline="30000" dirty="0">
+                <a:latin typeface="Rockwell" panose="02060603020205020403" pitchFamily="18" charset="0"/>
+              </a:rPr>
+              <a:t>5</a:t>
             </a:r>
           </a:p>
           <a:p>
@@ -9004,7 +10312,7 @@
               <a:rPr lang="en-US" dirty="0">
                 <a:latin typeface="Rockwell" panose="02060603020205020403" pitchFamily="18" charset="0"/>
               </a:rPr>
-              <a:t>Three (3) brewers are headquartered in Baltimore</a:t>
+              <a:t>Three (3) craft brewers are headquartered in Baltimore</a:t>
             </a:r>
             <a:endParaRPr lang="en-US" dirty="0"/>
           </a:p>
@@ -9040,7 +10348,7 @@
           <p:nvPr/>
         </p:nvPicPr>
         <p:blipFill rotWithShape="1">
-          <a:blip r:embed="rId2">
+          <a:blip r:embed="rId3">
             <a:extLst>
               <a:ext uri="{28A0092B-C50C-407E-A947-70E740481C1C}">
                 <a14:useLocalDpi xmlns:a14="http://schemas.microsoft.com/office/drawing/2010/main" val="0"/>
@@ -9075,7 +10383,7 @@
           <p:nvPr/>
         </p:nvPicPr>
         <p:blipFill>
-          <a:blip r:embed="rId3">
+          <a:blip r:embed="rId4">
             <a:extLst>
               <a:ext uri="{28A0092B-C50C-407E-A947-70E740481C1C}">
                 <a14:useLocalDpi xmlns:a14="http://schemas.microsoft.com/office/drawing/2010/main" val="0"/>
@@ -9147,6 +10455,18 @@
   <p:clrMapOvr>
     <a:masterClrMapping/>
   </p:clrMapOvr>
+  <mc:AlternateContent xmlns:mc="http://schemas.openxmlformats.org/markup-compatibility/2006">
+    <mc:Choice xmlns:p15="http://schemas.microsoft.com/office/powerpoint/2012/main" Requires="p15">
+      <p:transition xmlns:p14="http://schemas.microsoft.com/office/powerpoint/2010/main" spd="slow" p14:dur="2000">
+        <p15:prstTrans prst="drape"/>
+      </p:transition>
+    </mc:Choice>
+    <mc:Fallback>
+      <p:transition spd="slow">
+        <p:fade/>
+      </p:transition>
+    </mc:Fallback>
+  </mc:AlternateContent>
 </p:sld>
 </file>
 

</xml_diff>